<commit_message>
Office 365 and some minor fixes
</commit_message>
<xml_diff>
--- a/MSOffice.pptx
+++ b/MSOffice.pptx
@@ -12,6 +12,8 @@
     <p:sldId id="260" r:id="rId6"/>
     <p:sldId id="261" r:id="rId7"/>
     <p:sldId id="262" r:id="rId8"/>
+    <p:sldId id="263" r:id="rId9"/>
+    <p:sldId id="264" r:id="rId10"/>
   </p:sldIdLst>
   <p:sldSz cx="12192000" cy="6858000"/>
   <p:notesSz cx="6858000" cy="9144000"/>
@@ -12648,6 +12650,43 @@
             <a:pPr marL="457200" indent="-457200">
               <a:buAutoNum type="arabicPeriod"/>
             </a:pPr>
+            <a:r>
+              <a:rPr kumimoji="1" lang="en-US" altLang="ko-KR" dirty="0"/>
+              <a:t>Idk</a:t>
+            </a:r>
+          </a:p>
+          <a:p>
+            <a:pPr marL="457200" indent="-457200">
+              <a:buAutoNum type="arabicPeriod"/>
+            </a:pPr>
+            <a:r>
+              <a:rPr kumimoji="1" lang="en-US" altLang="ko-KR" dirty="0"/>
+              <a:t>App Store</a:t>
+            </a:r>
+          </a:p>
+          <a:p>
+            <a:pPr marL="457200" indent="-457200">
+              <a:buAutoNum type="arabicPeriod"/>
+            </a:pPr>
+            <a:r>
+              <a:rPr kumimoji="1" lang="en-US" altLang="ko-KR" dirty="0"/>
+              <a:t>Torrent?</a:t>
+            </a:r>
+          </a:p>
+          <a:p>
+            <a:pPr marL="457200" indent="-457200">
+              <a:buAutoNum type="arabicPeriod"/>
+            </a:pPr>
+            <a:r>
+              <a:rPr kumimoji="1" lang="en-US" altLang="ko-KR"/>
+              <a:t>Microsoft Office 365..?</a:t>
+            </a:r>
+            <a:endParaRPr kumimoji="1" lang="en-US" altLang="ko-KR" dirty="0"/>
+          </a:p>
+          <a:p>
+            <a:pPr marL="457200" indent="-457200">
+              <a:buAutoNum type="arabicPeriod"/>
+            </a:pPr>
             <a:endParaRPr kumimoji="1" lang="ko-KR" altLang="en-US" dirty="0"/>
           </a:p>
         </p:txBody>
@@ -13192,6 +13231,247 @@
     <p:extLst>
       <p:ext uri="{BB962C8B-B14F-4D97-AF65-F5344CB8AC3E}">
         <p14:creationId xmlns:p14="http://schemas.microsoft.com/office/powerpoint/2010/main" val="3701839215"/>
+      </p:ext>
+    </p:extLst>
+  </p:cSld>
+  <p:clrMapOvr>
+    <a:masterClrMapping/>
+  </p:clrMapOvr>
+</p:sld>
+</file>
+
+<file path=ppt/slides/slide8.xml><?xml version="1.0" encoding="utf-8"?>
+<p:sld xmlns:a="http://schemas.openxmlformats.org/drawingml/2006/main" xmlns:r="http://schemas.openxmlformats.org/officeDocument/2006/relationships" xmlns:p="http://schemas.openxmlformats.org/presentationml/2006/main">
+  <p:cSld>
+    <p:spTree>
+      <p:nvGrpSpPr>
+        <p:cNvPr id="1" name=""/>
+        <p:cNvGrpSpPr/>
+        <p:nvPr/>
+      </p:nvGrpSpPr>
+      <p:grpSpPr>
+        <a:xfrm>
+          <a:off x="0" y="0"/>
+          <a:ext cx="0" cy="0"/>
+          <a:chOff x="0" y="0"/>
+          <a:chExt cx="0" cy="0"/>
+        </a:xfrm>
+      </p:grpSpPr>
+      <p:sp>
+        <p:nvSpPr>
+          <p:cNvPr id="2" name="제목 1">
+            <a:extLst>
+              <a:ext uri="{FF2B5EF4-FFF2-40B4-BE49-F238E27FC236}">
+                <a16:creationId xmlns:a16="http://schemas.microsoft.com/office/drawing/2014/main" id="{1264C97E-4B3A-E344-9AF3-B8096D408F3D}"/>
+              </a:ext>
+            </a:extLst>
+          </p:cNvPr>
+          <p:cNvSpPr>
+            <a:spLocks noGrp="1"/>
+          </p:cNvSpPr>
+          <p:nvPr>
+            <p:ph type="title"/>
+          </p:nvPr>
+        </p:nvSpPr>
+        <p:spPr/>
+        <p:txBody>
+          <a:bodyPr/>
+          <a:lstStyle/>
+          <a:p>
+            <a:endParaRPr kumimoji="1" lang="ko-KR" altLang="en-US"/>
+          </a:p>
+        </p:txBody>
+      </p:sp>
+      <p:sp>
+        <p:nvSpPr>
+          <p:cNvPr id="3" name="내용 개체 틀 2">
+            <a:extLst>
+              <a:ext uri="{FF2B5EF4-FFF2-40B4-BE49-F238E27FC236}">
+                <a16:creationId xmlns:a16="http://schemas.microsoft.com/office/drawing/2014/main" id="{0BA48772-FA7A-394F-B10C-9987EB630970}"/>
+              </a:ext>
+            </a:extLst>
+          </p:cNvPr>
+          <p:cNvSpPr>
+            <a:spLocks noGrp="1"/>
+          </p:cNvSpPr>
+          <p:nvPr>
+            <p:ph sz="half" idx="1"/>
+          </p:nvPr>
+        </p:nvSpPr>
+        <p:spPr/>
+        <p:txBody>
+          <a:bodyPr/>
+          <a:lstStyle/>
+          <a:p>
+            <a:endParaRPr kumimoji="1" lang="ko-KR" altLang="en-US"/>
+          </a:p>
+        </p:txBody>
+      </p:sp>
+      <p:sp>
+        <p:nvSpPr>
+          <p:cNvPr id="4" name="내용 개체 틀 3">
+            <a:extLst>
+              <a:ext uri="{FF2B5EF4-FFF2-40B4-BE49-F238E27FC236}">
+                <a16:creationId xmlns:a16="http://schemas.microsoft.com/office/drawing/2014/main" id="{39590BB7-CC95-8E40-9897-604BB7312E96}"/>
+              </a:ext>
+            </a:extLst>
+          </p:cNvPr>
+          <p:cNvSpPr>
+            <a:spLocks noGrp="1"/>
+          </p:cNvSpPr>
+          <p:nvPr>
+            <p:ph sz="half" idx="2"/>
+          </p:nvPr>
+        </p:nvSpPr>
+        <p:spPr/>
+        <p:txBody>
+          <a:bodyPr/>
+          <a:lstStyle/>
+          <a:p>
+            <a:endParaRPr kumimoji="1" lang="ko-KR" altLang="en-US"/>
+          </a:p>
+        </p:txBody>
+      </p:sp>
+    </p:spTree>
+    <p:extLst>
+      <p:ext uri="{BB962C8B-B14F-4D97-AF65-F5344CB8AC3E}">
+        <p14:creationId xmlns:p14="http://schemas.microsoft.com/office/powerpoint/2010/main" val="4122910011"/>
+      </p:ext>
+    </p:extLst>
+  </p:cSld>
+  <p:clrMapOvr>
+    <a:masterClrMapping/>
+  </p:clrMapOvr>
+</p:sld>
+</file>
+
+<file path=ppt/slides/slide9.xml><?xml version="1.0" encoding="utf-8"?>
+<p:sld xmlns:a="http://schemas.openxmlformats.org/drawingml/2006/main" xmlns:r="http://schemas.openxmlformats.org/officeDocument/2006/relationships" xmlns:p="http://schemas.openxmlformats.org/presentationml/2006/main">
+  <p:cSld>
+    <p:spTree>
+      <p:nvGrpSpPr>
+        <p:cNvPr id="1" name=""/>
+        <p:cNvGrpSpPr/>
+        <p:nvPr/>
+      </p:nvGrpSpPr>
+      <p:grpSpPr>
+        <a:xfrm>
+          <a:off x="0" y="0"/>
+          <a:ext cx="0" cy="0"/>
+          <a:chOff x="0" y="0"/>
+          <a:chExt cx="0" cy="0"/>
+        </a:xfrm>
+      </p:grpSpPr>
+      <p:sp>
+        <p:nvSpPr>
+          <p:cNvPr id="2" name="제목 1">
+            <a:extLst>
+              <a:ext uri="{FF2B5EF4-FFF2-40B4-BE49-F238E27FC236}">
+                <a16:creationId xmlns:a16="http://schemas.microsoft.com/office/drawing/2014/main" id="{9D7486EF-2B3B-FD4C-B314-1DA8B59BF1DC}"/>
+              </a:ext>
+            </a:extLst>
+          </p:cNvPr>
+          <p:cNvSpPr>
+            <a:spLocks noGrp="1"/>
+          </p:cNvSpPr>
+          <p:nvPr>
+            <p:ph type="title"/>
+          </p:nvPr>
+        </p:nvSpPr>
+        <p:spPr/>
+        <p:txBody>
+          <a:bodyPr/>
+          <a:lstStyle/>
+          <a:p>
+            <a:r>
+              <a:rPr kumimoji="1" lang="en-US" altLang="ko-KR" dirty="0"/>
+              <a:t>Office 365</a:t>
+            </a:r>
+            <a:endParaRPr kumimoji="1" lang="ko-KR" altLang="en-US" dirty="0"/>
+          </a:p>
+        </p:txBody>
+      </p:sp>
+      <p:sp>
+        <p:nvSpPr>
+          <p:cNvPr id="3" name="내용 개체 틀 2">
+            <a:extLst>
+              <a:ext uri="{FF2B5EF4-FFF2-40B4-BE49-F238E27FC236}">
+                <a16:creationId xmlns:a16="http://schemas.microsoft.com/office/drawing/2014/main" id="{E4924E39-F19E-6F48-B272-3CA287BDA0AE}"/>
+              </a:ext>
+            </a:extLst>
+          </p:cNvPr>
+          <p:cNvSpPr>
+            <a:spLocks noGrp="1"/>
+          </p:cNvSpPr>
+          <p:nvPr>
+            <p:ph sz="half" idx="1"/>
+          </p:nvPr>
+        </p:nvSpPr>
+        <p:spPr>
+          <a:xfrm>
+            <a:off x="1141410" y="2249486"/>
+            <a:ext cx="9200769" cy="2116715"/>
+          </a:xfrm>
+        </p:spPr>
+        <p:txBody>
+          <a:bodyPr/>
+          <a:lstStyle/>
+          <a:p>
+            <a:r>
+              <a:rPr kumimoji="1" lang="en-US" altLang="ko-KR" dirty="0"/>
+              <a:t>Office 365 gives various service that you will never see again after in personal account.</a:t>
+            </a:r>
+          </a:p>
+          <a:p>
+            <a:r>
+              <a:rPr kumimoji="1" lang="en-US" altLang="ko-KR" dirty="0"/>
+              <a:t>Why don</a:t>
+            </a:r>
+            <a:r>
+              <a:rPr kumimoji="1" lang="ko-KR" altLang="en-US" dirty="0"/>
+              <a:t>’</a:t>
+            </a:r>
+            <a:r>
+              <a:rPr kumimoji="1" lang="en-US" altLang="ko-KR" dirty="0"/>
+              <a:t>t we use more efficiently?</a:t>
+            </a:r>
+            <a:endParaRPr kumimoji="1" lang="ko-KR" altLang="en-US" dirty="0"/>
+          </a:p>
+        </p:txBody>
+      </p:sp>
+      <p:pic>
+        <p:nvPicPr>
+          <p:cNvPr id="6" name="내용 개체 틀 5">
+            <a:extLst>
+              <a:ext uri="{FF2B5EF4-FFF2-40B4-BE49-F238E27FC236}">
+                <a16:creationId xmlns:a16="http://schemas.microsoft.com/office/drawing/2014/main" id="{6A3B7822-DBEF-FF4F-97D3-A584BE04D140}"/>
+              </a:ext>
+            </a:extLst>
+          </p:cNvPr>
+          <p:cNvPicPr>
+            <a:picLocks noGrp="1" noChangeAspect="1"/>
+          </p:cNvPicPr>
+          <p:nvPr>
+            <p:ph sz="half" idx="2"/>
+          </p:nvPr>
+        </p:nvPicPr>
+        <p:blipFill>
+          <a:blip r:embed="rId2"/>
+          <a:stretch>
+            <a:fillRect/>
+          </a:stretch>
+        </p:blipFill>
+        <p:spPr>
+          <a:xfrm>
+            <a:off x="971265" y="4426621"/>
+            <a:ext cx="9792370" cy="1364579"/>
+          </a:xfrm>
+        </p:spPr>
+      </p:pic>
+    </p:spTree>
+    <p:extLst>
+      <p:ext uri="{BB962C8B-B14F-4D97-AF65-F5344CB8AC3E}">
+        <p14:creationId xmlns:p14="http://schemas.microsoft.com/office/powerpoint/2010/main" val="1154433210"/>
       </p:ext>
     </p:extLst>
   </p:cSld>

</xml_diff>

<commit_message>
Added new various apps about MSOffice.
</commit_message>
<xml_diff>
--- a/MSOffice.pptx
+++ b/MSOffice.pptx
@@ -14,6 +14,15 @@
     <p:sldId id="262" r:id="rId8"/>
     <p:sldId id="263" r:id="rId9"/>
     <p:sldId id="264" r:id="rId10"/>
+    <p:sldId id="265" r:id="rId11"/>
+    <p:sldId id="266" r:id="rId12"/>
+    <p:sldId id="267" r:id="rId13"/>
+    <p:sldId id="268" r:id="rId14"/>
+    <p:sldId id="269" r:id="rId15"/>
+    <p:sldId id="270" r:id="rId16"/>
+    <p:sldId id="271" r:id="rId17"/>
+    <p:sldId id="272" r:id="rId18"/>
+    <p:sldId id="273" r:id="rId19"/>
   </p:sldIdLst>
   <p:sldSz cx="12192000" cy="6858000"/>
   <p:notesSz cx="6858000" cy="9144000"/>
@@ -181,7 +190,7 @@
           <a:noFill/>
           <a:extLst>
             <a:ext uri="{909E8E84-426E-40dd-AFC4-6F175D3DCCD1}">
-              <a14:hiddenFill xmlns="" xmlns:a14="http://schemas.microsoft.com/office/drawing/2010/main">
+              <a14:hiddenFill xmlns:a14="http://schemas.microsoft.com/office/drawing/2010/main" xmlns="">
                 <a:solidFill>
                   <a:srgbClr val="FFFFFF"/>
                 </a:solidFill>
@@ -241,7 +250,7 @@
             </a:ln>
             <a:extLst>
               <a:ext uri="{91240B29-F687-4f45-9708-019B960494DF}">
-                <a14:hiddenLine xmlns="" xmlns:a14="http://schemas.microsoft.com/office/drawing/2010/main" w="9525">
+                <a14:hiddenLine xmlns:a14="http://schemas.microsoft.com/office/drawing/2010/main" xmlns="" w="9525">
                   <a:solidFill>
                     <a:srgbClr val="000000"/>
                   </a:solidFill>
@@ -331,7 +340,7 @@
             </a:ln>
             <a:extLst>
               <a:ext uri="{91240B29-F687-4f45-9708-019B960494DF}">
-                <a14:hiddenLine xmlns="" xmlns:a14="http://schemas.microsoft.com/office/drawing/2010/main" w="9525">
+                <a14:hiddenLine xmlns:a14="http://schemas.microsoft.com/office/drawing/2010/main" xmlns="" w="9525">
                   <a:solidFill>
                     <a:srgbClr val="000000"/>
                   </a:solidFill>
@@ -421,7 +430,7 @@
             </a:ln>
             <a:extLst>
               <a:ext uri="{91240B29-F687-4f45-9708-019B960494DF}">
-                <a14:hiddenLine xmlns="" xmlns:a14="http://schemas.microsoft.com/office/drawing/2010/main" w="9525">
+                <a14:hiddenLine xmlns:a14="http://schemas.microsoft.com/office/drawing/2010/main" xmlns="" w="9525">
                   <a:solidFill>
                     <a:srgbClr val="000000"/>
                   </a:solidFill>
@@ -455,7 +464,7 @@
             </a:ln>
             <a:extLst>
               <a:ext uri="{91240B29-F687-4f45-9708-019B960494DF}">
-                <a14:hiddenLine xmlns="" xmlns:a14="http://schemas.microsoft.com/office/drawing/2010/main" w="9525">
+                <a14:hiddenLine xmlns:a14="http://schemas.microsoft.com/office/drawing/2010/main" xmlns="" w="9525">
                   <a:solidFill>
                     <a:srgbClr val="000000"/>
                   </a:solidFill>
@@ -545,7 +554,7 @@
             </a:ln>
             <a:extLst>
               <a:ext uri="{91240B29-F687-4f45-9708-019B960494DF}">
-                <a14:hiddenLine xmlns="" xmlns:a14="http://schemas.microsoft.com/office/drawing/2010/main" w="9525">
+                <a14:hiddenLine xmlns:a14="http://schemas.microsoft.com/office/drawing/2010/main" xmlns="" w="9525">
                   <a:solidFill>
                     <a:srgbClr val="000000"/>
                   </a:solidFill>
@@ -607,7 +616,7 @@
             </a:ln>
             <a:extLst>
               <a:ext uri="{91240B29-F687-4f45-9708-019B960494DF}">
-                <a14:hiddenLine xmlns="" xmlns:a14="http://schemas.microsoft.com/office/drawing/2010/main" w="9525">
+                <a14:hiddenLine xmlns:a14="http://schemas.microsoft.com/office/drawing/2010/main" xmlns="" w="9525">
                   <a:solidFill>
                     <a:srgbClr val="000000"/>
                   </a:solidFill>
@@ -669,7 +678,7 @@
             </a:ln>
             <a:extLst>
               <a:ext uri="{91240B29-F687-4f45-9708-019B960494DF}">
-                <a14:hiddenLine xmlns="" xmlns:a14="http://schemas.microsoft.com/office/drawing/2010/main" w="9525">
+                <a14:hiddenLine xmlns:a14="http://schemas.microsoft.com/office/drawing/2010/main" xmlns="" w="9525">
                   <a:solidFill>
                     <a:srgbClr val="000000"/>
                   </a:solidFill>
@@ -759,7 +768,7 @@
             </a:ln>
             <a:extLst>
               <a:ext uri="{91240B29-F687-4f45-9708-019B960494DF}">
-                <a14:hiddenLine xmlns="" xmlns:a14="http://schemas.microsoft.com/office/drawing/2010/main" w="9525">
+                <a14:hiddenLine xmlns:a14="http://schemas.microsoft.com/office/drawing/2010/main" xmlns="" w="9525">
                   <a:solidFill>
                     <a:srgbClr val="000000"/>
                   </a:solidFill>
@@ -821,7 +830,7 @@
             </a:ln>
             <a:extLst>
               <a:ext uri="{91240B29-F687-4f45-9708-019B960494DF}">
-                <a14:hiddenLine xmlns="" xmlns:a14="http://schemas.microsoft.com/office/drawing/2010/main" w="9525">
+                <a14:hiddenLine xmlns:a14="http://schemas.microsoft.com/office/drawing/2010/main" xmlns="" w="9525">
                   <a:solidFill>
                     <a:srgbClr val="000000"/>
                   </a:solidFill>
@@ -883,7 +892,7 @@
             </a:ln>
             <a:extLst>
               <a:ext uri="{91240B29-F687-4f45-9708-019B960494DF}">
-                <a14:hiddenLine xmlns="" xmlns:a14="http://schemas.microsoft.com/office/drawing/2010/main" w="9525">
+                <a14:hiddenLine xmlns:a14="http://schemas.microsoft.com/office/drawing/2010/main" xmlns="" w="9525">
                   <a:solidFill>
                     <a:srgbClr val="000000"/>
                   </a:solidFill>
@@ -973,7 +982,7 @@
             </a:ln>
             <a:extLst>
               <a:ext uri="{91240B29-F687-4f45-9708-019B960494DF}">
-                <a14:hiddenLine xmlns="" xmlns:a14="http://schemas.microsoft.com/office/drawing/2010/main" w="9525">
+                <a14:hiddenLine xmlns:a14="http://schemas.microsoft.com/office/drawing/2010/main" xmlns="" w="9525">
                   <a:solidFill>
                     <a:srgbClr val="000000"/>
                   </a:solidFill>
@@ -1063,7 +1072,7 @@
             </a:ln>
             <a:extLst>
               <a:ext uri="{91240B29-F687-4f45-9708-019B960494DF}">
-                <a14:hiddenLine xmlns="" xmlns:a14="http://schemas.microsoft.com/office/drawing/2010/main" w="9525">
+                <a14:hiddenLine xmlns:a14="http://schemas.microsoft.com/office/drawing/2010/main" xmlns="" w="9525">
                   <a:solidFill>
                     <a:srgbClr val="000000"/>
                   </a:solidFill>
@@ -1125,7 +1134,7 @@
             </a:ln>
             <a:extLst>
               <a:ext uri="{91240B29-F687-4f45-9708-019B960494DF}">
-                <a14:hiddenLine xmlns="" xmlns:a14="http://schemas.microsoft.com/office/drawing/2010/main" w="9525">
+                <a14:hiddenLine xmlns:a14="http://schemas.microsoft.com/office/drawing/2010/main" xmlns="" w="9525">
                   <a:solidFill>
                     <a:srgbClr val="000000"/>
                   </a:solidFill>
@@ -1235,7 +1244,7 @@
             </a:ln>
             <a:extLst>
               <a:ext uri="{91240B29-F687-4f45-9708-019B960494DF}">
-                <a14:hiddenLine xmlns="" xmlns:a14="http://schemas.microsoft.com/office/drawing/2010/main" w="9525">
+                <a14:hiddenLine xmlns:a14="http://schemas.microsoft.com/office/drawing/2010/main" xmlns="" w="9525">
                   <a:solidFill>
                     <a:srgbClr val="000000"/>
                   </a:solidFill>
@@ -1297,7 +1306,7 @@
             </a:ln>
             <a:extLst>
               <a:ext uri="{91240B29-F687-4f45-9708-019B960494DF}">
-                <a14:hiddenLine xmlns="" xmlns:a14="http://schemas.microsoft.com/office/drawing/2010/main" w="9525">
+                <a14:hiddenLine xmlns:a14="http://schemas.microsoft.com/office/drawing/2010/main" xmlns="" w="9525">
                   <a:solidFill>
                     <a:srgbClr val="000000"/>
                   </a:solidFill>
@@ -1387,7 +1396,7 @@
             </a:ln>
             <a:extLst>
               <a:ext uri="{91240B29-F687-4f45-9708-019B960494DF}">
-                <a14:hiddenLine xmlns="" xmlns:a14="http://schemas.microsoft.com/office/drawing/2010/main" w="9525">
+                <a14:hiddenLine xmlns:a14="http://schemas.microsoft.com/office/drawing/2010/main" xmlns="" w="9525">
                   <a:solidFill>
                     <a:srgbClr val="000000"/>
                   </a:solidFill>
@@ -1477,7 +1486,7 @@
             </a:ln>
             <a:extLst>
               <a:ext uri="{91240B29-F687-4f45-9708-019B960494DF}">
-                <a14:hiddenLine xmlns="" xmlns:a14="http://schemas.microsoft.com/office/drawing/2010/main" w="9525">
+                <a14:hiddenLine xmlns:a14="http://schemas.microsoft.com/office/drawing/2010/main" xmlns="" w="9525">
                   <a:solidFill>
                     <a:srgbClr val="000000"/>
                   </a:solidFill>
@@ -1539,7 +1548,7 @@
             </a:ln>
             <a:extLst>
               <a:ext uri="{91240B29-F687-4f45-9708-019B960494DF}">
-                <a14:hiddenLine xmlns="" xmlns:a14="http://schemas.microsoft.com/office/drawing/2010/main" w="9525">
+                <a14:hiddenLine xmlns:a14="http://schemas.microsoft.com/office/drawing/2010/main" xmlns="" w="9525">
                   <a:solidFill>
                     <a:srgbClr val="000000"/>
                   </a:solidFill>
@@ -1629,7 +1638,7 @@
             </a:ln>
             <a:extLst>
               <a:ext uri="{91240B29-F687-4f45-9708-019B960494DF}">
-                <a14:hiddenLine xmlns="" xmlns:a14="http://schemas.microsoft.com/office/drawing/2010/main" w="9525">
+                <a14:hiddenLine xmlns:a14="http://schemas.microsoft.com/office/drawing/2010/main" xmlns="" w="9525">
                   <a:solidFill>
                     <a:srgbClr val="000000"/>
                   </a:solidFill>
@@ -1719,7 +1728,7 @@
             </a:ln>
             <a:extLst>
               <a:ext uri="{91240B29-F687-4f45-9708-019B960494DF}">
-                <a14:hiddenLine xmlns="" xmlns:a14="http://schemas.microsoft.com/office/drawing/2010/main" w="9525">
+                <a14:hiddenLine xmlns:a14="http://schemas.microsoft.com/office/drawing/2010/main" xmlns="" w="9525">
                   <a:solidFill>
                     <a:srgbClr val="000000"/>
                   </a:solidFill>
@@ -1775,7 +1784,7 @@
             </a:ln>
             <a:extLst>
               <a:ext uri="{91240B29-F687-4f45-9708-019B960494DF}">
-                <a14:hiddenLine xmlns="" xmlns:a14="http://schemas.microsoft.com/office/drawing/2010/main" w="9525">
+                <a14:hiddenLine xmlns:a14="http://schemas.microsoft.com/office/drawing/2010/main" xmlns="" w="9525">
                   <a:solidFill>
                     <a:srgbClr val="000000"/>
                   </a:solidFill>
@@ -1865,7 +1874,7 @@
             </a:ln>
             <a:extLst>
               <a:ext uri="{91240B29-F687-4f45-9708-019B960494DF}">
-                <a14:hiddenLine xmlns="" xmlns:a14="http://schemas.microsoft.com/office/drawing/2010/main" w="9525">
+                <a14:hiddenLine xmlns:a14="http://schemas.microsoft.com/office/drawing/2010/main" xmlns="" w="9525">
                   <a:solidFill>
                     <a:srgbClr val="000000"/>
                   </a:solidFill>
@@ -1921,7 +1930,7 @@
             </a:ln>
             <a:extLst>
               <a:ext uri="{91240B29-F687-4f45-9708-019B960494DF}">
-                <a14:hiddenLine xmlns="" xmlns:a14="http://schemas.microsoft.com/office/drawing/2010/main" w="9525">
+                <a14:hiddenLine xmlns:a14="http://schemas.microsoft.com/office/drawing/2010/main" xmlns="" w="9525">
                   <a:solidFill>
                     <a:srgbClr val="000000"/>
                   </a:solidFill>
@@ -2011,7 +2020,7 @@
             </a:ln>
             <a:extLst>
               <a:ext uri="{91240B29-F687-4f45-9708-019B960494DF}">
-                <a14:hiddenLine xmlns="" xmlns:a14="http://schemas.microsoft.com/office/drawing/2010/main" w="9525">
+                <a14:hiddenLine xmlns:a14="http://schemas.microsoft.com/office/drawing/2010/main" xmlns="" w="9525">
                   <a:solidFill>
                     <a:srgbClr val="000000"/>
                   </a:solidFill>
@@ -2079,7 +2088,7 @@
             </a:ln>
             <a:extLst>
               <a:ext uri="{91240B29-F687-4f45-9708-019B960494DF}">
-                <a14:hiddenLine xmlns="" xmlns:a14="http://schemas.microsoft.com/office/drawing/2010/main" w="9525">
+                <a14:hiddenLine xmlns:a14="http://schemas.microsoft.com/office/drawing/2010/main" xmlns="" w="9525">
                   <a:solidFill>
                     <a:srgbClr val="000000"/>
                   </a:solidFill>
@@ -2169,7 +2178,7 @@
             </a:ln>
             <a:extLst>
               <a:ext uri="{91240B29-F687-4f45-9708-019B960494DF}">
-                <a14:hiddenLine xmlns="" xmlns:a14="http://schemas.microsoft.com/office/drawing/2010/main" w="9525">
+                <a14:hiddenLine xmlns:a14="http://schemas.microsoft.com/office/drawing/2010/main" xmlns="" w="9525">
                   <a:solidFill>
                     <a:srgbClr val="000000"/>
                   </a:solidFill>
@@ -2237,7 +2246,7 @@
             </a:ln>
             <a:extLst>
               <a:ext uri="{91240B29-F687-4f45-9708-019B960494DF}">
-                <a14:hiddenLine xmlns="" xmlns:a14="http://schemas.microsoft.com/office/drawing/2010/main" w="9525">
+                <a14:hiddenLine xmlns:a14="http://schemas.microsoft.com/office/drawing/2010/main" xmlns="" w="9525">
                   <a:solidFill>
                     <a:srgbClr val="000000"/>
                   </a:solidFill>
@@ -2327,7 +2336,7 @@
             </a:ln>
             <a:extLst>
               <a:ext uri="{91240B29-F687-4f45-9708-019B960494DF}">
-                <a14:hiddenLine xmlns="" xmlns:a14="http://schemas.microsoft.com/office/drawing/2010/main" w="9525">
+                <a14:hiddenLine xmlns:a14="http://schemas.microsoft.com/office/drawing/2010/main" xmlns="" w="9525">
                   <a:solidFill>
                     <a:srgbClr val="000000"/>
                   </a:solidFill>
@@ -2361,7 +2370,7 @@
             </a:ln>
             <a:extLst>
               <a:ext uri="{91240B29-F687-4f45-9708-019B960494DF}">
-                <a14:hiddenLine xmlns="" xmlns:a14="http://schemas.microsoft.com/office/drawing/2010/main" w="9525">
+                <a14:hiddenLine xmlns:a14="http://schemas.microsoft.com/office/drawing/2010/main" xmlns="" w="9525">
                   <a:solidFill>
                     <a:srgbClr val="000000"/>
                   </a:solidFill>
@@ -2451,7 +2460,7 @@
             </a:ln>
             <a:extLst>
               <a:ext uri="{91240B29-F687-4f45-9708-019B960494DF}">
-                <a14:hiddenLine xmlns="" xmlns:a14="http://schemas.microsoft.com/office/drawing/2010/main" w="9525">
+                <a14:hiddenLine xmlns:a14="http://schemas.microsoft.com/office/drawing/2010/main" xmlns="" w="9525">
                   <a:solidFill>
                     <a:srgbClr val="000000"/>
                   </a:solidFill>
@@ -2513,7 +2522,7 @@
             </a:ln>
             <a:extLst>
               <a:ext uri="{91240B29-F687-4f45-9708-019B960494DF}">
-                <a14:hiddenLine xmlns="" xmlns:a14="http://schemas.microsoft.com/office/drawing/2010/main" w="9525">
+                <a14:hiddenLine xmlns:a14="http://schemas.microsoft.com/office/drawing/2010/main" xmlns="" w="9525">
                   <a:solidFill>
                     <a:srgbClr val="000000"/>
                   </a:solidFill>
@@ -2575,7 +2584,7 @@
             </a:ln>
             <a:extLst>
               <a:ext uri="{91240B29-F687-4f45-9708-019B960494DF}">
-                <a14:hiddenLine xmlns="" xmlns:a14="http://schemas.microsoft.com/office/drawing/2010/main" w="9525">
+                <a14:hiddenLine xmlns:a14="http://schemas.microsoft.com/office/drawing/2010/main" xmlns="" w="9525">
                   <a:solidFill>
                     <a:srgbClr val="000000"/>
                   </a:solidFill>
@@ -2665,7 +2674,7 @@
             </a:ln>
             <a:extLst>
               <a:ext uri="{91240B29-F687-4f45-9708-019B960494DF}">
-                <a14:hiddenLine xmlns="" xmlns:a14="http://schemas.microsoft.com/office/drawing/2010/main" w="9525">
+                <a14:hiddenLine xmlns:a14="http://schemas.microsoft.com/office/drawing/2010/main" xmlns="" w="9525">
                   <a:solidFill>
                     <a:srgbClr val="000000"/>
                   </a:solidFill>
@@ -2733,7 +2742,7 @@
             </a:ln>
             <a:extLst>
               <a:ext uri="{91240B29-F687-4f45-9708-019B960494DF}">
-                <a14:hiddenLine xmlns="" xmlns:a14="http://schemas.microsoft.com/office/drawing/2010/main" w="9525">
+                <a14:hiddenLine xmlns:a14="http://schemas.microsoft.com/office/drawing/2010/main" xmlns="" w="9525">
                   <a:solidFill>
                     <a:srgbClr val="000000"/>
                   </a:solidFill>
@@ -2795,7 +2804,7 @@
             </a:ln>
             <a:extLst>
               <a:ext uri="{91240B29-F687-4f45-9708-019B960494DF}">
-                <a14:hiddenLine xmlns="" xmlns:a14="http://schemas.microsoft.com/office/drawing/2010/main" w="9525">
+                <a14:hiddenLine xmlns:a14="http://schemas.microsoft.com/office/drawing/2010/main" xmlns="" w="9525">
                   <a:solidFill>
                     <a:srgbClr val="000000"/>
                   </a:solidFill>
@@ -2885,7 +2894,7 @@
             </a:ln>
             <a:extLst>
               <a:ext uri="{91240B29-F687-4f45-9708-019B960494DF}">
-                <a14:hiddenLine xmlns="" xmlns:a14="http://schemas.microsoft.com/office/drawing/2010/main" w="9525">
+                <a14:hiddenLine xmlns:a14="http://schemas.microsoft.com/office/drawing/2010/main" xmlns="" w="9525">
                   <a:solidFill>
                     <a:srgbClr val="000000"/>
                   </a:solidFill>
@@ -2947,7 +2956,7 @@
             </a:ln>
             <a:extLst>
               <a:ext uri="{91240B29-F687-4f45-9708-019B960494DF}">
-                <a14:hiddenLine xmlns="" xmlns:a14="http://schemas.microsoft.com/office/drawing/2010/main" w="9525">
+                <a14:hiddenLine xmlns:a14="http://schemas.microsoft.com/office/drawing/2010/main" xmlns="" w="9525">
                   <a:solidFill>
                     <a:srgbClr val="000000"/>
                   </a:solidFill>
@@ -3037,7 +3046,7 @@
             </a:ln>
             <a:extLst>
               <a:ext uri="{91240B29-F687-4f45-9708-019B960494DF}">
-                <a14:hiddenLine xmlns="" xmlns:a14="http://schemas.microsoft.com/office/drawing/2010/main" w="9525">
+                <a14:hiddenLine xmlns:a14="http://schemas.microsoft.com/office/drawing/2010/main" xmlns="" w="9525">
                   <a:solidFill>
                     <a:srgbClr val="000000"/>
                   </a:solidFill>
@@ -3099,7 +3108,7 @@
             </a:ln>
             <a:extLst>
               <a:ext uri="{91240B29-F687-4f45-9708-019B960494DF}">
-                <a14:hiddenLine xmlns="" xmlns:a14="http://schemas.microsoft.com/office/drawing/2010/main" w="9525">
+                <a14:hiddenLine xmlns:a14="http://schemas.microsoft.com/office/drawing/2010/main" xmlns="" w="9525">
                   <a:solidFill>
                     <a:srgbClr val="000000"/>
                   </a:solidFill>
@@ -3189,7 +3198,7 @@
             </a:ln>
             <a:extLst>
               <a:ext uri="{91240B29-F687-4f45-9708-019B960494DF}">
-                <a14:hiddenLine xmlns="" xmlns:a14="http://schemas.microsoft.com/office/drawing/2010/main" w="9525">
+                <a14:hiddenLine xmlns:a14="http://schemas.microsoft.com/office/drawing/2010/main" xmlns="" w="9525">
                   <a:solidFill>
                     <a:srgbClr val="000000"/>
                   </a:solidFill>
@@ -3223,7 +3232,7 @@
             </a:ln>
             <a:extLst>
               <a:ext uri="{91240B29-F687-4f45-9708-019B960494DF}">
-                <a14:hiddenLine xmlns="" xmlns:a14="http://schemas.microsoft.com/office/drawing/2010/main" w="9525">
+                <a14:hiddenLine xmlns:a14="http://schemas.microsoft.com/office/drawing/2010/main" xmlns="" w="9525">
                   <a:solidFill>
                     <a:srgbClr val="000000"/>
                   </a:solidFill>
@@ -3288,7 +3297,7 @@
             </a:ln>
             <a:extLst>
               <a:ext uri="{91240B29-F687-4f45-9708-019B960494DF}">
-                <a14:hiddenLine xmlns="" xmlns:a14="http://schemas.microsoft.com/office/drawing/2010/main" w="9525">
+                <a14:hiddenLine xmlns:a14="http://schemas.microsoft.com/office/drawing/2010/main" xmlns="" w="9525">
                   <a:solidFill>
                     <a:srgbClr val="000000"/>
                   </a:solidFill>
@@ -3378,7 +3387,7 @@
             </a:ln>
             <a:extLst>
               <a:ext uri="{91240B29-F687-4f45-9708-019B960494DF}">
-                <a14:hiddenLine xmlns="" xmlns:a14="http://schemas.microsoft.com/office/drawing/2010/main" w="9525">
+                <a14:hiddenLine xmlns:a14="http://schemas.microsoft.com/office/drawing/2010/main" xmlns="" w="9525">
                   <a:solidFill>
                     <a:srgbClr val="000000"/>
                   </a:solidFill>
@@ -3440,7 +3449,7 @@
             </a:ln>
             <a:extLst>
               <a:ext uri="{91240B29-F687-4f45-9708-019B960494DF}">
-                <a14:hiddenLine xmlns="" xmlns:a14="http://schemas.microsoft.com/office/drawing/2010/main" w="9525">
+                <a14:hiddenLine xmlns:a14="http://schemas.microsoft.com/office/drawing/2010/main" xmlns="" w="9525">
                   <a:solidFill>
                     <a:srgbClr val="000000"/>
                   </a:solidFill>
@@ -3530,7 +3539,7 @@
             </a:ln>
             <a:extLst>
               <a:ext uri="{91240B29-F687-4f45-9708-019B960494DF}">
-                <a14:hiddenLine xmlns="" xmlns:a14="http://schemas.microsoft.com/office/drawing/2010/main" w="9525">
+                <a14:hiddenLine xmlns:a14="http://schemas.microsoft.com/office/drawing/2010/main" xmlns="" w="9525">
                   <a:solidFill>
                     <a:srgbClr val="000000"/>
                   </a:solidFill>
@@ -3620,7 +3629,7 @@
             </a:ln>
             <a:extLst>
               <a:ext uri="{91240B29-F687-4f45-9708-019B960494DF}">
-                <a14:hiddenLine xmlns="" xmlns:a14="http://schemas.microsoft.com/office/drawing/2010/main" w="9525">
+                <a14:hiddenLine xmlns:a14="http://schemas.microsoft.com/office/drawing/2010/main" xmlns="" w="9525">
                   <a:solidFill>
                     <a:srgbClr val="000000"/>
                   </a:solidFill>
@@ -3685,7 +3694,7 @@
             </a:ln>
             <a:extLst>
               <a:ext uri="{91240B29-F687-4f45-9708-019B960494DF}">
-                <a14:hiddenLine xmlns="" xmlns:a14="http://schemas.microsoft.com/office/drawing/2010/main" w="9525">
+                <a14:hiddenLine xmlns:a14="http://schemas.microsoft.com/office/drawing/2010/main" xmlns="" w="9525">
                   <a:solidFill>
                     <a:srgbClr val="000000"/>
                   </a:solidFill>
@@ -3747,7 +3756,7 @@
             </a:ln>
             <a:extLst>
               <a:ext uri="{91240B29-F687-4f45-9708-019B960494DF}">
-                <a14:hiddenLine xmlns="" xmlns:a14="http://schemas.microsoft.com/office/drawing/2010/main" w="9525">
+                <a14:hiddenLine xmlns:a14="http://schemas.microsoft.com/office/drawing/2010/main" xmlns="" w="9525">
                   <a:solidFill>
                     <a:srgbClr val="000000"/>
                   </a:solidFill>
@@ -3837,7 +3846,7 @@
             </a:ln>
             <a:extLst>
               <a:ext uri="{91240B29-F687-4f45-9708-019B960494DF}">
-                <a14:hiddenLine xmlns="" xmlns:a14="http://schemas.microsoft.com/office/drawing/2010/main" w="9525">
+                <a14:hiddenLine xmlns:a14="http://schemas.microsoft.com/office/drawing/2010/main" xmlns="" w="9525">
                   <a:solidFill>
                     <a:srgbClr val="000000"/>
                   </a:solidFill>
@@ -3927,7 +3936,7 @@
             </a:ln>
             <a:extLst>
               <a:ext uri="{91240B29-F687-4f45-9708-019B960494DF}">
-                <a14:hiddenLine xmlns="" xmlns:a14="http://schemas.microsoft.com/office/drawing/2010/main" w="9525">
+                <a14:hiddenLine xmlns:a14="http://schemas.microsoft.com/office/drawing/2010/main" xmlns="" w="9525">
                   <a:solidFill>
                     <a:srgbClr val="000000"/>
                   </a:solidFill>
@@ -3989,7 +3998,7 @@
             </a:ln>
             <a:extLst>
               <a:ext uri="{91240B29-F687-4f45-9708-019B960494DF}">
-                <a14:hiddenLine xmlns="" xmlns:a14="http://schemas.microsoft.com/office/drawing/2010/main" w="9525">
+                <a14:hiddenLine xmlns:a14="http://schemas.microsoft.com/office/drawing/2010/main" xmlns="" w="9525">
                   <a:solidFill>
                     <a:srgbClr val="000000"/>
                   </a:solidFill>
@@ -4109,7 +4118,7 @@
             </a:ln>
             <a:extLst>
               <a:ext uri="{91240B29-F687-4f45-9708-019B960494DF}">
-                <a14:hiddenLine xmlns="" xmlns:a14="http://schemas.microsoft.com/office/drawing/2010/main" w="9525">
+                <a14:hiddenLine xmlns:a14="http://schemas.microsoft.com/office/drawing/2010/main" xmlns="" w="9525">
                   <a:solidFill>
                     <a:srgbClr val="000000"/>
                   </a:solidFill>
@@ -4177,7 +4186,7 @@
             </a:ln>
             <a:extLst>
               <a:ext uri="{91240B29-F687-4f45-9708-019B960494DF}">
-                <a14:hiddenLine xmlns="" xmlns:a14="http://schemas.microsoft.com/office/drawing/2010/main" w="9525">
+                <a14:hiddenLine xmlns:a14="http://schemas.microsoft.com/office/drawing/2010/main" xmlns="" w="9525">
                   <a:solidFill>
                     <a:srgbClr val="000000"/>
                   </a:solidFill>
@@ -4267,7 +4276,7 @@
             </a:ln>
             <a:extLst>
               <a:ext uri="{91240B29-F687-4f45-9708-019B960494DF}">
-                <a14:hiddenLine xmlns="" xmlns:a14="http://schemas.microsoft.com/office/drawing/2010/main" w="9525">
+                <a14:hiddenLine xmlns:a14="http://schemas.microsoft.com/office/drawing/2010/main" xmlns="" w="9525">
                   <a:solidFill>
                     <a:srgbClr val="000000"/>
                   </a:solidFill>
@@ -4407,7 +4416,7 @@
           <a:p>
             <a:fld id="{48A87A34-81AB-432B-8DAE-1953F412C126}" type="datetimeFigureOut">
               <a:rPr lang="en-US" dirty="0"/>
-              <a:t>3/25/18</a:t>
+              <a:t>3/28/18</a:t>
             </a:fld>
             <a:endParaRPr lang="en-US" dirty="0"/>
           </a:p>
@@ -4669,7 +4678,7 @@
           <a:p>
             <a:fld id="{48A87A34-81AB-432B-8DAE-1953F412C126}" type="datetimeFigureOut">
               <a:rPr lang="en-US" dirty="0"/>
-              <a:t>3/25/18</a:t>
+              <a:t>3/28/18</a:t>
             </a:fld>
             <a:endParaRPr lang="en-US" dirty="0"/>
           </a:p>
@@ -4860,7 +4869,7 @@
           <a:p>
             <a:fld id="{48A87A34-81AB-432B-8DAE-1953F412C126}" type="datetimeFigureOut">
               <a:rPr lang="en-US" dirty="0"/>
-              <a:t>3/25/18</a:t>
+              <a:t>3/28/18</a:t>
             </a:fld>
             <a:endParaRPr lang="en-US" dirty="0"/>
           </a:p>
@@ -5118,7 +5127,7 @@
           <a:p>
             <a:fld id="{48A87A34-81AB-432B-8DAE-1953F412C126}" type="datetimeFigureOut">
               <a:rPr lang="en-US" dirty="0"/>
-              <a:t>3/25/18</a:t>
+              <a:t>3/28/18</a:t>
             </a:fld>
             <a:endParaRPr lang="en-US" dirty="0"/>
           </a:p>
@@ -5547,7 +5556,7 @@
           <a:p>
             <a:fld id="{48A87A34-81AB-432B-8DAE-1953F412C126}" type="datetimeFigureOut">
               <a:rPr lang="en-US" dirty="0"/>
-              <a:t>3/25/18</a:t>
+              <a:t>3/28/18</a:t>
             </a:fld>
             <a:endParaRPr lang="en-US" dirty="0"/>
           </a:p>
@@ -6088,7 +6097,7 @@
           <a:p>
             <a:fld id="{48A87A34-81AB-432B-8DAE-1953F412C126}" type="datetimeFigureOut">
               <a:rPr lang="en-US" dirty="0"/>
-              <a:t>3/25/18</a:t>
+              <a:t>3/28/18</a:t>
             </a:fld>
             <a:endParaRPr lang="en-US" dirty="0"/>
           </a:p>
@@ -6803,7 +6812,7 @@
           <a:p>
             <a:fld id="{48A87A34-81AB-432B-8DAE-1953F412C126}" type="datetimeFigureOut">
               <a:rPr lang="en-US" dirty="0"/>
-              <a:t>3/25/18</a:t>
+              <a:t>3/28/18</a:t>
             </a:fld>
             <a:endParaRPr lang="en-US" dirty="0"/>
           </a:p>
@@ -6968,7 +6977,7 @@
           <a:p>
             <a:fld id="{48A87A34-81AB-432B-8DAE-1953F412C126}" type="datetimeFigureOut">
               <a:rPr lang="en-US" dirty="0"/>
-              <a:t>3/25/18</a:t>
+              <a:t>3/28/18</a:t>
             </a:fld>
             <a:endParaRPr lang="en-US" dirty="0"/>
           </a:p>
@@ -7143,7 +7152,7 @@
           <a:p>
             <a:fld id="{48A87A34-81AB-432B-8DAE-1953F412C126}" type="datetimeFigureOut">
               <a:rPr lang="en-US" dirty="0"/>
-              <a:t>3/25/18</a:t>
+              <a:t>3/28/18</a:t>
             </a:fld>
             <a:endParaRPr lang="en-US" dirty="0"/>
           </a:p>
@@ -7308,7 +7317,7 @@
           <a:p>
             <a:fld id="{48A87A34-81AB-432B-8DAE-1953F412C126}" type="datetimeFigureOut">
               <a:rPr lang="en-US" dirty="0"/>
-              <a:t>3/25/18</a:t>
+              <a:t>3/28/18</a:t>
             </a:fld>
             <a:endParaRPr lang="en-US" dirty="0"/>
           </a:p>
@@ -7553,7 +7562,7 @@
           <a:p>
             <a:fld id="{48A87A34-81AB-432B-8DAE-1953F412C126}" type="datetimeFigureOut">
               <a:rPr lang="en-US" dirty="0"/>
-              <a:t>3/25/18</a:t>
+              <a:t>3/28/18</a:t>
             </a:fld>
             <a:endParaRPr lang="en-US" dirty="0"/>
           </a:p>
@@ -7780,7 +7789,7 @@
           <a:p>
             <a:fld id="{48A87A34-81AB-432B-8DAE-1953F412C126}" type="datetimeFigureOut">
               <a:rPr lang="en-US" dirty="0"/>
-              <a:t>3/25/18</a:t>
+              <a:t>3/28/18</a:t>
             </a:fld>
             <a:endParaRPr lang="en-US" dirty="0"/>
           </a:p>
@@ -8156,7 +8165,7 @@
           <a:p>
             <a:fld id="{48A87A34-81AB-432B-8DAE-1953F412C126}" type="datetimeFigureOut">
               <a:rPr lang="en-US" dirty="0"/>
-              <a:t>3/25/18</a:t>
+              <a:t>3/28/18</a:t>
             </a:fld>
             <a:endParaRPr lang="en-US" dirty="0"/>
           </a:p>
@@ -8269,7 +8278,7 @@
           <a:p>
             <a:fld id="{48A87A34-81AB-432B-8DAE-1953F412C126}" type="datetimeFigureOut">
               <a:rPr lang="en-US" dirty="0"/>
-              <a:t>3/25/18</a:t>
+              <a:t>3/28/18</a:t>
             </a:fld>
             <a:endParaRPr lang="en-US" dirty="0"/>
           </a:p>
@@ -8359,7 +8368,7 @@
           <a:p>
             <a:fld id="{48A87A34-81AB-432B-8DAE-1953F412C126}" type="datetimeFigureOut">
               <a:rPr lang="en-US" dirty="0"/>
-              <a:t>3/25/18</a:t>
+              <a:t>3/28/18</a:t>
             </a:fld>
             <a:endParaRPr lang="en-US" dirty="0"/>
           </a:p>
@@ -8603,7 +8612,7 @@
           <a:p>
             <a:fld id="{48A87A34-81AB-432B-8DAE-1953F412C126}" type="datetimeFigureOut">
               <a:rPr lang="en-US" dirty="0"/>
-              <a:t>3/25/18</a:t>
+              <a:t>3/28/18</a:t>
             </a:fld>
             <a:endParaRPr lang="en-US" dirty="0"/>
           </a:p>
@@ -8878,7 +8887,7 @@
           <a:p>
             <a:fld id="{48A87A34-81AB-432B-8DAE-1953F412C126}" type="datetimeFigureOut">
               <a:rPr lang="en-US" dirty="0"/>
-              <a:t>3/25/18</a:t>
+              <a:t>3/28/18</a:t>
             </a:fld>
             <a:endParaRPr lang="en-US" dirty="0"/>
           </a:p>
@@ -8989,7 +8998,7 @@
           <a:noFill/>
           <a:extLst>
             <a:ext uri="{909E8E84-426E-40dd-AFC4-6F175D3DCCD1}">
-              <a14:hiddenFill xmlns="" xmlns:a14="http://schemas.microsoft.com/office/drawing/2010/main">
+              <a14:hiddenFill xmlns:a14="http://schemas.microsoft.com/office/drawing/2010/main" xmlns="">
                 <a:solidFill>
                   <a:srgbClr val="FFFFFF"/>
                 </a:solidFill>
@@ -9063,7 +9072,7 @@
               </a:ln>
               <a:extLst>
                 <a:ext uri="{91240B29-F687-4f45-9708-019B960494DF}">
-                  <a14:hiddenLine xmlns="" xmlns:a14="http://schemas.microsoft.com/office/drawing/2010/main" w="9525">
+                  <a14:hiddenLine xmlns:a14="http://schemas.microsoft.com/office/drawing/2010/main" xmlns="" w="9525">
                     <a:solidFill>
                       <a:srgbClr val="000000"/>
                     </a:solidFill>
@@ -9153,7 +9162,7 @@
               </a:ln>
               <a:extLst>
                 <a:ext uri="{91240B29-F687-4f45-9708-019B960494DF}">
-                  <a14:hiddenLine xmlns="" xmlns:a14="http://schemas.microsoft.com/office/drawing/2010/main" w="9525">
+                  <a14:hiddenLine xmlns:a14="http://schemas.microsoft.com/office/drawing/2010/main" xmlns="" w="9525">
                     <a:solidFill>
                       <a:srgbClr val="000000"/>
                     </a:solidFill>
@@ -9243,7 +9252,7 @@
               </a:ln>
               <a:extLst>
                 <a:ext uri="{91240B29-F687-4f45-9708-019B960494DF}">
-                  <a14:hiddenLine xmlns="" xmlns:a14="http://schemas.microsoft.com/office/drawing/2010/main" w="9525">
+                  <a14:hiddenLine xmlns:a14="http://schemas.microsoft.com/office/drawing/2010/main" xmlns="" w="9525">
                     <a:solidFill>
                       <a:srgbClr val="000000"/>
                     </a:solidFill>
@@ -9305,7 +9314,7 @@
               </a:ln>
               <a:extLst>
                 <a:ext uri="{91240B29-F687-4f45-9708-019B960494DF}">
-                  <a14:hiddenLine xmlns="" xmlns:a14="http://schemas.microsoft.com/office/drawing/2010/main" w="9525">
+                  <a14:hiddenLine xmlns:a14="http://schemas.microsoft.com/office/drawing/2010/main" xmlns="" w="9525">
                     <a:solidFill>
                       <a:srgbClr val="000000"/>
                     </a:solidFill>
@@ -9395,7 +9404,7 @@
               </a:ln>
               <a:extLst>
                 <a:ext uri="{91240B29-F687-4f45-9708-019B960494DF}">
-                  <a14:hiddenLine xmlns="" xmlns:a14="http://schemas.microsoft.com/office/drawing/2010/main" w="9525">
+                  <a14:hiddenLine xmlns:a14="http://schemas.microsoft.com/office/drawing/2010/main" xmlns="" w="9525">
                     <a:solidFill>
                       <a:srgbClr val="000000"/>
                     </a:solidFill>
@@ -9457,7 +9466,7 @@
               </a:ln>
               <a:extLst>
                 <a:ext uri="{91240B29-F687-4f45-9708-019B960494DF}">
-                  <a14:hiddenLine xmlns="" xmlns:a14="http://schemas.microsoft.com/office/drawing/2010/main" w="9525">
+                  <a14:hiddenLine xmlns:a14="http://schemas.microsoft.com/office/drawing/2010/main" xmlns="" w="9525">
                     <a:solidFill>
                       <a:srgbClr val="000000"/>
                     </a:solidFill>
@@ -9519,7 +9528,7 @@
               </a:ln>
               <a:extLst>
                 <a:ext uri="{91240B29-F687-4f45-9708-019B960494DF}">
-                  <a14:hiddenLine xmlns="" xmlns:a14="http://schemas.microsoft.com/office/drawing/2010/main" w="9525">
+                  <a14:hiddenLine xmlns:a14="http://schemas.microsoft.com/office/drawing/2010/main" xmlns="" w="9525">
                     <a:solidFill>
                       <a:srgbClr val="000000"/>
                     </a:solidFill>
@@ -9609,7 +9618,7 @@
               </a:ln>
               <a:extLst>
                 <a:ext uri="{91240B29-F687-4f45-9708-019B960494DF}">
-                  <a14:hiddenLine xmlns="" xmlns:a14="http://schemas.microsoft.com/office/drawing/2010/main" w="9525">
+                  <a14:hiddenLine xmlns:a14="http://schemas.microsoft.com/office/drawing/2010/main" xmlns="" w="9525">
                     <a:solidFill>
                       <a:srgbClr val="000000"/>
                     </a:solidFill>
@@ -9699,7 +9708,7 @@
               </a:ln>
               <a:extLst>
                 <a:ext uri="{91240B29-F687-4f45-9708-019B960494DF}">
-                  <a14:hiddenLine xmlns="" xmlns:a14="http://schemas.microsoft.com/office/drawing/2010/main" w="9525">
+                  <a14:hiddenLine xmlns:a14="http://schemas.microsoft.com/office/drawing/2010/main" xmlns="" w="9525">
                     <a:solidFill>
                       <a:srgbClr val="000000"/>
                     </a:solidFill>
@@ -9761,7 +9770,7 @@
               </a:ln>
               <a:extLst>
                 <a:ext uri="{91240B29-F687-4f45-9708-019B960494DF}">
-                  <a14:hiddenLine xmlns="" xmlns:a14="http://schemas.microsoft.com/office/drawing/2010/main" w="9525">
+                  <a14:hiddenLine xmlns:a14="http://schemas.microsoft.com/office/drawing/2010/main" xmlns="" w="9525">
                     <a:solidFill>
                       <a:srgbClr val="000000"/>
                     </a:solidFill>
@@ -9871,7 +9880,7 @@
               </a:ln>
               <a:extLst>
                 <a:ext uri="{91240B29-F687-4f45-9708-019B960494DF}">
-                  <a14:hiddenLine xmlns="" xmlns:a14="http://schemas.microsoft.com/office/drawing/2010/main" w="9525">
+                  <a14:hiddenLine xmlns:a14="http://schemas.microsoft.com/office/drawing/2010/main" xmlns="" w="9525">
                     <a:solidFill>
                       <a:srgbClr val="000000"/>
                     </a:solidFill>
@@ -9955,7 +9964,7 @@
               </a:ln>
               <a:extLst>
                 <a:ext uri="{91240B29-F687-4f45-9708-019B960494DF}">
-                  <a14:hiddenLine xmlns="" xmlns:a14="http://schemas.microsoft.com/office/drawing/2010/main" w="9525">
+                  <a14:hiddenLine xmlns:a14="http://schemas.microsoft.com/office/drawing/2010/main" xmlns="" w="9525">
                     <a:solidFill>
                       <a:srgbClr val="000000"/>
                     </a:solidFill>
@@ -10017,7 +10026,7 @@
               </a:ln>
               <a:extLst>
                 <a:ext uri="{91240B29-F687-4f45-9708-019B960494DF}">
-                  <a14:hiddenLine xmlns="" xmlns:a14="http://schemas.microsoft.com/office/drawing/2010/main" w="9525">
+                  <a14:hiddenLine xmlns:a14="http://schemas.microsoft.com/office/drawing/2010/main" xmlns="" w="9525">
                     <a:solidFill>
                       <a:srgbClr val="000000"/>
                     </a:solidFill>
@@ -10079,7 +10088,7 @@
               </a:ln>
               <a:extLst>
                 <a:ext uri="{91240B29-F687-4f45-9708-019B960494DF}">
-                  <a14:hiddenLine xmlns="" xmlns:a14="http://schemas.microsoft.com/office/drawing/2010/main" w="9525">
+                  <a14:hiddenLine xmlns:a14="http://schemas.microsoft.com/office/drawing/2010/main" xmlns="" w="9525">
                     <a:solidFill>
                       <a:srgbClr val="000000"/>
                     </a:solidFill>
@@ -10169,7 +10178,7 @@
               </a:ln>
               <a:extLst>
                 <a:ext uri="{91240B29-F687-4f45-9708-019B960494DF}">
-                  <a14:hiddenLine xmlns="" xmlns:a14="http://schemas.microsoft.com/office/drawing/2010/main" w="9525">
+                  <a14:hiddenLine xmlns:a14="http://schemas.microsoft.com/office/drawing/2010/main" xmlns="" w="9525">
                     <a:solidFill>
                       <a:srgbClr val="000000"/>
                     </a:solidFill>
@@ -10203,7 +10212,7 @@
               </a:ln>
               <a:extLst>
                 <a:ext uri="{91240B29-F687-4f45-9708-019B960494DF}">
-                  <a14:hiddenLine xmlns="" xmlns:a14="http://schemas.microsoft.com/office/drawing/2010/main" w="9525">
+                  <a14:hiddenLine xmlns:a14="http://schemas.microsoft.com/office/drawing/2010/main" xmlns="" w="9525">
                     <a:solidFill>
                       <a:srgbClr val="000000"/>
                     </a:solidFill>
@@ -10268,7 +10277,7 @@
               </a:ln>
               <a:extLst>
                 <a:ext uri="{91240B29-F687-4f45-9708-019B960494DF}">
-                  <a14:hiddenLine xmlns="" xmlns:a14="http://schemas.microsoft.com/office/drawing/2010/main" w="9525">
+                  <a14:hiddenLine xmlns:a14="http://schemas.microsoft.com/office/drawing/2010/main" xmlns="" w="9525">
                     <a:solidFill>
                       <a:srgbClr val="000000"/>
                     </a:solidFill>
@@ -10358,7 +10367,7 @@
               </a:ln>
               <a:extLst>
                 <a:ext uri="{91240B29-F687-4f45-9708-019B960494DF}">
-                  <a14:hiddenLine xmlns="" xmlns:a14="http://schemas.microsoft.com/office/drawing/2010/main" w="9525">
+                  <a14:hiddenLine xmlns:a14="http://schemas.microsoft.com/office/drawing/2010/main" xmlns="" w="9525">
                     <a:solidFill>
                       <a:srgbClr val="000000"/>
                     </a:solidFill>
@@ -10420,7 +10429,7 @@
               </a:ln>
               <a:extLst>
                 <a:ext uri="{91240B29-F687-4f45-9708-019B960494DF}">
-                  <a14:hiddenLine xmlns="" xmlns:a14="http://schemas.microsoft.com/office/drawing/2010/main" w="9525">
+                  <a14:hiddenLine xmlns:a14="http://schemas.microsoft.com/office/drawing/2010/main" xmlns="" w="9525">
                     <a:solidFill>
                       <a:srgbClr val="000000"/>
                     </a:solidFill>
@@ -10510,7 +10519,7 @@
               </a:ln>
               <a:extLst>
                 <a:ext uri="{91240B29-F687-4f45-9708-019B960494DF}">
-                  <a14:hiddenLine xmlns="" xmlns:a14="http://schemas.microsoft.com/office/drawing/2010/main" w="9525">
+                  <a14:hiddenLine xmlns:a14="http://schemas.microsoft.com/office/drawing/2010/main" xmlns="" w="9525">
                     <a:solidFill>
                       <a:srgbClr val="000000"/>
                     </a:solidFill>
@@ -10575,7 +10584,7 @@
               </a:ln>
               <a:extLst>
                 <a:ext uri="{91240B29-F687-4f45-9708-019B960494DF}">
-                  <a14:hiddenLine xmlns="" xmlns:a14="http://schemas.microsoft.com/office/drawing/2010/main" w="9525">
+                  <a14:hiddenLine xmlns:a14="http://schemas.microsoft.com/office/drawing/2010/main" xmlns="" w="9525">
                     <a:solidFill>
                       <a:srgbClr val="000000"/>
                     </a:solidFill>
@@ -10637,7 +10646,7 @@
               </a:ln>
               <a:extLst>
                 <a:ext uri="{91240B29-F687-4f45-9708-019B960494DF}">
-                  <a14:hiddenLine xmlns="" xmlns:a14="http://schemas.microsoft.com/office/drawing/2010/main" w="9525">
+                  <a14:hiddenLine xmlns:a14="http://schemas.microsoft.com/office/drawing/2010/main" xmlns="" w="9525">
                     <a:solidFill>
                       <a:srgbClr val="000000"/>
                     </a:solidFill>
@@ -10727,7 +10736,7 @@
               </a:ln>
               <a:extLst>
                 <a:ext uri="{91240B29-F687-4f45-9708-019B960494DF}">
-                  <a14:hiddenLine xmlns="" xmlns:a14="http://schemas.microsoft.com/office/drawing/2010/main" w="9525">
+                  <a14:hiddenLine xmlns:a14="http://schemas.microsoft.com/office/drawing/2010/main" xmlns="" w="9525">
                     <a:solidFill>
                       <a:srgbClr val="000000"/>
                     </a:solidFill>
@@ -10817,7 +10826,7 @@
               </a:ln>
               <a:extLst>
                 <a:ext uri="{91240B29-F687-4f45-9708-019B960494DF}">
-                  <a14:hiddenLine xmlns="" xmlns:a14="http://schemas.microsoft.com/office/drawing/2010/main" w="9525">
+                  <a14:hiddenLine xmlns:a14="http://schemas.microsoft.com/office/drawing/2010/main" xmlns="" w="9525">
                     <a:solidFill>
                       <a:srgbClr val="000000"/>
                     </a:solidFill>
@@ -10882,7 +10891,7 @@
               </a:ln>
               <a:extLst>
                 <a:ext uri="{91240B29-F687-4f45-9708-019B960494DF}">
-                  <a14:hiddenLine xmlns="" xmlns:a14="http://schemas.microsoft.com/office/drawing/2010/main" w="9525">
+                  <a14:hiddenLine xmlns:a14="http://schemas.microsoft.com/office/drawing/2010/main" xmlns="" w="9525">
                     <a:solidFill>
                       <a:srgbClr val="000000"/>
                     </a:solidFill>
@@ -11002,7 +11011,7 @@
               </a:ln>
               <a:extLst>
                 <a:ext uri="{91240B29-F687-4f45-9708-019B960494DF}">
-                  <a14:hiddenLine xmlns="" xmlns:a14="http://schemas.microsoft.com/office/drawing/2010/main" w="9525">
+                  <a14:hiddenLine xmlns:a14="http://schemas.microsoft.com/office/drawing/2010/main" xmlns="" w="9525">
                     <a:solidFill>
                       <a:srgbClr val="000000"/>
                     </a:solidFill>
@@ -11100,7 +11109,7 @@
               </a:ln>
               <a:extLst>
                 <a:ext uri="{91240B29-F687-4f45-9708-019B960494DF}">
-                  <a14:hiddenLine xmlns="" xmlns:a14="http://schemas.microsoft.com/office/drawing/2010/main" w="9525">
+                  <a14:hiddenLine xmlns:a14="http://schemas.microsoft.com/office/drawing/2010/main" xmlns="" w="9525">
                     <a:solidFill>
                       <a:srgbClr val="000000"/>
                     </a:solidFill>
@@ -11215,7 +11224,7 @@
               </a:ln>
               <a:extLst>
                 <a:ext uri="{91240B29-F687-4f45-9708-019B960494DF}">
-                  <a14:hiddenLine xmlns="" xmlns:a14="http://schemas.microsoft.com/office/drawing/2010/main" w="9525">
+                  <a14:hiddenLine xmlns:a14="http://schemas.microsoft.com/office/drawing/2010/main" xmlns="" w="9525">
                     <a:solidFill>
                       <a:srgbClr val="000000"/>
                     </a:solidFill>
@@ -11305,7 +11314,7 @@
               </a:ln>
               <a:extLst>
                 <a:ext uri="{91240B29-F687-4f45-9708-019B960494DF}">
-                  <a14:hiddenLine xmlns="" xmlns:a14="http://schemas.microsoft.com/office/drawing/2010/main" w="9525">
+                  <a14:hiddenLine xmlns:a14="http://schemas.microsoft.com/office/drawing/2010/main" xmlns="" w="9525">
                     <a:solidFill>
                       <a:srgbClr val="000000"/>
                     </a:solidFill>
@@ -11370,7 +11379,7 @@
               </a:ln>
               <a:extLst>
                 <a:ext uri="{91240B29-F687-4f45-9708-019B960494DF}">
-                  <a14:hiddenLine xmlns="" xmlns:a14="http://schemas.microsoft.com/office/drawing/2010/main" w="9525">
+                  <a14:hiddenLine xmlns:a14="http://schemas.microsoft.com/office/drawing/2010/main" xmlns="" w="9525">
                     <a:solidFill>
                       <a:srgbClr val="000000"/>
                     </a:solidFill>
@@ -11460,7 +11469,7 @@
               </a:ln>
               <a:extLst>
                 <a:ext uri="{91240B29-F687-4f45-9708-019B960494DF}">
-                  <a14:hiddenLine xmlns="" xmlns:a14="http://schemas.microsoft.com/office/drawing/2010/main" w="9525">
+                  <a14:hiddenLine xmlns:a14="http://schemas.microsoft.com/office/drawing/2010/main" xmlns="" w="9525">
                     <a:solidFill>
                       <a:srgbClr val="000000"/>
                     </a:solidFill>
@@ -11528,7 +11537,7 @@
               </a:ln>
               <a:extLst>
                 <a:ext uri="{91240B29-F687-4f45-9708-019B960494DF}">
-                  <a14:hiddenLine xmlns="" xmlns:a14="http://schemas.microsoft.com/office/drawing/2010/main" w="9525">
+                  <a14:hiddenLine xmlns:a14="http://schemas.microsoft.com/office/drawing/2010/main" xmlns="" w="9525">
                     <a:solidFill>
                       <a:srgbClr val="000000"/>
                     </a:solidFill>
@@ -11618,7 +11627,7 @@
               </a:ln>
               <a:extLst>
                 <a:ext uri="{91240B29-F687-4f45-9708-019B960494DF}">
-                  <a14:hiddenLine xmlns="" xmlns:a14="http://schemas.microsoft.com/office/drawing/2010/main" w="9525">
+                  <a14:hiddenLine xmlns:a14="http://schemas.microsoft.com/office/drawing/2010/main" xmlns="" w="9525">
                     <a:solidFill>
                       <a:srgbClr val="000000"/>
                     </a:solidFill>
@@ -11686,7 +11695,7 @@
               </a:ln>
               <a:extLst>
                 <a:ext uri="{91240B29-F687-4f45-9708-019B960494DF}">
-                  <a14:hiddenLine xmlns="" xmlns:a14="http://schemas.microsoft.com/office/drawing/2010/main" w="9525">
+                  <a14:hiddenLine xmlns:a14="http://schemas.microsoft.com/office/drawing/2010/main" xmlns="" w="9525">
                     <a:solidFill>
                       <a:srgbClr val="000000"/>
                     </a:solidFill>
@@ -11776,7 +11785,7 @@
               </a:ln>
               <a:extLst>
                 <a:ext uri="{91240B29-F687-4f45-9708-019B960494DF}">
-                  <a14:hiddenLine xmlns="" xmlns:a14="http://schemas.microsoft.com/office/drawing/2010/main" w="9525">
+                  <a14:hiddenLine xmlns:a14="http://schemas.microsoft.com/office/drawing/2010/main" xmlns="" w="9525">
                     <a:solidFill>
                       <a:srgbClr val="000000"/>
                     </a:solidFill>
@@ -11810,7 +11819,7 @@
               </a:ln>
               <a:extLst>
                 <a:ext uri="{91240B29-F687-4f45-9708-019B960494DF}">
-                  <a14:hiddenLine xmlns="" xmlns:a14="http://schemas.microsoft.com/office/drawing/2010/main" w="9525">
+                  <a14:hiddenLine xmlns:a14="http://schemas.microsoft.com/office/drawing/2010/main" xmlns="" w="9525">
                     <a:solidFill>
                       <a:srgbClr val="000000"/>
                     </a:solidFill>
@@ -11951,7 +11960,7 @@
             <a:fld id="{48A87A34-81AB-432B-8DAE-1953F412C126}" type="datetimeFigureOut">
               <a:rPr lang="en-US" dirty="0"/>
               <a:pPr/>
-              <a:t>3/25/18</a:t>
+              <a:t>3/28/18</a:t>
             </a:fld>
             <a:endParaRPr lang="en-US" dirty="0"/>
           </a:p>
@@ -12440,6 +12449,816 @@
 </p:sld>
 </file>
 
+<file path=ppt/slides/slide10.xml><?xml version="1.0" encoding="utf-8"?>
+<p:sld xmlns:a="http://schemas.openxmlformats.org/drawingml/2006/main" xmlns:r="http://schemas.openxmlformats.org/officeDocument/2006/relationships" xmlns:p="http://schemas.openxmlformats.org/presentationml/2006/main">
+  <p:cSld>
+    <p:spTree>
+      <p:nvGrpSpPr>
+        <p:cNvPr id="1" name=""/>
+        <p:cNvGrpSpPr/>
+        <p:nvPr/>
+      </p:nvGrpSpPr>
+      <p:grpSpPr>
+        <a:xfrm>
+          <a:off x="0" y="0"/>
+          <a:ext cx="0" cy="0"/>
+          <a:chOff x="0" y="0"/>
+          <a:chExt cx="0" cy="0"/>
+        </a:xfrm>
+      </p:grpSpPr>
+      <p:sp>
+        <p:nvSpPr>
+          <p:cNvPr id="2" name="제목 1">
+            <a:extLst>
+              <a:ext uri="{FF2B5EF4-FFF2-40B4-BE49-F238E27FC236}">
+                <a16:creationId xmlns:a16="http://schemas.microsoft.com/office/drawing/2014/main" id="{E0929843-8100-8F4F-8D0A-7852F595CF9A}"/>
+              </a:ext>
+            </a:extLst>
+          </p:cNvPr>
+          <p:cNvSpPr>
+            <a:spLocks noGrp="1"/>
+          </p:cNvSpPr>
+          <p:nvPr>
+            <p:ph type="title"/>
+          </p:nvPr>
+        </p:nvSpPr>
+        <p:spPr/>
+        <p:txBody>
+          <a:bodyPr/>
+          <a:lstStyle/>
+          <a:p>
+            <a:r>
+              <a:rPr kumimoji="1" lang="en-US" altLang="ko-KR" dirty="0"/>
+              <a:t>Various office 365 services - Yammer</a:t>
+            </a:r>
+            <a:endParaRPr kumimoji="1" lang="ko-KR" altLang="en-US" dirty="0"/>
+          </a:p>
+        </p:txBody>
+      </p:sp>
+      <p:pic>
+        <p:nvPicPr>
+          <p:cNvPr id="6" name="내용 개체 틀 5">
+            <a:extLst>
+              <a:ext uri="{FF2B5EF4-FFF2-40B4-BE49-F238E27FC236}">
+                <a16:creationId xmlns:a16="http://schemas.microsoft.com/office/drawing/2014/main" id="{5F0D2A3C-CB7F-3748-892D-5B61EC845E5F}"/>
+              </a:ext>
+            </a:extLst>
+          </p:cNvPr>
+          <p:cNvPicPr>
+            <a:picLocks noGrp="1" noChangeAspect="1"/>
+          </p:cNvPicPr>
+          <p:nvPr>
+            <p:ph idx="1"/>
+          </p:nvPr>
+        </p:nvPicPr>
+        <p:blipFill>
+          <a:blip r:embed="rId2"/>
+          <a:stretch>
+            <a:fillRect/>
+          </a:stretch>
+        </p:blipFill>
+        <p:spPr>
+          <a:xfrm>
+            <a:off x="872358" y="1639615"/>
+            <a:ext cx="9583695" cy="5231100"/>
+          </a:xfrm>
+        </p:spPr>
+      </p:pic>
+    </p:spTree>
+    <p:extLst>
+      <p:ext uri="{BB962C8B-B14F-4D97-AF65-F5344CB8AC3E}">
+        <p14:creationId xmlns:p14="http://schemas.microsoft.com/office/powerpoint/2010/main" val="1516585045"/>
+      </p:ext>
+    </p:extLst>
+  </p:cSld>
+  <p:clrMapOvr>
+    <a:masterClrMapping/>
+  </p:clrMapOvr>
+</p:sld>
+</file>
+
+<file path=ppt/slides/slide11.xml><?xml version="1.0" encoding="utf-8"?>
+<p:sld xmlns:a="http://schemas.openxmlformats.org/drawingml/2006/main" xmlns:r="http://schemas.openxmlformats.org/officeDocument/2006/relationships" xmlns:p="http://schemas.openxmlformats.org/presentationml/2006/main">
+  <p:cSld>
+    <p:spTree>
+      <p:nvGrpSpPr>
+        <p:cNvPr id="1" name=""/>
+        <p:cNvGrpSpPr/>
+        <p:nvPr/>
+      </p:nvGrpSpPr>
+      <p:grpSpPr>
+        <a:xfrm>
+          <a:off x="0" y="0"/>
+          <a:ext cx="0" cy="0"/>
+          <a:chOff x="0" y="0"/>
+          <a:chExt cx="0" cy="0"/>
+        </a:xfrm>
+      </p:grpSpPr>
+      <p:sp>
+        <p:nvSpPr>
+          <p:cNvPr id="2" name="제목 1">
+            <a:extLst>
+              <a:ext uri="{FF2B5EF4-FFF2-40B4-BE49-F238E27FC236}">
+                <a16:creationId xmlns:a16="http://schemas.microsoft.com/office/drawing/2014/main" id="{E70F4F96-788F-DA47-BA01-3FE7006F84A3}"/>
+              </a:ext>
+            </a:extLst>
+          </p:cNvPr>
+          <p:cNvSpPr>
+            <a:spLocks noGrp="1"/>
+          </p:cNvSpPr>
+          <p:nvPr>
+            <p:ph type="title"/>
+          </p:nvPr>
+        </p:nvSpPr>
+        <p:spPr/>
+        <p:txBody>
+          <a:bodyPr/>
+          <a:lstStyle/>
+          <a:p>
+            <a:r>
+              <a:rPr kumimoji="1" lang="en-US" altLang="ko-KR" dirty="0"/>
+              <a:t>Various office 365 service - yammer </a:t>
+            </a:r>
+            <a:endParaRPr kumimoji="1" lang="ko-KR" altLang="en-US" dirty="0"/>
+          </a:p>
+        </p:txBody>
+      </p:sp>
+      <p:sp>
+        <p:nvSpPr>
+          <p:cNvPr id="4" name="내용 개체 틀 3">
+            <a:extLst>
+              <a:ext uri="{FF2B5EF4-FFF2-40B4-BE49-F238E27FC236}">
+                <a16:creationId xmlns:a16="http://schemas.microsoft.com/office/drawing/2014/main" id="{233E9378-9DC7-804B-B344-716A9CF09A75}"/>
+              </a:ext>
+            </a:extLst>
+          </p:cNvPr>
+          <p:cNvSpPr>
+            <a:spLocks noGrp="1"/>
+          </p:cNvSpPr>
+          <p:nvPr>
+            <p:ph idx="1"/>
+          </p:nvPr>
+        </p:nvSpPr>
+        <p:spPr/>
+        <p:txBody>
+          <a:bodyPr/>
+          <a:lstStyle/>
+          <a:p>
+            <a:r>
+              <a:rPr kumimoji="1" lang="en-US" altLang="ko-KR" dirty="0"/>
+              <a:t>Yammer is an communication app that can be used to contact anyone in the school with the school account. </a:t>
+            </a:r>
+          </a:p>
+          <a:p>
+            <a:r>
+              <a:rPr kumimoji="1" lang="en-US" altLang="ko-KR" dirty="0"/>
+              <a:t>Just like any SNS, you can do various things that you want to do.</a:t>
+            </a:r>
+            <a:endParaRPr kumimoji="1" lang="ko-KR" altLang="en-US" dirty="0"/>
+          </a:p>
+        </p:txBody>
+      </p:sp>
+    </p:spTree>
+    <p:extLst>
+      <p:ext uri="{BB962C8B-B14F-4D97-AF65-F5344CB8AC3E}">
+        <p14:creationId xmlns:p14="http://schemas.microsoft.com/office/powerpoint/2010/main" val="2242017102"/>
+      </p:ext>
+    </p:extLst>
+  </p:cSld>
+  <p:clrMapOvr>
+    <a:masterClrMapping/>
+  </p:clrMapOvr>
+</p:sld>
+</file>
+
+<file path=ppt/slides/slide12.xml><?xml version="1.0" encoding="utf-8"?>
+<p:sld xmlns:a="http://schemas.openxmlformats.org/drawingml/2006/main" xmlns:r="http://schemas.openxmlformats.org/officeDocument/2006/relationships" xmlns:p="http://schemas.openxmlformats.org/presentationml/2006/main">
+  <p:cSld>
+    <p:spTree>
+      <p:nvGrpSpPr>
+        <p:cNvPr id="1" name=""/>
+        <p:cNvGrpSpPr/>
+        <p:nvPr/>
+      </p:nvGrpSpPr>
+      <p:grpSpPr>
+        <a:xfrm>
+          <a:off x="0" y="0"/>
+          <a:ext cx="0" cy="0"/>
+          <a:chOff x="0" y="0"/>
+          <a:chExt cx="0" cy="0"/>
+        </a:xfrm>
+      </p:grpSpPr>
+      <p:sp>
+        <p:nvSpPr>
+          <p:cNvPr id="2" name="제목 1">
+            <a:extLst>
+              <a:ext uri="{FF2B5EF4-FFF2-40B4-BE49-F238E27FC236}">
+                <a16:creationId xmlns:a16="http://schemas.microsoft.com/office/drawing/2014/main" id="{D3FC1CA4-3F74-7140-8044-C94B51B1B733}"/>
+              </a:ext>
+            </a:extLst>
+          </p:cNvPr>
+          <p:cNvSpPr>
+            <a:spLocks noGrp="1"/>
+          </p:cNvSpPr>
+          <p:nvPr>
+            <p:ph type="title"/>
+          </p:nvPr>
+        </p:nvSpPr>
+        <p:spPr/>
+        <p:txBody>
+          <a:bodyPr/>
+          <a:lstStyle/>
+          <a:p>
+            <a:r>
+              <a:rPr kumimoji="1" lang="en-US" altLang="ko-KR" dirty="0"/>
+              <a:t>Various office 365 service – Microsoft teams [Currently not accessible]</a:t>
+            </a:r>
+            <a:endParaRPr kumimoji="1" lang="ko-KR" altLang="en-US" dirty="0"/>
+          </a:p>
+        </p:txBody>
+      </p:sp>
+      <p:pic>
+        <p:nvPicPr>
+          <p:cNvPr id="5" name="내용 개체 틀 4">
+            <a:extLst>
+              <a:ext uri="{FF2B5EF4-FFF2-40B4-BE49-F238E27FC236}">
+                <a16:creationId xmlns:a16="http://schemas.microsoft.com/office/drawing/2014/main" id="{91328295-2F25-7E4C-A8FD-9C271F8D2AD3}"/>
+              </a:ext>
+            </a:extLst>
+          </p:cNvPr>
+          <p:cNvPicPr>
+            <a:picLocks noGrp="1" noChangeAspect="1"/>
+          </p:cNvPicPr>
+          <p:nvPr>
+            <p:ph idx="1"/>
+          </p:nvPr>
+        </p:nvPicPr>
+        <p:blipFill>
+          <a:blip r:embed="rId2"/>
+          <a:stretch>
+            <a:fillRect/>
+          </a:stretch>
+        </p:blipFill>
+        <p:spPr>
+          <a:xfrm>
+            <a:off x="1288559" y="1791099"/>
+            <a:ext cx="8801372" cy="5066901"/>
+          </a:xfrm>
+        </p:spPr>
+      </p:pic>
+    </p:spTree>
+    <p:extLst>
+      <p:ext uri="{BB962C8B-B14F-4D97-AF65-F5344CB8AC3E}">
+        <p14:creationId xmlns:p14="http://schemas.microsoft.com/office/powerpoint/2010/main" val="1244804893"/>
+      </p:ext>
+    </p:extLst>
+  </p:cSld>
+  <p:clrMapOvr>
+    <a:masterClrMapping/>
+  </p:clrMapOvr>
+</p:sld>
+</file>
+
+<file path=ppt/slides/slide13.xml><?xml version="1.0" encoding="utf-8"?>
+<p:sld xmlns:a="http://schemas.openxmlformats.org/drawingml/2006/main" xmlns:r="http://schemas.openxmlformats.org/officeDocument/2006/relationships" xmlns:p="http://schemas.openxmlformats.org/presentationml/2006/main">
+  <p:cSld>
+    <p:spTree>
+      <p:nvGrpSpPr>
+        <p:cNvPr id="1" name=""/>
+        <p:cNvGrpSpPr/>
+        <p:nvPr/>
+      </p:nvGrpSpPr>
+      <p:grpSpPr>
+        <a:xfrm>
+          <a:off x="0" y="0"/>
+          <a:ext cx="0" cy="0"/>
+          <a:chOff x="0" y="0"/>
+          <a:chExt cx="0" cy="0"/>
+        </a:xfrm>
+      </p:grpSpPr>
+      <p:sp>
+        <p:nvSpPr>
+          <p:cNvPr id="2" name="제목 1">
+            <a:extLst>
+              <a:ext uri="{FF2B5EF4-FFF2-40B4-BE49-F238E27FC236}">
+                <a16:creationId xmlns:a16="http://schemas.microsoft.com/office/drawing/2014/main" id="{31044B32-9A49-1A41-8513-3CC0F5F53EA3}"/>
+              </a:ext>
+            </a:extLst>
+          </p:cNvPr>
+          <p:cNvSpPr>
+            <a:spLocks noGrp="1"/>
+          </p:cNvSpPr>
+          <p:nvPr>
+            <p:ph type="title"/>
+          </p:nvPr>
+        </p:nvSpPr>
+        <p:spPr/>
+        <p:txBody>
+          <a:bodyPr/>
+          <a:lstStyle/>
+          <a:p>
+            <a:r>
+              <a:rPr kumimoji="1" lang="en-US" altLang="ko-KR" dirty="0"/>
+              <a:t>Various office 365 service - flow</a:t>
+            </a:r>
+            <a:endParaRPr kumimoji="1" lang="ko-KR" altLang="en-US" dirty="0"/>
+          </a:p>
+        </p:txBody>
+      </p:sp>
+      <p:pic>
+        <p:nvPicPr>
+          <p:cNvPr id="5" name="내용 개체 틀 4">
+            <a:extLst>
+              <a:ext uri="{FF2B5EF4-FFF2-40B4-BE49-F238E27FC236}">
+                <a16:creationId xmlns:a16="http://schemas.microsoft.com/office/drawing/2014/main" id="{E67EF34C-6818-5D41-A62C-7044C6C0FF50}"/>
+              </a:ext>
+            </a:extLst>
+          </p:cNvPr>
+          <p:cNvPicPr>
+            <a:picLocks noGrp="1" noChangeAspect="1"/>
+          </p:cNvPicPr>
+          <p:nvPr>
+            <p:ph idx="1"/>
+          </p:nvPr>
+        </p:nvPicPr>
+        <p:blipFill>
+          <a:blip r:embed="rId2"/>
+          <a:stretch>
+            <a:fillRect/>
+          </a:stretch>
+        </p:blipFill>
+        <p:spPr>
+          <a:xfrm>
+            <a:off x="882869" y="1513490"/>
+            <a:ext cx="9827745" cy="5337012"/>
+          </a:xfrm>
+        </p:spPr>
+      </p:pic>
+    </p:spTree>
+    <p:extLst>
+      <p:ext uri="{BB962C8B-B14F-4D97-AF65-F5344CB8AC3E}">
+        <p14:creationId xmlns:p14="http://schemas.microsoft.com/office/powerpoint/2010/main" val="3282916644"/>
+      </p:ext>
+    </p:extLst>
+  </p:cSld>
+  <p:clrMapOvr>
+    <a:masterClrMapping/>
+  </p:clrMapOvr>
+</p:sld>
+</file>
+
+<file path=ppt/slides/slide14.xml><?xml version="1.0" encoding="utf-8"?>
+<p:sld xmlns:a="http://schemas.openxmlformats.org/drawingml/2006/main" xmlns:r="http://schemas.openxmlformats.org/officeDocument/2006/relationships" xmlns:p="http://schemas.openxmlformats.org/presentationml/2006/main">
+  <p:cSld>
+    <p:spTree>
+      <p:nvGrpSpPr>
+        <p:cNvPr id="1" name=""/>
+        <p:cNvGrpSpPr/>
+        <p:nvPr/>
+      </p:nvGrpSpPr>
+      <p:grpSpPr>
+        <a:xfrm>
+          <a:off x="0" y="0"/>
+          <a:ext cx="0" cy="0"/>
+          <a:chOff x="0" y="0"/>
+          <a:chExt cx="0" cy="0"/>
+        </a:xfrm>
+      </p:grpSpPr>
+      <p:sp>
+        <p:nvSpPr>
+          <p:cNvPr id="2" name="제목 1">
+            <a:extLst>
+              <a:ext uri="{FF2B5EF4-FFF2-40B4-BE49-F238E27FC236}">
+                <a16:creationId xmlns:a16="http://schemas.microsoft.com/office/drawing/2014/main" id="{ED24486C-16AF-9148-BD36-774B8B1C0AC8}"/>
+              </a:ext>
+            </a:extLst>
+          </p:cNvPr>
+          <p:cNvSpPr>
+            <a:spLocks noGrp="1"/>
+          </p:cNvSpPr>
+          <p:nvPr>
+            <p:ph type="title"/>
+          </p:nvPr>
+        </p:nvSpPr>
+        <p:spPr/>
+        <p:txBody>
+          <a:bodyPr/>
+          <a:lstStyle/>
+          <a:p>
+            <a:r>
+              <a:rPr kumimoji="1" lang="en-US" altLang="ko-KR" dirty="0"/>
+              <a:t>Various office 365 service - flow</a:t>
+            </a:r>
+            <a:endParaRPr kumimoji="1" lang="ko-KR" altLang="en-US" dirty="0"/>
+          </a:p>
+        </p:txBody>
+      </p:sp>
+      <p:sp>
+        <p:nvSpPr>
+          <p:cNvPr id="3" name="내용 개체 틀 2">
+            <a:extLst>
+              <a:ext uri="{FF2B5EF4-FFF2-40B4-BE49-F238E27FC236}">
+                <a16:creationId xmlns:a16="http://schemas.microsoft.com/office/drawing/2014/main" id="{16C82864-FF24-9A4F-A6E5-68F975E28BB6}"/>
+              </a:ext>
+            </a:extLst>
+          </p:cNvPr>
+          <p:cNvSpPr>
+            <a:spLocks noGrp="1"/>
+          </p:cNvSpPr>
+          <p:nvPr>
+            <p:ph idx="1"/>
+          </p:nvPr>
+        </p:nvSpPr>
+        <p:spPr/>
+        <p:txBody>
+          <a:bodyPr/>
+          <a:lstStyle/>
+          <a:p>
+            <a:r>
+              <a:rPr kumimoji="1" lang="en-US" altLang="ko-KR" dirty="0"/>
+              <a:t>A simple program builder that is based on same system as Scratch. You can build your code and algorithms in this application to apply to any of your program that is related to Microsoft account.</a:t>
+            </a:r>
+            <a:endParaRPr kumimoji="1" lang="ko-KR" altLang="en-US" dirty="0"/>
+          </a:p>
+        </p:txBody>
+      </p:sp>
+    </p:spTree>
+    <p:extLst>
+      <p:ext uri="{BB962C8B-B14F-4D97-AF65-F5344CB8AC3E}">
+        <p14:creationId xmlns:p14="http://schemas.microsoft.com/office/powerpoint/2010/main" val="216198352"/>
+      </p:ext>
+    </p:extLst>
+  </p:cSld>
+  <p:clrMapOvr>
+    <a:masterClrMapping/>
+  </p:clrMapOvr>
+</p:sld>
+</file>
+
+<file path=ppt/slides/slide15.xml><?xml version="1.0" encoding="utf-8"?>
+<p:sld xmlns:a="http://schemas.openxmlformats.org/drawingml/2006/main" xmlns:r="http://schemas.openxmlformats.org/officeDocument/2006/relationships" xmlns:p="http://schemas.openxmlformats.org/presentationml/2006/main">
+  <p:cSld>
+    <p:spTree>
+      <p:nvGrpSpPr>
+        <p:cNvPr id="1" name=""/>
+        <p:cNvGrpSpPr/>
+        <p:nvPr/>
+      </p:nvGrpSpPr>
+      <p:grpSpPr>
+        <a:xfrm>
+          <a:off x="0" y="0"/>
+          <a:ext cx="0" cy="0"/>
+          <a:chOff x="0" y="0"/>
+          <a:chExt cx="0" cy="0"/>
+        </a:xfrm>
+      </p:grpSpPr>
+      <p:sp>
+        <p:nvSpPr>
+          <p:cNvPr id="2" name="제목 1">
+            <a:extLst>
+              <a:ext uri="{FF2B5EF4-FFF2-40B4-BE49-F238E27FC236}">
+                <a16:creationId xmlns:a16="http://schemas.microsoft.com/office/drawing/2014/main" id="{E7E18ADD-8671-BD4A-886B-D4E2F57A52DC}"/>
+              </a:ext>
+            </a:extLst>
+          </p:cNvPr>
+          <p:cNvSpPr>
+            <a:spLocks noGrp="1"/>
+          </p:cNvSpPr>
+          <p:nvPr>
+            <p:ph type="title"/>
+          </p:nvPr>
+        </p:nvSpPr>
+        <p:spPr/>
+        <p:txBody>
+          <a:bodyPr/>
+          <a:lstStyle/>
+          <a:p>
+            <a:r>
+              <a:rPr kumimoji="1" lang="en-US" altLang="ko-KR" dirty="0"/>
+              <a:t>Various office 365 service - </a:t>
+            </a:r>
+            <a:r>
+              <a:rPr kumimoji="1" lang="en-US" altLang="ko-KR" dirty="0" err="1"/>
+              <a:t>sharepoint</a:t>
+            </a:r>
+            <a:endParaRPr kumimoji="1" lang="ko-KR" altLang="en-US" dirty="0"/>
+          </a:p>
+        </p:txBody>
+      </p:sp>
+      <p:pic>
+        <p:nvPicPr>
+          <p:cNvPr id="5" name="내용 개체 틀 4">
+            <a:extLst>
+              <a:ext uri="{FF2B5EF4-FFF2-40B4-BE49-F238E27FC236}">
+                <a16:creationId xmlns:a16="http://schemas.microsoft.com/office/drawing/2014/main" id="{35C75878-5A5A-2E49-A33F-8025614AD819}"/>
+              </a:ext>
+            </a:extLst>
+          </p:cNvPr>
+          <p:cNvPicPr>
+            <a:picLocks noGrp="1" noChangeAspect="1"/>
+          </p:cNvPicPr>
+          <p:nvPr>
+            <p:ph idx="1"/>
+          </p:nvPr>
+        </p:nvPicPr>
+        <p:blipFill>
+          <a:blip r:embed="rId2"/>
+          <a:stretch>
+            <a:fillRect/>
+          </a:stretch>
+        </p:blipFill>
+        <p:spPr>
+          <a:xfrm>
+            <a:off x="1063571" y="1642633"/>
+            <a:ext cx="9678001" cy="5215367"/>
+          </a:xfrm>
+        </p:spPr>
+      </p:pic>
+    </p:spTree>
+    <p:extLst>
+      <p:ext uri="{BB962C8B-B14F-4D97-AF65-F5344CB8AC3E}">
+        <p14:creationId xmlns:p14="http://schemas.microsoft.com/office/powerpoint/2010/main" val="3323645695"/>
+      </p:ext>
+    </p:extLst>
+  </p:cSld>
+  <p:clrMapOvr>
+    <a:masterClrMapping/>
+  </p:clrMapOvr>
+</p:sld>
+</file>
+
+<file path=ppt/slides/slide16.xml><?xml version="1.0" encoding="utf-8"?>
+<p:sld xmlns:a="http://schemas.openxmlformats.org/drawingml/2006/main" xmlns:r="http://schemas.openxmlformats.org/officeDocument/2006/relationships" xmlns:p="http://schemas.openxmlformats.org/presentationml/2006/main">
+  <p:cSld>
+    <p:spTree>
+      <p:nvGrpSpPr>
+        <p:cNvPr id="1" name=""/>
+        <p:cNvGrpSpPr/>
+        <p:nvPr/>
+      </p:nvGrpSpPr>
+      <p:grpSpPr>
+        <a:xfrm>
+          <a:off x="0" y="0"/>
+          <a:ext cx="0" cy="0"/>
+          <a:chOff x="0" y="0"/>
+          <a:chExt cx="0" cy="0"/>
+        </a:xfrm>
+      </p:grpSpPr>
+      <p:sp>
+        <p:nvSpPr>
+          <p:cNvPr id="2" name="제목 1">
+            <a:extLst>
+              <a:ext uri="{FF2B5EF4-FFF2-40B4-BE49-F238E27FC236}">
+                <a16:creationId xmlns:a16="http://schemas.microsoft.com/office/drawing/2014/main" id="{96DF7BC4-0661-3E4D-AEBE-119A0BAF05D6}"/>
+              </a:ext>
+            </a:extLst>
+          </p:cNvPr>
+          <p:cNvSpPr>
+            <a:spLocks noGrp="1"/>
+          </p:cNvSpPr>
+          <p:nvPr>
+            <p:ph type="title"/>
+          </p:nvPr>
+        </p:nvSpPr>
+        <p:spPr/>
+        <p:txBody>
+          <a:bodyPr/>
+          <a:lstStyle/>
+          <a:p>
+            <a:r>
+              <a:rPr kumimoji="1" lang="en-US" altLang="ko-KR" dirty="0"/>
+              <a:t>Various office 365 service - </a:t>
+            </a:r>
+            <a:r>
+              <a:rPr kumimoji="1" lang="en-US" altLang="ko-KR" dirty="0" err="1"/>
+              <a:t>sharepoint</a:t>
+            </a:r>
+            <a:endParaRPr kumimoji="1" lang="ko-KR" altLang="en-US" dirty="0"/>
+          </a:p>
+        </p:txBody>
+      </p:sp>
+      <p:pic>
+        <p:nvPicPr>
+          <p:cNvPr id="5" name="내용 개체 틀 4">
+            <a:extLst>
+              <a:ext uri="{FF2B5EF4-FFF2-40B4-BE49-F238E27FC236}">
+                <a16:creationId xmlns:a16="http://schemas.microsoft.com/office/drawing/2014/main" id="{0CCC5A7D-C529-3049-8DAD-61CAE4FDCAA0}"/>
+              </a:ext>
+            </a:extLst>
+          </p:cNvPr>
+          <p:cNvPicPr>
+            <a:picLocks noGrp="1" noChangeAspect="1"/>
+          </p:cNvPicPr>
+          <p:nvPr>
+            <p:ph idx="1"/>
+          </p:nvPr>
+        </p:nvPicPr>
+        <p:blipFill>
+          <a:blip r:embed="rId2"/>
+          <a:stretch>
+            <a:fillRect/>
+          </a:stretch>
+        </p:blipFill>
+        <p:spPr>
+          <a:xfrm>
+            <a:off x="1141413" y="1587062"/>
+            <a:ext cx="9755977" cy="5270938"/>
+          </a:xfrm>
+        </p:spPr>
+      </p:pic>
+    </p:spTree>
+    <p:extLst>
+      <p:ext uri="{BB962C8B-B14F-4D97-AF65-F5344CB8AC3E}">
+        <p14:creationId xmlns:p14="http://schemas.microsoft.com/office/powerpoint/2010/main" val="2865203230"/>
+      </p:ext>
+    </p:extLst>
+  </p:cSld>
+  <p:clrMapOvr>
+    <a:masterClrMapping/>
+  </p:clrMapOvr>
+</p:sld>
+</file>
+
+<file path=ppt/slides/slide17.xml><?xml version="1.0" encoding="utf-8"?>
+<p:sld xmlns:a="http://schemas.openxmlformats.org/drawingml/2006/main" xmlns:r="http://schemas.openxmlformats.org/officeDocument/2006/relationships" xmlns:p="http://schemas.openxmlformats.org/presentationml/2006/main">
+  <p:cSld>
+    <p:spTree>
+      <p:nvGrpSpPr>
+        <p:cNvPr id="1" name=""/>
+        <p:cNvGrpSpPr/>
+        <p:nvPr/>
+      </p:nvGrpSpPr>
+      <p:grpSpPr>
+        <a:xfrm>
+          <a:off x="0" y="0"/>
+          <a:ext cx="0" cy="0"/>
+          <a:chOff x="0" y="0"/>
+          <a:chExt cx="0" cy="0"/>
+        </a:xfrm>
+      </p:grpSpPr>
+      <p:sp>
+        <p:nvSpPr>
+          <p:cNvPr id="2" name="제목 1">
+            <a:extLst>
+              <a:ext uri="{FF2B5EF4-FFF2-40B4-BE49-F238E27FC236}">
+                <a16:creationId xmlns:a16="http://schemas.microsoft.com/office/drawing/2014/main" id="{948D0501-1245-7042-A8F6-989DD6242718}"/>
+              </a:ext>
+            </a:extLst>
+          </p:cNvPr>
+          <p:cNvSpPr>
+            <a:spLocks noGrp="1"/>
+          </p:cNvSpPr>
+          <p:nvPr>
+            <p:ph type="title"/>
+          </p:nvPr>
+        </p:nvSpPr>
+        <p:spPr/>
+        <p:txBody>
+          <a:bodyPr/>
+          <a:lstStyle/>
+          <a:p>
+            <a:r>
+              <a:rPr kumimoji="1" lang="en-US" altLang="ko-KR" dirty="0"/>
+              <a:t>Various office 365 service - </a:t>
+            </a:r>
+            <a:r>
+              <a:rPr kumimoji="1" lang="en-US" altLang="ko-KR" dirty="0" err="1"/>
+              <a:t>sharepoint</a:t>
+            </a:r>
+            <a:endParaRPr kumimoji="1" lang="ko-KR" altLang="en-US" dirty="0"/>
+          </a:p>
+        </p:txBody>
+      </p:sp>
+      <p:pic>
+        <p:nvPicPr>
+          <p:cNvPr id="5" name="내용 개체 틀 4">
+            <a:extLst>
+              <a:ext uri="{FF2B5EF4-FFF2-40B4-BE49-F238E27FC236}">
+                <a16:creationId xmlns:a16="http://schemas.microsoft.com/office/drawing/2014/main" id="{AF696DEB-2595-FA46-833B-516980B6A014}"/>
+              </a:ext>
+            </a:extLst>
+          </p:cNvPr>
+          <p:cNvPicPr>
+            <a:picLocks noGrp="1" noChangeAspect="1"/>
+          </p:cNvPicPr>
+          <p:nvPr>
+            <p:ph idx="1"/>
+          </p:nvPr>
+        </p:nvPicPr>
+        <p:blipFill>
+          <a:blip r:embed="rId2"/>
+          <a:stretch>
+            <a:fillRect/>
+          </a:stretch>
+        </p:blipFill>
+        <p:spPr>
+          <a:xfrm>
+            <a:off x="1151923" y="1553125"/>
+            <a:ext cx="9831427" cy="5304875"/>
+          </a:xfrm>
+        </p:spPr>
+      </p:pic>
+    </p:spTree>
+    <p:extLst>
+      <p:ext uri="{BB962C8B-B14F-4D97-AF65-F5344CB8AC3E}">
+        <p14:creationId xmlns:p14="http://schemas.microsoft.com/office/powerpoint/2010/main" val="1294291134"/>
+      </p:ext>
+    </p:extLst>
+  </p:cSld>
+  <p:clrMapOvr>
+    <a:masterClrMapping/>
+  </p:clrMapOvr>
+</p:sld>
+</file>
+
+<file path=ppt/slides/slide18.xml><?xml version="1.0" encoding="utf-8"?>
+<p:sld xmlns:a="http://schemas.openxmlformats.org/drawingml/2006/main" xmlns:r="http://schemas.openxmlformats.org/officeDocument/2006/relationships" xmlns:p="http://schemas.openxmlformats.org/presentationml/2006/main">
+  <p:cSld>
+    <p:spTree>
+      <p:nvGrpSpPr>
+        <p:cNvPr id="1" name=""/>
+        <p:cNvGrpSpPr/>
+        <p:nvPr/>
+      </p:nvGrpSpPr>
+      <p:grpSpPr>
+        <a:xfrm>
+          <a:off x="0" y="0"/>
+          <a:ext cx="0" cy="0"/>
+          <a:chOff x="0" y="0"/>
+          <a:chExt cx="0" cy="0"/>
+        </a:xfrm>
+      </p:grpSpPr>
+      <p:sp>
+        <p:nvSpPr>
+          <p:cNvPr id="2" name="제목 1">
+            <a:extLst>
+              <a:ext uri="{FF2B5EF4-FFF2-40B4-BE49-F238E27FC236}">
+                <a16:creationId xmlns:a16="http://schemas.microsoft.com/office/drawing/2014/main" id="{38EE8B5A-2B92-E548-AE7C-CB448840105C}"/>
+              </a:ext>
+            </a:extLst>
+          </p:cNvPr>
+          <p:cNvSpPr>
+            <a:spLocks noGrp="1"/>
+          </p:cNvSpPr>
+          <p:nvPr>
+            <p:ph type="title"/>
+          </p:nvPr>
+        </p:nvSpPr>
+        <p:spPr/>
+        <p:txBody>
+          <a:bodyPr/>
+          <a:lstStyle/>
+          <a:p>
+            <a:r>
+              <a:rPr kumimoji="1" lang="en-US" altLang="ko-KR" dirty="0"/>
+              <a:t>Various office 365 service – skype for business</a:t>
+            </a:r>
+            <a:endParaRPr kumimoji="1" lang="ko-KR" altLang="en-US" dirty="0"/>
+          </a:p>
+        </p:txBody>
+      </p:sp>
+      <p:pic>
+        <p:nvPicPr>
+          <p:cNvPr id="5" name="내용 개체 틀 4">
+            <a:extLst>
+              <a:ext uri="{FF2B5EF4-FFF2-40B4-BE49-F238E27FC236}">
+                <a16:creationId xmlns:a16="http://schemas.microsoft.com/office/drawing/2014/main" id="{39FA6669-1806-2B4C-9470-95BA89E9FBAA}"/>
+              </a:ext>
+            </a:extLst>
+          </p:cNvPr>
+          <p:cNvPicPr>
+            <a:picLocks noGrp="1" noChangeAspect="1"/>
+          </p:cNvPicPr>
+          <p:nvPr>
+            <p:ph idx="1"/>
+          </p:nvPr>
+        </p:nvPicPr>
+        <p:blipFill>
+          <a:blip r:embed="rId2"/>
+          <a:stretch>
+            <a:fillRect/>
+          </a:stretch>
+        </p:blipFill>
+        <p:spPr>
+          <a:xfrm>
+            <a:off x="1141413" y="1786287"/>
+            <a:ext cx="9001070" cy="4919313"/>
+          </a:xfrm>
+        </p:spPr>
+      </p:pic>
+    </p:spTree>
+    <p:extLst>
+      <p:ext uri="{BB962C8B-B14F-4D97-AF65-F5344CB8AC3E}">
+        <p14:creationId xmlns:p14="http://schemas.microsoft.com/office/powerpoint/2010/main" val="2693434169"/>
+      </p:ext>
+    </p:extLst>
+  </p:cSld>
+  <p:clrMapOvr>
+    <a:masterClrMapping/>
+  </p:clrMapOvr>
+</p:sld>
+</file>
+
 <file path=ppt/slides/slide2.xml><?xml version="1.0" encoding="utf-8"?>
 <p:sld xmlns:a="http://schemas.openxmlformats.org/drawingml/2006/main" xmlns:r="http://schemas.openxmlformats.org/officeDocument/2006/relationships" xmlns:p="http://schemas.openxmlformats.org/presentationml/2006/main">
   <p:cSld>
@@ -13419,7 +14238,7 @@
           <a:p>
             <a:r>
               <a:rPr kumimoji="1" lang="en-US" altLang="ko-KR" dirty="0"/>
-              <a:t>Office 365 gives various service that you will never see again after in personal account.</a:t>
+              <a:t>Office 365 gives various service that you will never see again after, in personal account.</a:t>
             </a:r>
           </a:p>
           <a:p>

</xml_diff>

<commit_message>
Not done yet, but giving a saved one first
</commit_message>
<xml_diff>
--- a/MSOffice.pptx
+++ b/MSOffice.pptx
@@ -15,14 +15,23 @@
     <p:sldId id="263" r:id="rId9"/>
     <p:sldId id="264" r:id="rId10"/>
     <p:sldId id="265" r:id="rId11"/>
-    <p:sldId id="266" r:id="rId12"/>
-    <p:sldId id="267" r:id="rId13"/>
-    <p:sldId id="268" r:id="rId14"/>
-    <p:sldId id="269" r:id="rId15"/>
-    <p:sldId id="270" r:id="rId16"/>
-    <p:sldId id="271" r:id="rId17"/>
-    <p:sldId id="272" r:id="rId18"/>
-    <p:sldId id="273" r:id="rId19"/>
+    <p:sldId id="274" r:id="rId12"/>
+    <p:sldId id="275" r:id="rId13"/>
+    <p:sldId id="276" r:id="rId14"/>
+    <p:sldId id="266" r:id="rId15"/>
+    <p:sldId id="267" r:id="rId16"/>
+    <p:sldId id="268" r:id="rId17"/>
+    <p:sldId id="269" r:id="rId18"/>
+    <p:sldId id="270" r:id="rId19"/>
+    <p:sldId id="271" r:id="rId20"/>
+    <p:sldId id="272" r:id="rId21"/>
+    <p:sldId id="273" r:id="rId22"/>
+    <p:sldId id="277" r:id="rId23"/>
+    <p:sldId id="278" r:id="rId24"/>
+    <p:sldId id="279" r:id="rId25"/>
+    <p:sldId id="280" r:id="rId26"/>
+    <p:sldId id="281" r:id="rId27"/>
+    <p:sldId id="282" r:id="rId28"/>
   </p:sldIdLst>
   <p:sldSz cx="12192000" cy="6858000"/>
   <p:notesSz cx="6858000" cy="9144000"/>
@@ -190,7 +199,7 @@
           <a:noFill/>
           <a:extLst>
             <a:ext uri="{909E8E84-426E-40dd-AFC4-6F175D3DCCD1}">
-              <a14:hiddenFill xmlns:a14="http://schemas.microsoft.com/office/drawing/2010/main" xmlns="">
+              <a14:hiddenFill xmlns="" xmlns:a14="http://schemas.microsoft.com/office/drawing/2010/main">
                 <a:solidFill>
                   <a:srgbClr val="FFFFFF"/>
                 </a:solidFill>
@@ -250,7 +259,7 @@
             </a:ln>
             <a:extLst>
               <a:ext uri="{91240B29-F687-4f45-9708-019B960494DF}">
-                <a14:hiddenLine xmlns:a14="http://schemas.microsoft.com/office/drawing/2010/main" xmlns="" w="9525">
+                <a14:hiddenLine xmlns="" xmlns:a14="http://schemas.microsoft.com/office/drawing/2010/main" w="9525">
                   <a:solidFill>
                     <a:srgbClr val="000000"/>
                   </a:solidFill>
@@ -340,7 +349,7 @@
             </a:ln>
             <a:extLst>
               <a:ext uri="{91240B29-F687-4f45-9708-019B960494DF}">
-                <a14:hiddenLine xmlns:a14="http://schemas.microsoft.com/office/drawing/2010/main" xmlns="" w="9525">
+                <a14:hiddenLine xmlns="" xmlns:a14="http://schemas.microsoft.com/office/drawing/2010/main" w="9525">
                   <a:solidFill>
                     <a:srgbClr val="000000"/>
                   </a:solidFill>
@@ -430,7 +439,7 @@
             </a:ln>
             <a:extLst>
               <a:ext uri="{91240B29-F687-4f45-9708-019B960494DF}">
-                <a14:hiddenLine xmlns:a14="http://schemas.microsoft.com/office/drawing/2010/main" xmlns="" w="9525">
+                <a14:hiddenLine xmlns="" xmlns:a14="http://schemas.microsoft.com/office/drawing/2010/main" w="9525">
                   <a:solidFill>
                     <a:srgbClr val="000000"/>
                   </a:solidFill>
@@ -464,7 +473,7 @@
             </a:ln>
             <a:extLst>
               <a:ext uri="{91240B29-F687-4f45-9708-019B960494DF}">
-                <a14:hiddenLine xmlns:a14="http://schemas.microsoft.com/office/drawing/2010/main" xmlns="" w="9525">
+                <a14:hiddenLine xmlns="" xmlns:a14="http://schemas.microsoft.com/office/drawing/2010/main" w="9525">
                   <a:solidFill>
                     <a:srgbClr val="000000"/>
                   </a:solidFill>
@@ -554,7 +563,7 @@
             </a:ln>
             <a:extLst>
               <a:ext uri="{91240B29-F687-4f45-9708-019B960494DF}">
-                <a14:hiddenLine xmlns:a14="http://schemas.microsoft.com/office/drawing/2010/main" xmlns="" w="9525">
+                <a14:hiddenLine xmlns="" xmlns:a14="http://schemas.microsoft.com/office/drawing/2010/main" w="9525">
                   <a:solidFill>
                     <a:srgbClr val="000000"/>
                   </a:solidFill>
@@ -616,7 +625,7 @@
             </a:ln>
             <a:extLst>
               <a:ext uri="{91240B29-F687-4f45-9708-019B960494DF}">
-                <a14:hiddenLine xmlns:a14="http://schemas.microsoft.com/office/drawing/2010/main" xmlns="" w="9525">
+                <a14:hiddenLine xmlns="" xmlns:a14="http://schemas.microsoft.com/office/drawing/2010/main" w="9525">
                   <a:solidFill>
                     <a:srgbClr val="000000"/>
                   </a:solidFill>
@@ -678,7 +687,7 @@
             </a:ln>
             <a:extLst>
               <a:ext uri="{91240B29-F687-4f45-9708-019B960494DF}">
-                <a14:hiddenLine xmlns:a14="http://schemas.microsoft.com/office/drawing/2010/main" xmlns="" w="9525">
+                <a14:hiddenLine xmlns="" xmlns:a14="http://schemas.microsoft.com/office/drawing/2010/main" w="9525">
                   <a:solidFill>
                     <a:srgbClr val="000000"/>
                   </a:solidFill>
@@ -768,7 +777,7 @@
             </a:ln>
             <a:extLst>
               <a:ext uri="{91240B29-F687-4f45-9708-019B960494DF}">
-                <a14:hiddenLine xmlns:a14="http://schemas.microsoft.com/office/drawing/2010/main" xmlns="" w="9525">
+                <a14:hiddenLine xmlns="" xmlns:a14="http://schemas.microsoft.com/office/drawing/2010/main" w="9525">
                   <a:solidFill>
                     <a:srgbClr val="000000"/>
                   </a:solidFill>
@@ -830,7 +839,7 @@
             </a:ln>
             <a:extLst>
               <a:ext uri="{91240B29-F687-4f45-9708-019B960494DF}">
-                <a14:hiddenLine xmlns:a14="http://schemas.microsoft.com/office/drawing/2010/main" xmlns="" w="9525">
+                <a14:hiddenLine xmlns="" xmlns:a14="http://schemas.microsoft.com/office/drawing/2010/main" w="9525">
                   <a:solidFill>
                     <a:srgbClr val="000000"/>
                   </a:solidFill>
@@ -892,7 +901,7 @@
             </a:ln>
             <a:extLst>
               <a:ext uri="{91240B29-F687-4f45-9708-019B960494DF}">
-                <a14:hiddenLine xmlns:a14="http://schemas.microsoft.com/office/drawing/2010/main" xmlns="" w="9525">
+                <a14:hiddenLine xmlns="" xmlns:a14="http://schemas.microsoft.com/office/drawing/2010/main" w="9525">
                   <a:solidFill>
                     <a:srgbClr val="000000"/>
                   </a:solidFill>
@@ -982,7 +991,7 @@
             </a:ln>
             <a:extLst>
               <a:ext uri="{91240B29-F687-4f45-9708-019B960494DF}">
-                <a14:hiddenLine xmlns:a14="http://schemas.microsoft.com/office/drawing/2010/main" xmlns="" w="9525">
+                <a14:hiddenLine xmlns="" xmlns:a14="http://schemas.microsoft.com/office/drawing/2010/main" w="9525">
                   <a:solidFill>
                     <a:srgbClr val="000000"/>
                   </a:solidFill>
@@ -1072,7 +1081,7 @@
             </a:ln>
             <a:extLst>
               <a:ext uri="{91240B29-F687-4f45-9708-019B960494DF}">
-                <a14:hiddenLine xmlns:a14="http://schemas.microsoft.com/office/drawing/2010/main" xmlns="" w="9525">
+                <a14:hiddenLine xmlns="" xmlns:a14="http://schemas.microsoft.com/office/drawing/2010/main" w="9525">
                   <a:solidFill>
                     <a:srgbClr val="000000"/>
                   </a:solidFill>
@@ -1134,7 +1143,7 @@
             </a:ln>
             <a:extLst>
               <a:ext uri="{91240B29-F687-4f45-9708-019B960494DF}">
-                <a14:hiddenLine xmlns:a14="http://schemas.microsoft.com/office/drawing/2010/main" xmlns="" w="9525">
+                <a14:hiddenLine xmlns="" xmlns:a14="http://schemas.microsoft.com/office/drawing/2010/main" w="9525">
                   <a:solidFill>
                     <a:srgbClr val="000000"/>
                   </a:solidFill>
@@ -1244,7 +1253,7 @@
             </a:ln>
             <a:extLst>
               <a:ext uri="{91240B29-F687-4f45-9708-019B960494DF}">
-                <a14:hiddenLine xmlns:a14="http://schemas.microsoft.com/office/drawing/2010/main" xmlns="" w="9525">
+                <a14:hiddenLine xmlns="" xmlns:a14="http://schemas.microsoft.com/office/drawing/2010/main" w="9525">
                   <a:solidFill>
                     <a:srgbClr val="000000"/>
                   </a:solidFill>
@@ -1306,7 +1315,7 @@
             </a:ln>
             <a:extLst>
               <a:ext uri="{91240B29-F687-4f45-9708-019B960494DF}">
-                <a14:hiddenLine xmlns:a14="http://schemas.microsoft.com/office/drawing/2010/main" xmlns="" w="9525">
+                <a14:hiddenLine xmlns="" xmlns:a14="http://schemas.microsoft.com/office/drawing/2010/main" w="9525">
                   <a:solidFill>
                     <a:srgbClr val="000000"/>
                   </a:solidFill>
@@ -1396,7 +1405,7 @@
             </a:ln>
             <a:extLst>
               <a:ext uri="{91240B29-F687-4f45-9708-019B960494DF}">
-                <a14:hiddenLine xmlns:a14="http://schemas.microsoft.com/office/drawing/2010/main" xmlns="" w="9525">
+                <a14:hiddenLine xmlns="" xmlns:a14="http://schemas.microsoft.com/office/drawing/2010/main" w="9525">
                   <a:solidFill>
                     <a:srgbClr val="000000"/>
                   </a:solidFill>
@@ -1486,7 +1495,7 @@
             </a:ln>
             <a:extLst>
               <a:ext uri="{91240B29-F687-4f45-9708-019B960494DF}">
-                <a14:hiddenLine xmlns:a14="http://schemas.microsoft.com/office/drawing/2010/main" xmlns="" w="9525">
+                <a14:hiddenLine xmlns="" xmlns:a14="http://schemas.microsoft.com/office/drawing/2010/main" w="9525">
                   <a:solidFill>
                     <a:srgbClr val="000000"/>
                   </a:solidFill>
@@ -1548,7 +1557,7 @@
             </a:ln>
             <a:extLst>
               <a:ext uri="{91240B29-F687-4f45-9708-019B960494DF}">
-                <a14:hiddenLine xmlns:a14="http://schemas.microsoft.com/office/drawing/2010/main" xmlns="" w="9525">
+                <a14:hiddenLine xmlns="" xmlns:a14="http://schemas.microsoft.com/office/drawing/2010/main" w="9525">
                   <a:solidFill>
                     <a:srgbClr val="000000"/>
                   </a:solidFill>
@@ -1638,7 +1647,7 @@
             </a:ln>
             <a:extLst>
               <a:ext uri="{91240B29-F687-4f45-9708-019B960494DF}">
-                <a14:hiddenLine xmlns:a14="http://schemas.microsoft.com/office/drawing/2010/main" xmlns="" w="9525">
+                <a14:hiddenLine xmlns="" xmlns:a14="http://schemas.microsoft.com/office/drawing/2010/main" w="9525">
                   <a:solidFill>
                     <a:srgbClr val="000000"/>
                   </a:solidFill>
@@ -1728,7 +1737,7 @@
             </a:ln>
             <a:extLst>
               <a:ext uri="{91240B29-F687-4f45-9708-019B960494DF}">
-                <a14:hiddenLine xmlns:a14="http://schemas.microsoft.com/office/drawing/2010/main" xmlns="" w="9525">
+                <a14:hiddenLine xmlns="" xmlns:a14="http://schemas.microsoft.com/office/drawing/2010/main" w="9525">
                   <a:solidFill>
                     <a:srgbClr val="000000"/>
                   </a:solidFill>
@@ -1784,7 +1793,7 @@
             </a:ln>
             <a:extLst>
               <a:ext uri="{91240B29-F687-4f45-9708-019B960494DF}">
-                <a14:hiddenLine xmlns:a14="http://schemas.microsoft.com/office/drawing/2010/main" xmlns="" w="9525">
+                <a14:hiddenLine xmlns="" xmlns:a14="http://schemas.microsoft.com/office/drawing/2010/main" w="9525">
                   <a:solidFill>
                     <a:srgbClr val="000000"/>
                   </a:solidFill>
@@ -1874,7 +1883,7 @@
             </a:ln>
             <a:extLst>
               <a:ext uri="{91240B29-F687-4f45-9708-019B960494DF}">
-                <a14:hiddenLine xmlns:a14="http://schemas.microsoft.com/office/drawing/2010/main" xmlns="" w="9525">
+                <a14:hiddenLine xmlns="" xmlns:a14="http://schemas.microsoft.com/office/drawing/2010/main" w="9525">
                   <a:solidFill>
                     <a:srgbClr val="000000"/>
                   </a:solidFill>
@@ -1930,7 +1939,7 @@
             </a:ln>
             <a:extLst>
               <a:ext uri="{91240B29-F687-4f45-9708-019B960494DF}">
-                <a14:hiddenLine xmlns:a14="http://schemas.microsoft.com/office/drawing/2010/main" xmlns="" w="9525">
+                <a14:hiddenLine xmlns="" xmlns:a14="http://schemas.microsoft.com/office/drawing/2010/main" w="9525">
                   <a:solidFill>
                     <a:srgbClr val="000000"/>
                   </a:solidFill>
@@ -2020,7 +2029,7 @@
             </a:ln>
             <a:extLst>
               <a:ext uri="{91240B29-F687-4f45-9708-019B960494DF}">
-                <a14:hiddenLine xmlns:a14="http://schemas.microsoft.com/office/drawing/2010/main" xmlns="" w="9525">
+                <a14:hiddenLine xmlns="" xmlns:a14="http://schemas.microsoft.com/office/drawing/2010/main" w="9525">
                   <a:solidFill>
                     <a:srgbClr val="000000"/>
                   </a:solidFill>
@@ -2088,7 +2097,7 @@
             </a:ln>
             <a:extLst>
               <a:ext uri="{91240B29-F687-4f45-9708-019B960494DF}">
-                <a14:hiddenLine xmlns:a14="http://schemas.microsoft.com/office/drawing/2010/main" xmlns="" w="9525">
+                <a14:hiddenLine xmlns="" xmlns:a14="http://schemas.microsoft.com/office/drawing/2010/main" w="9525">
                   <a:solidFill>
                     <a:srgbClr val="000000"/>
                   </a:solidFill>
@@ -2178,7 +2187,7 @@
             </a:ln>
             <a:extLst>
               <a:ext uri="{91240B29-F687-4f45-9708-019B960494DF}">
-                <a14:hiddenLine xmlns:a14="http://schemas.microsoft.com/office/drawing/2010/main" xmlns="" w="9525">
+                <a14:hiddenLine xmlns="" xmlns:a14="http://schemas.microsoft.com/office/drawing/2010/main" w="9525">
                   <a:solidFill>
                     <a:srgbClr val="000000"/>
                   </a:solidFill>
@@ -2246,7 +2255,7 @@
             </a:ln>
             <a:extLst>
               <a:ext uri="{91240B29-F687-4f45-9708-019B960494DF}">
-                <a14:hiddenLine xmlns:a14="http://schemas.microsoft.com/office/drawing/2010/main" xmlns="" w="9525">
+                <a14:hiddenLine xmlns="" xmlns:a14="http://schemas.microsoft.com/office/drawing/2010/main" w="9525">
                   <a:solidFill>
                     <a:srgbClr val="000000"/>
                   </a:solidFill>
@@ -2336,7 +2345,7 @@
             </a:ln>
             <a:extLst>
               <a:ext uri="{91240B29-F687-4f45-9708-019B960494DF}">
-                <a14:hiddenLine xmlns:a14="http://schemas.microsoft.com/office/drawing/2010/main" xmlns="" w="9525">
+                <a14:hiddenLine xmlns="" xmlns:a14="http://schemas.microsoft.com/office/drawing/2010/main" w="9525">
                   <a:solidFill>
                     <a:srgbClr val="000000"/>
                   </a:solidFill>
@@ -2370,7 +2379,7 @@
             </a:ln>
             <a:extLst>
               <a:ext uri="{91240B29-F687-4f45-9708-019B960494DF}">
-                <a14:hiddenLine xmlns:a14="http://schemas.microsoft.com/office/drawing/2010/main" xmlns="" w="9525">
+                <a14:hiddenLine xmlns="" xmlns:a14="http://schemas.microsoft.com/office/drawing/2010/main" w="9525">
                   <a:solidFill>
                     <a:srgbClr val="000000"/>
                   </a:solidFill>
@@ -2460,7 +2469,7 @@
             </a:ln>
             <a:extLst>
               <a:ext uri="{91240B29-F687-4f45-9708-019B960494DF}">
-                <a14:hiddenLine xmlns:a14="http://schemas.microsoft.com/office/drawing/2010/main" xmlns="" w="9525">
+                <a14:hiddenLine xmlns="" xmlns:a14="http://schemas.microsoft.com/office/drawing/2010/main" w="9525">
                   <a:solidFill>
                     <a:srgbClr val="000000"/>
                   </a:solidFill>
@@ -2522,7 +2531,7 @@
             </a:ln>
             <a:extLst>
               <a:ext uri="{91240B29-F687-4f45-9708-019B960494DF}">
-                <a14:hiddenLine xmlns:a14="http://schemas.microsoft.com/office/drawing/2010/main" xmlns="" w="9525">
+                <a14:hiddenLine xmlns="" xmlns:a14="http://schemas.microsoft.com/office/drawing/2010/main" w="9525">
                   <a:solidFill>
                     <a:srgbClr val="000000"/>
                   </a:solidFill>
@@ -2584,7 +2593,7 @@
             </a:ln>
             <a:extLst>
               <a:ext uri="{91240B29-F687-4f45-9708-019B960494DF}">
-                <a14:hiddenLine xmlns:a14="http://schemas.microsoft.com/office/drawing/2010/main" xmlns="" w="9525">
+                <a14:hiddenLine xmlns="" xmlns:a14="http://schemas.microsoft.com/office/drawing/2010/main" w="9525">
                   <a:solidFill>
                     <a:srgbClr val="000000"/>
                   </a:solidFill>
@@ -2674,7 +2683,7 @@
             </a:ln>
             <a:extLst>
               <a:ext uri="{91240B29-F687-4f45-9708-019B960494DF}">
-                <a14:hiddenLine xmlns:a14="http://schemas.microsoft.com/office/drawing/2010/main" xmlns="" w="9525">
+                <a14:hiddenLine xmlns="" xmlns:a14="http://schemas.microsoft.com/office/drawing/2010/main" w="9525">
                   <a:solidFill>
                     <a:srgbClr val="000000"/>
                   </a:solidFill>
@@ -2742,7 +2751,7 @@
             </a:ln>
             <a:extLst>
               <a:ext uri="{91240B29-F687-4f45-9708-019B960494DF}">
-                <a14:hiddenLine xmlns:a14="http://schemas.microsoft.com/office/drawing/2010/main" xmlns="" w="9525">
+                <a14:hiddenLine xmlns="" xmlns:a14="http://schemas.microsoft.com/office/drawing/2010/main" w="9525">
                   <a:solidFill>
                     <a:srgbClr val="000000"/>
                   </a:solidFill>
@@ -2804,7 +2813,7 @@
             </a:ln>
             <a:extLst>
               <a:ext uri="{91240B29-F687-4f45-9708-019B960494DF}">
-                <a14:hiddenLine xmlns:a14="http://schemas.microsoft.com/office/drawing/2010/main" xmlns="" w="9525">
+                <a14:hiddenLine xmlns="" xmlns:a14="http://schemas.microsoft.com/office/drawing/2010/main" w="9525">
                   <a:solidFill>
                     <a:srgbClr val="000000"/>
                   </a:solidFill>
@@ -2894,7 +2903,7 @@
             </a:ln>
             <a:extLst>
               <a:ext uri="{91240B29-F687-4f45-9708-019B960494DF}">
-                <a14:hiddenLine xmlns:a14="http://schemas.microsoft.com/office/drawing/2010/main" xmlns="" w="9525">
+                <a14:hiddenLine xmlns="" xmlns:a14="http://schemas.microsoft.com/office/drawing/2010/main" w="9525">
                   <a:solidFill>
                     <a:srgbClr val="000000"/>
                   </a:solidFill>
@@ -2956,7 +2965,7 @@
             </a:ln>
             <a:extLst>
               <a:ext uri="{91240B29-F687-4f45-9708-019B960494DF}">
-                <a14:hiddenLine xmlns:a14="http://schemas.microsoft.com/office/drawing/2010/main" xmlns="" w="9525">
+                <a14:hiddenLine xmlns="" xmlns:a14="http://schemas.microsoft.com/office/drawing/2010/main" w="9525">
                   <a:solidFill>
                     <a:srgbClr val="000000"/>
                   </a:solidFill>
@@ -3046,7 +3055,7 @@
             </a:ln>
             <a:extLst>
               <a:ext uri="{91240B29-F687-4f45-9708-019B960494DF}">
-                <a14:hiddenLine xmlns:a14="http://schemas.microsoft.com/office/drawing/2010/main" xmlns="" w="9525">
+                <a14:hiddenLine xmlns="" xmlns:a14="http://schemas.microsoft.com/office/drawing/2010/main" w="9525">
                   <a:solidFill>
                     <a:srgbClr val="000000"/>
                   </a:solidFill>
@@ -3108,7 +3117,7 @@
             </a:ln>
             <a:extLst>
               <a:ext uri="{91240B29-F687-4f45-9708-019B960494DF}">
-                <a14:hiddenLine xmlns:a14="http://schemas.microsoft.com/office/drawing/2010/main" xmlns="" w="9525">
+                <a14:hiddenLine xmlns="" xmlns:a14="http://schemas.microsoft.com/office/drawing/2010/main" w="9525">
                   <a:solidFill>
                     <a:srgbClr val="000000"/>
                   </a:solidFill>
@@ -3198,7 +3207,7 @@
             </a:ln>
             <a:extLst>
               <a:ext uri="{91240B29-F687-4f45-9708-019B960494DF}">
-                <a14:hiddenLine xmlns:a14="http://schemas.microsoft.com/office/drawing/2010/main" xmlns="" w="9525">
+                <a14:hiddenLine xmlns="" xmlns:a14="http://schemas.microsoft.com/office/drawing/2010/main" w="9525">
                   <a:solidFill>
                     <a:srgbClr val="000000"/>
                   </a:solidFill>
@@ -3232,7 +3241,7 @@
             </a:ln>
             <a:extLst>
               <a:ext uri="{91240B29-F687-4f45-9708-019B960494DF}">
-                <a14:hiddenLine xmlns:a14="http://schemas.microsoft.com/office/drawing/2010/main" xmlns="" w="9525">
+                <a14:hiddenLine xmlns="" xmlns:a14="http://schemas.microsoft.com/office/drawing/2010/main" w="9525">
                   <a:solidFill>
                     <a:srgbClr val="000000"/>
                   </a:solidFill>
@@ -3297,7 +3306,7 @@
             </a:ln>
             <a:extLst>
               <a:ext uri="{91240B29-F687-4f45-9708-019B960494DF}">
-                <a14:hiddenLine xmlns:a14="http://schemas.microsoft.com/office/drawing/2010/main" xmlns="" w="9525">
+                <a14:hiddenLine xmlns="" xmlns:a14="http://schemas.microsoft.com/office/drawing/2010/main" w="9525">
                   <a:solidFill>
                     <a:srgbClr val="000000"/>
                   </a:solidFill>
@@ -3387,7 +3396,7 @@
             </a:ln>
             <a:extLst>
               <a:ext uri="{91240B29-F687-4f45-9708-019B960494DF}">
-                <a14:hiddenLine xmlns:a14="http://schemas.microsoft.com/office/drawing/2010/main" xmlns="" w="9525">
+                <a14:hiddenLine xmlns="" xmlns:a14="http://schemas.microsoft.com/office/drawing/2010/main" w="9525">
                   <a:solidFill>
                     <a:srgbClr val="000000"/>
                   </a:solidFill>
@@ -3449,7 +3458,7 @@
             </a:ln>
             <a:extLst>
               <a:ext uri="{91240B29-F687-4f45-9708-019B960494DF}">
-                <a14:hiddenLine xmlns:a14="http://schemas.microsoft.com/office/drawing/2010/main" xmlns="" w="9525">
+                <a14:hiddenLine xmlns="" xmlns:a14="http://schemas.microsoft.com/office/drawing/2010/main" w="9525">
                   <a:solidFill>
                     <a:srgbClr val="000000"/>
                   </a:solidFill>
@@ -3539,7 +3548,7 @@
             </a:ln>
             <a:extLst>
               <a:ext uri="{91240B29-F687-4f45-9708-019B960494DF}">
-                <a14:hiddenLine xmlns:a14="http://schemas.microsoft.com/office/drawing/2010/main" xmlns="" w="9525">
+                <a14:hiddenLine xmlns="" xmlns:a14="http://schemas.microsoft.com/office/drawing/2010/main" w="9525">
                   <a:solidFill>
                     <a:srgbClr val="000000"/>
                   </a:solidFill>
@@ -3629,7 +3638,7 @@
             </a:ln>
             <a:extLst>
               <a:ext uri="{91240B29-F687-4f45-9708-019B960494DF}">
-                <a14:hiddenLine xmlns:a14="http://schemas.microsoft.com/office/drawing/2010/main" xmlns="" w="9525">
+                <a14:hiddenLine xmlns="" xmlns:a14="http://schemas.microsoft.com/office/drawing/2010/main" w="9525">
                   <a:solidFill>
                     <a:srgbClr val="000000"/>
                   </a:solidFill>
@@ -3694,7 +3703,7 @@
             </a:ln>
             <a:extLst>
               <a:ext uri="{91240B29-F687-4f45-9708-019B960494DF}">
-                <a14:hiddenLine xmlns:a14="http://schemas.microsoft.com/office/drawing/2010/main" xmlns="" w="9525">
+                <a14:hiddenLine xmlns="" xmlns:a14="http://schemas.microsoft.com/office/drawing/2010/main" w="9525">
                   <a:solidFill>
                     <a:srgbClr val="000000"/>
                   </a:solidFill>
@@ -3756,7 +3765,7 @@
             </a:ln>
             <a:extLst>
               <a:ext uri="{91240B29-F687-4f45-9708-019B960494DF}">
-                <a14:hiddenLine xmlns:a14="http://schemas.microsoft.com/office/drawing/2010/main" xmlns="" w="9525">
+                <a14:hiddenLine xmlns="" xmlns:a14="http://schemas.microsoft.com/office/drawing/2010/main" w="9525">
                   <a:solidFill>
                     <a:srgbClr val="000000"/>
                   </a:solidFill>
@@ -3846,7 +3855,7 @@
             </a:ln>
             <a:extLst>
               <a:ext uri="{91240B29-F687-4f45-9708-019B960494DF}">
-                <a14:hiddenLine xmlns:a14="http://schemas.microsoft.com/office/drawing/2010/main" xmlns="" w="9525">
+                <a14:hiddenLine xmlns="" xmlns:a14="http://schemas.microsoft.com/office/drawing/2010/main" w="9525">
                   <a:solidFill>
                     <a:srgbClr val="000000"/>
                   </a:solidFill>
@@ -3936,7 +3945,7 @@
             </a:ln>
             <a:extLst>
               <a:ext uri="{91240B29-F687-4f45-9708-019B960494DF}">
-                <a14:hiddenLine xmlns:a14="http://schemas.microsoft.com/office/drawing/2010/main" xmlns="" w="9525">
+                <a14:hiddenLine xmlns="" xmlns:a14="http://schemas.microsoft.com/office/drawing/2010/main" w="9525">
                   <a:solidFill>
                     <a:srgbClr val="000000"/>
                   </a:solidFill>
@@ -3998,7 +4007,7 @@
             </a:ln>
             <a:extLst>
               <a:ext uri="{91240B29-F687-4f45-9708-019B960494DF}">
-                <a14:hiddenLine xmlns:a14="http://schemas.microsoft.com/office/drawing/2010/main" xmlns="" w="9525">
+                <a14:hiddenLine xmlns="" xmlns:a14="http://schemas.microsoft.com/office/drawing/2010/main" w="9525">
                   <a:solidFill>
                     <a:srgbClr val="000000"/>
                   </a:solidFill>
@@ -4118,7 +4127,7 @@
             </a:ln>
             <a:extLst>
               <a:ext uri="{91240B29-F687-4f45-9708-019B960494DF}">
-                <a14:hiddenLine xmlns:a14="http://schemas.microsoft.com/office/drawing/2010/main" xmlns="" w="9525">
+                <a14:hiddenLine xmlns="" xmlns:a14="http://schemas.microsoft.com/office/drawing/2010/main" w="9525">
                   <a:solidFill>
                     <a:srgbClr val="000000"/>
                   </a:solidFill>
@@ -4186,7 +4195,7 @@
             </a:ln>
             <a:extLst>
               <a:ext uri="{91240B29-F687-4f45-9708-019B960494DF}">
-                <a14:hiddenLine xmlns:a14="http://schemas.microsoft.com/office/drawing/2010/main" xmlns="" w="9525">
+                <a14:hiddenLine xmlns="" xmlns:a14="http://schemas.microsoft.com/office/drawing/2010/main" w="9525">
                   <a:solidFill>
                     <a:srgbClr val="000000"/>
                   </a:solidFill>
@@ -4276,7 +4285,7 @@
             </a:ln>
             <a:extLst>
               <a:ext uri="{91240B29-F687-4f45-9708-019B960494DF}">
-                <a14:hiddenLine xmlns:a14="http://schemas.microsoft.com/office/drawing/2010/main" xmlns="" w="9525">
+                <a14:hiddenLine xmlns="" xmlns:a14="http://schemas.microsoft.com/office/drawing/2010/main" w="9525">
                   <a:solidFill>
                     <a:srgbClr val="000000"/>
                   </a:solidFill>
@@ -4416,7 +4425,7 @@
           <a:p>
             <a:fld id="{48A87A34-81AB-432B-8DAE-1953F412C126}" type="datetimeFigureOut">
               <a:rPr lang="en-US" dirty="0"/>
-              <a:t>3/28/18</a:t>
+              <a:t>4/7/18</a:t>
             </a:fld>
             <a:endParaRPr lang="en-US" dirty="0"/>
           </a:p>
@@ -4678,7 +4687,7 @@
           <a:p>
             <a:fld id="{48A87A34-81AB-432B-8DAE-1953F412C126}" type="datetimeFigureOut">
               <a:rPr lang="en-US" dirty="0"/>
-              <a:t>3/28/18</a:t>
+              <a:t>4/7/18</a:t>
             </a:fld>
             <a:endParaRPr lang="en-US" dirty="0"/>
           </a:p>
@@ -4869,7 +4878,7 @@
           <a:p>
             <a:fld id="{48A87A34-81AB-432B-8DAE-1953F412C126}" type="datetimeFigureOut">
               <a:rPr lang="en-US" dirty="0"/>
-              <a:t>3/28/18</a:t>
+              <a:t>4/7/18</a:t>
             </a:fld>
             <a:endParaRPr lang="en-US" dirty="0"/>
           </a:p>
@@ -5127,7 +5136,7 @@
           <a:p>
             <a:fld id="{48A87A34-81AB-432B-8DAE-1953F412C126}" type="datetimeFigureOut">
               <a:rPr lang="en-US" dirty="0"/>
-              <a:t>3/28/18</a:t>
+              <a:t>4/7/18</a:t>
             </a:fld>
             <a:endParaRPr lang="en-US" dirty="0"/>
           </a:p>
@@ -5556,7 +5565,7 @@
           <a:p>
             <a:fld id="{48A87A34-81AB-432B-8DAE-1953F412C126}" type="datetimeFigureOut">
               <a:rPr lang="en-US" dirty="0"/>
-              <a:t>3/28/18</a:t>
+              <a:t>4/7/18</a:t>
             </a:fld>
             <a:endParaRPr lang="en-US" dirty="0"/>
           </a:p>
@@ -6097,7 +6106,7 @@
           <a:p>
             <a:fld id="{48A87A34-81AB-432B-8DAE-1953F412C126}" type="datetimeFigureOut">
               <a:rPr lang="en-US" dirty="0"/>
-              <a:t>3/28/18</a:t>
+              <a:t>4/7/18</a:t>
             </a:fld>
             <a:endParaRPr lang="en-US" dirty="0"/>
           </a:p>
@@ -6812,7 +6821,7 @@
           <a:p>
             <a:fld id="{48A87A34-81AB-432B-8DAE-1953F412C126}" type="datetimeFigureOut">
               <a:rPr lang="en-US" dirty="0"/>
-              <a:t>3/28/18</a:t>
+              <a:t>4/7/18</a:t>
             </a:fld>
             <a:endParaRPr lang="en-US" dirty="0"/>
           </a:p>
@@ -6977,7 +6986,7 @@
           <a:p>
             <a:fld id="{48A87A34-81AB-432B-8DAE-1953F412C126}" type="datetimeFigureOut">
               <a:rPr lang="en-US" dirty="0"/>
-              <a:t>3/28/18</a:t>
+              <a:t>4/7/18</a:t>
             </a:fld>
             <a:endParaRPr lang="en-US" dirty="0"/>
           </a:p>
@@ -7152,7 +7161,7 @@
           <a:p>
             <a:fld id="{48A87A34-81AB-432B-8DAE-1953F412C126}" type="datetimeFigureOut">
               <a:rPr lang="en-US" dirty="0"/>
-              <a:t>3/28/18</a:t>
+              <a:t>4/7/18</a:t>
             </a:fld>
             <a:endParaRPr lang="en-US" dirty="0"/>
           </a:p>
@@ -7317,7 +7326,7 @@
           <a:p>
             <a:fld id="{48A87A34-81AB-432B-8DAE-1953F412C126}" type="datetimeFigureOut">
               <a:rPr lang="en-US" dirty="0"/>
-              <a:t>3/28/18</a:t>
+              <a:t>4/7/18</a:t>
             </a:fld>
             <a:endParaRPr lang="en-US" dirty="0"/>
           </a:p>
@@ -7562,7 +7571,7 @@
           <a:p>
             <a:fld id="{48A87A34-81AB-432B-8DAE-1953F412C126}" type="datetimeFigureOut">
               <a:rPr lang="en-US" dirty="0"/>
-              <a:t>3/28/18</a:t>
+              <a:t>4/7/18</a:t>
             </a:fld>
             <a:endParaRPr lang="en-US" dirty="0"/>
           </a:p>
@@ -7789,7 +7798,7 @@
           <a:p>
             <a:fld id="{48A87A34-81AB-432B-8DAE-1953F412C126}" type="datetimeFigureOut">
               <a:rPr lang="en-US" dirty="0"/>
-              <a:t>3/28/18</a:t>
+              <a:t>4/7/18</a:t>
             </a:fld>
             <a:endParaRPr lang="en-US" dirty="0"/>
           </a:p>
@@ -8165,7 +8174,7 @@
           <a:p>
             <a:fld id="{48A87A34-81AB-432B-8DAE-1953F412C126}" type="datetimeFigureOut">
               <a:rPr lang="en-US" dirty="0"/>
-              <a:t>3/28/18</a:t>
+              <a:t>4/7/18</a:t>
             </a:fld>
             <a:endParaRPr lang="en-US" dirty="0"/>
           </a:p>
@@ -8278,7 +8287,7 @@
           <a:p>
             <a:fld id="{48A87A34-81AB-432B-8DAE-1953F412C126}" type="datetimeFigureOut">
               <a:rPr lang="en-US" dirty="0"/>
-              <a:t>3/28/18</a:t>
+              <a:t>4/7/18</a:t>
             </a:fld>
             <a:endParaRPr lang="en-US" dirty="0"/>
           </a:p>
@@ -8368,7 +8377,7 @@
           <a:p>
             <a:fld id="{48A87A34-81AB-432B-8DAE-1953F412C126}" type="datetimeFigureOut">
               <a:rPr lang="en-US" dirty="0"/>
-              <a:t>3/28/18</a:t>
+              <a:t>4/7/18</a:t>
             </a:fld>
             <a:endParaRPr lang="en-US" dirty="0"/>
           </a:p>
@@ -8612,7 +8621,7 @@
           <a:p>
             <a:fld id="{48A87A34-81AB-432B-8DAE-1953F412C126}" type="datetimeFigureOut">
               <a:rPr lang="en-US" dirty="0"/>
-              <a:t>3/28/18</a:t>
+              <a:t>4/7/18</a:t>
             </a:fld>
             <a:endParaRPr lang="en-US" dirty="0"/>
           </a:p>
@@ -8887,7 +8896,7 @@
           <a:p>
             <a:fld id="{48A87A34-81AB-432B-8DAE-1953F412C126}" type="datetimeFigureOut">
               <a:rPr lang="en-US" dirty="0"/>
-              <a:t>3/28/18</a:t>
+              <a:t>4/7/18</a:t>
             </a:fld>
             <a:endParaRPr lang="en-US" dirty="0"/>
           </a:p>
@@ -8998,7 +9007,7 @@
           <a:noFill/>
           <a:extLst>
             <a:ext uri="{909E8E84-426E-40dd-AFC4-6F175D3DCCD1}">
-              <a14:hiddenFill xmlns:a14="http://schemas.microsoft.com/office/drawing/2010/main" xmlns="">
+              <a14:hiddenFill xmlns="" xmlns:a14="http://schemas.microsoft.com/office/drawing/2010/main">
                 <a:solidFill>
                   <a:srgbClr val="FFFFFF"/>
                 </a:solidFill>
@@ -9072,7 +9081,7 @@
               </a:ln>
               <a:extLst>
                 <a:ext uri="{91240B29-F687-4f45-9708-019B960494DF}">
-                  <a14:hiddenLine xmlns:a14="http://schemas.microsoft.com/office/drawing/2010/main" xmlns="" w="9525">
+                  <a14:hiddenLine xmlns="" xmlns:a14="http://schemas.microsoft.com/office/drawing/2010/main" w="9525">
                     <a:solidFill>
                       <a:srgbClr val="000000"/>
                     </a:solidFill>
@@ -9162,7 +9171,7 @@
               </a:ln>
               <a:extLst>
                 <a:ext uri="{91240B29-F687-4f45-9708-019B960494DF}">
-                  <a14:hiddenLine xmlns:a14="http://schemas.microsoft.com/office/drawing/2010/main" xmlns="" w="9525">
+                  <a14:hiddenLine xmlns="" xmlns:a14="http://schemas.microsoft.com/office/drawing/2010/main" w="9525">
                     <a:solidFill>
                       <a:srgbClr val="000000"/>
                     </a:solidFill>
@@ -9252,7 +9261,7 @@
               </a:ln>
               <a:extLst>
                 <a:ext uri="{91240B29-F687-4f45-9708-019B960494DF}">
-                  <a14:hiddenLine xmlns:a14="http://schemas.microsoft.com/office/drawing/2010/main" xmlns="" w="9525">
+                  <a14:hiddenLine xmlns="" xmlns:a14="http://schemas.microsoft.com/office/drawing/2010/main" w="9525">
                     <a:solidFill>
                       <a:srgbClr val="000000"/>
                     </a:solidFill>
@@ -9314,7 +9323,7 @@
               </a:ln>
               <a:extLst>
                 <a:ext uri="{91240B29-F687-4f45-9708-019B960494DF}">
-                  <a14:hiddenLine xmlns:a14="http://schemas.microsoft.com/office/drawing/2010/main" xmlns="" w="9525">
+                  <a14:hiddenLine xmlns="" xmlns:a14="http://schemas.microsoft.com/office/drawing/2010/main" w="9525">
                     <a:solidFill>
                       <a:srgbClr val="000000"/>
                     </a:solidFill>
@@ -9404,7 +9413,7 @@
               </a:ln>
               <a:extLst>
                 <a:ext uri="{91240B29-F687-4f45-9708-019B960494DF}">
-                  <a14:hiddenLine xmlns:a14="http://schemas.microsoft.com/office/drawing/2010/main" xmlns="" w="9525">
+                  <a14:hiddenLine xmlns="" xmlns:a14="http://schemas.microsoft.com/office/drawing/2010/main" w="9525">
                     <a:solidFill>
                       <a:srgbClr val="000000"/>
                     </a:solidFill>
@@ -9466,7 +9475,7 @@
               </a:ln>
               <a:extLst>
                 <a:ext uri="{91240B29-F687-4f45-9708-019B960494DF}">
-                  <a14:hiddenLine xmlns:a14="http://schemas.microsoft.com/office/drawing/2010/main" xmlns="" w="9525">
+                  <a14:hiddenLine xmlns="" xmlns:a14="http://schemas.microsoft.com/office/drawing/2010/main" w="9525">
                     <a:solidFill>
                       <a:srgbClr val="000000"/>
                     </a:solidFill>
@@ -9528,7 +9537,7 @@
               </a:ln>
               <a:extLst>
                 <a:ext uri="{91240B29-F687-4f45-9708-019B960494DF}">
-                  <a14:hiddenLine xmlns:a14="http://schemas.microsoft.com/office/drawing/2010/main" xmlns="" w="9525">
+                  <a14:hiddenLine xmlns="" xmlns:a14="http://schemas.microsoft.com/office/drawing/2010/main" w="9525">
                     <a:solidFill>
                       <a:srgbClr val="000000"/>
                     </a:solidFill>
@@ -9618,7 +9627,7 @@
               </a:ln>
               <a:extLst>
                 <a:ext uri="{91240B29-F687-4f45-9708-019B960494DF}">
-                  <a14:hiddenLine xmlns:a14="http://schemas.microsoft.com/office/drawing/2010/main" xmlns="" w="9525">
+                  <a14:hiddenLine xmlns="" xmlns:a14="http://schemas.microsoft.com/office/drawing/2010/main" w="9525">
                     <a:solidFill>
                       <a:srgbClr val="000000"/>
                     </a:solidFill>
@@ -9708,7 +9717,7 @@
               </a:ln>
               <a:extLst>
                 <a:ext uri="{91240B29-F687-4f45-9708-019B960494DF}">
-                  <a14:hiddenLine xmlns:a14="http://schemas.microsoft.com/office/drawing/2010/main" xmlns="" w="9525">
+                  <a14:hiddenLine xmlns="" xmlns:a14="http://schemas.microsoft.com/office/drawing/2010/main" w="9525">
                     <a:solidFill>
                       <a:srgbClr val="000000"/>
                     </a:solidFill>
@@ -9770,7 +9779,7 @@
               </a:ln>
               <a:extLst>
                 <a:ext uri="{91240B29-F687-4f45-9708-019B960494DF}">
-                  <a14:hiddenLine xmlns:a14="http://schemas.microsoft.com/office/drawing/2010/main" xmlns="" w="9525">
+                  <a14:hiddenLine xmlns="" xmlns:a14="http://schemas.microsoft.com/office/drawing/2010/main" w="9525">
                     <a:solidFill>
                       <a:srgbClr val="000000"/>
                     </a:solidFill>
@@ -9880,7 +9889,7 @@
               </a:ln>
               <a:extLst>
                 <a:ext uri="{91240B29-F687-4f45-9708-019B960494DF}">
-                  <a14:hiddenLine xmlns:a14="http://schemas.microsoft.com/office/drawing/2010/main" xmlns="" w="9525">
+                  <a14:hiddenLine xmlns="" xmlns:a14="http://schemas.microsoft.com/office/drawing/2010/main" w="9525">
                     <a:solidFill>
                       <a:srgbClr val="000000"/>
                     </a:solidFill>
@@ -9964,7 +9973,7 @@
               </a:ln>
               <a:extLst>
                 <a:ext uri="{91240B29-F687-4f45-9708-019B960494DF}">
-                  <a14:hiddenLine xmlns:a14="http://schemas.microsoft.com/office/drawing/2010/main" xmlns="" w="9525">
+                  <a14:hiddenLine xmlns="" xmlns:a14="http://schemas.microsoft.com/office/drawing/2010/main" w="9525">
                     <a:solidFill>
                       <a:srgbClr val="000000"/>
                     </a:solidFill>
@@ -10026,7 +10035,7 @@
               </a:ln>
               <a:extLst>
                 <a:ext uri="{91240B29-F687-4f45-9708-019B960494DF}">
-                  <a14:hiddenLine xmlns:a14="http://schemas.microsoft.com/office/drawing/2010/main" xmlns="" w="9525">
+                  <a14:hiddenLine xmlns="" xmlns:a14="http://schemas.microsoft.com/office/drawing/2010/main" w="9525">
                     <a:solidFill>
                       <a:srgbClr val="000000"/>
                     </a:solidFill>
@@ -10088,7 +10097,7 @@
               </a:ln>
               <a:extLst>
                 <a:ext uri="{91240B29-F687-4f45-9708-019B960494DF}">
-                  <a14:hiddenLine xmlns:a14="http://schemas.microsoft.com/office/drawing/2010/main" xmlns="" w="9525">
+                  <a14:hiddenLine xmlns="" xmlns:a14="http://schemas.microsoft.com/office/drawing/2010/main" w="9525">
                     <a:solidFill>
                       <a:srgbClr val="000000"/>
                     </a:solidFill>
@@ -10178,7 +10187,7 @@
               </a:ln>
               <a:extLst>
                 <a:ext uri="{91240B29-F687-4f45-9708-019B960494DF}">
-                  <a14:hiddenLine xmlns:a14="http://schemas.microsoft.com/office/drawing/2010/main" xmlns="" w="9525">
+                  <a14:hiddenLine xmlns="" xmlns:a14="http://schemas.microsoft.com/office/drawing/2010/main" w="9525">
                     <a:solidFill>
                       <a:srgbClr val="000000"/>
                     </a:solidFill>
@@ -10212,7 +10221,7 @@
               </a:ln>
               <a:extLst>
                 <a:ext uri="{91240B29-F687-4f45-9708-019B960494DF}">
-                  <a14:hiddenLine xmlns:a14="http://schemas.microsoft.com/office/drawing/2010/main" xmlns="" w="9525">
+                  <a14:hiddenLine xmlns="" xmlns:a14="http://schemas.microsoft.com/office/drawing/2010/main" w="9525">
                     <a:solidFill>
                       <a:srgbClr val="000000"/>
                     </a:solidFill>
@@ -10277,7 +10286,7 @@
               </a:ln>
               <a:extLst>
                 <a:ext uri="{91240B29-F687-4f45-9708-019B960494DF}">
-                  <a14:hiddenLine xmlns:a14="http://schemas.microsoft.com/office/drawing/2010/main" xmlns="" w="9525">
+                  <a14:hiddenLine xmlns="" xmlns:a14="http://schemas.microsoft.com/office/drawing/2010/main" w="9525">
                     <a:solidFill>
                       <a:srgbClr val="000000"/>
                     </a:solidFill>
@@ -10367,7 +10376,7 @@
               </a:ln>
               <a:extLst>
                 <a:ext uri="{91240B29-F687-4f45-9708-019B960494DF}">
-                  <a14:hiddenLine xmlns:a14="http://schemas.microsoft.com/office/drawing/2010/main" xmlns="" w="9525">
+                  <a14:hiddenLine xmlns="" xmlns:a14="http://schemas.microsoft.com/office/drawing/2010/main" w="9525">
                     <a:solidFill>
                       <a:srgbClr val="000000"/>
                     </a:solidFill>
@@ -10429,7 +10438,7 @@
               </a:ln>
               <a:extLst>
                 <a:ext uri="{91240B29-F687-4f45-9708-019B960494DF}">
-                  <a14:hiddenLine xmlns:a14="http://schemas.microsoft.com/office/drawing/2010/main" xmlns="" w="9525">
+                  <a14:hiddenLine xmlns="" xmlns:a14="http://schemas.microsoft.com/office/drawing/2010/main" w="9525">
                     <a:solidFill>
                       <a:srgbClr val="000000"/>
                     </a:solidFill>
@@ -10519,7 +10528,7 @@
               </a:ln>
               <a:extLst>
                 <a:ext uri="{91240B29-F687-4f45-9708-019B960494DF}">
-                  <a14:hiddenLine xmlns:a14="http://schemas.microsoft.com/office/drawing/2010/main" xmlns="" w="9525">
+                  <a14:hiddenLine xmlns="" xmlns:a14="http://schemas.microsoft.com/office/drawing/2010/main" w="9525">
                     <a:solidFill>
                       <a:srgbClr val="000000"/>
                     </a:solidFill>
@@ -10584,7 +10593,7 @@
               </a:ln>
               <a:extLst>
                 <a:ext uri="{91240B29-F687-4f45-9708-019B960494DF}">
-                  <a14:hiddenLine xmlns:a14="http://schemas.microsoft.com/office/drawing/2010/main" xmlns="" w="9525">
+                  <a14:hiddenLine xmlns="" xmlns:a14="http://schemas.microsoft.com/office/drawing/2010/main" w="9525">
                     <a:solidFill>
                       <a:srgbClr val="000000"/>
                     </a:solidFill>
@@ -10646,7 +10655,7 @@
               </a:ln>
               <a:extLst>
                 <a:ext uri="{91240B29-F687-4f45-9708-019B960494DF}">
-                  <a14:hiddenLine xmlns:a14="http://schemas.microsoft.com/office/drawing/2010/main" xmlns="" w="9525">
+                  <a14:hiddenLine xmlns="" xmlns:a14="http://schemas.microsoft.com/office/drawing/2010/main" w="9525">
                     <a:solidFill>
                       <a:srgbClr val="000000"/>
                     </a:solidFill>
@@ -10736,7 +10745,7 @@
               </a:ln>
               <a:extLst>
                 <a:ext uri="{91240B29-F687-4f45-9708-019B960494DF}">
-                  <a14:hiddenLine xmlns:a14="http://schemas.microsoft.com/office/drawing/2010/main" xmlns="" w="9525">
+                  <a14:hiddenLine xmlns="" xmlns:a14="http://schemas.microsoft.com/office/drawing/2010/main" w="9525">
                     <a:solidFill>
                       <a:srgbClr val="000000"/>
                     </a:solidFill>
@@ -10826,7 +10835,7 @@
               </a:ln>
               <a:extLst>
                 <a:ext uri="{91240B29-F687-4f45-9708-019B960494DF}">
-                  <a14:hiddenLine xmlns:a14="http://schemas.microsoft.com/office/drawing/2010/main" xmlns="" w="9525">
+                  <a14:hiddenLine xmlns="" xmlns:a14="http://schemas.microsoft.com/office/drawing/2010/main" w="9525">
                     <a:solidFill>
                       <a:srgbClr val="000000"/>
                     </a:solidFill>
@@ -10891,7 +10900,7 @@
               </a:ln>
               <a:extLst>
                 <a:ext uri="{91240B29-F687-4f45-9708-019B960494DF}">
-                  <a14:hiddenLine xmlns:a14="http://schemas.microsoft.com/office/drawing/2010/main" xmlns="" w="9525">
+                  <a14:hiddenLine xmlns="" xmlns:a14="http://schemas.microsoft.com/office/drawing/2010/main" w="9525">
                     <a:solidFill>
                       <a:srgbClr val="000000"/>
                     </a:solidFill>
@@ -11011,7 +11020,7 @@
               </a:ln>
               <a:extLst>
                 <a:ext uri="{91240B29-F687-4f45-9708-019B960494DF}">
-                  <a14:hiddenLine xmlns:a14="http://schemas.microsoft.com/office/drawing/2010/main" xmlns="" w="9525">
+                  <a14:hiddenLine xmlns="" xmlns:a14="http://schemas.microsoft.com/office/drawing/2010/main" w="9525">
                     <a:solidFill>
                       <a:srgbClr val="000000"/>
                     </a:solidFill>
@@ -11109,7 +11118,7 @@
               </a:ln>
               <a:extLst>
                 <a:ext uri="{91240B29-F687-4f45-9708-019B960494DF}">
-                  <a14:hiddenLine xmlns:a14="http://schemas.microsoft.com/office/drawing/2010/main" xmlns="" w="9525">
+                  <a14:hiddenLine xmlns="" xmlns:a14="http://schemas.microsoft.com/office/drawing/2010/main" w="9525">
                     <a:solidFill>
                       <a:srgbClr val="000000"/>
                     </a:solidFill>
@@ -11224,7 +11233,7 @@
               </a:ln>
               <a:extLst>
                 <a:ext uri="{91240B29-F687-4f45-9708-019B960494DF}">
-                  <a14:hiddenLine xmlns:a14="http://schemas.microsoft.com/office/drawing/2010/main" xmlns="" w="9525">
+                  <a14:hiddenLine xmlns="" xmlns:a14="http://schemas.microsoft.com/office/drawing/2010/main" w="9525">
                     <a:solidFill>
                       <a:srgbClr val="000000"/>
                     </a:solidFill>
@@ -11314,7 +11323,7 @@
               </a:ln>
               <a:extLst>
                 <a:ext uri="{91240B29-F687-4f45-9708-019B960494DF}">
-                  <a14:hiddenLine xmlns:a14="http://schemas.microsoft.com/office/drawing/2010/main" xmlns="" w="9525">
+                  <a14:hiddenLine xmlns="" xmlns:a14="http://schemas.microsoft.com/office/drawing/2010/main" w="9525">
                     <a:solidFill>
                       <a:srgbClr val="000000"/>
                     </a:solidFill>
@@ -11379,7 +11388,7 @@
               </a:ln>
               <a:extLst>
                 <a:ext uri="{91240B29-F687-4f45-9708-019B960494DF}">
-                  <a14:hiddenLine xmlns:a14="http://schemas.microsoft.com/office/drawing/2010/main" xmlns="" w="9525">
+                  <a14:hiddenLine xmlns="" xmlns:a14="http://schemas.microsoft.com/office/drawing/2010/main" w="9525">
                     <a:solidFill>
                       <a:srgbClr val="000000"/>
                     </a:solidFill>
@@ -11469,7 +11478,7 @@
               </a:ln>
               <a:extLst>
                 <a:ext uri="{91240B29-F687-4f45-9708-019B960494DF}">
-                  <a14:hiddenLine xmlns:a14="http://schemas.microsoft.com/office/drawing/2010/main" xmlns="" w="9525">
+                  <a14:hiddenLine xmlns="" xmlns:a14="http://schemas.microsoft.com/office/drawing/2010/main" w="9525">
                     <a:solidFill>
                       <a:srgbClr val="000000"/>
                     </a:solidFill>
@@ -11537,7 +11546,7 @@
               </a:ln>
               <a:extLst>
                 <a:ext uri="{91240B29-F687-4f45-9708-019B960494DF}">
-                  <a14:hiddenLine xmlns:a14="http://schemas.microsoft.com/office/drawing/2010/main" xmlns="" w="9525">
+                  <a14:hiddenLine xmlns="" xmlns:a14="http://schemas.microsoft.com/office/drawing/2010/main" w="9525">
                     <a:solidFill>
                       <a:srgbClr val="000000"/>
                     </a:solidFill>
@@ -11627,7 +11636,7 @@
               </a:ln>
               <a:extLst>
                 <a:ext uri="{91240B29-F687-4f45-9708-019B960494DF}">
-                  <a14:hiddenLine xmlns:a14="http://schemas.microsoft.com/office/drawing/2010/main" xmlns="" w="9525">
+                  <a14:hiddenLine xmlns="" xmlns:a14="http://schemas.microsoft.com/office/drawing/2010/main" w="9525">
                     <a:solidFill>
                       <a:srgbClr val="000000"/>
                     </a:solidFill>
@@ -11695,7 +11704,7 @@
               </a:ln>
               <a:extLst>
                 <a:ext uri="{91240B29-F687-4f45-9708-019B960494DF}">
-                  <a14:hiddenLine xmlns:a14="http://schemas.microsoft.com/office/drawing/2010/main" xmlns="" w="9525">
+                  <a14:hiddenLine xmlns="" xmlns:a14="http://schemas.microsoft.com/office/drawing/2010/main" w="9525">
                     <a:solidFill>
                       <a:srgbClr val="000000"/>
                     </a:solidFill>
@@ -11785,7 +11794,7 @@
               </a:ln>
               <a:extLst>
                 <a:ext uri="{91240B29-F687-4f45-9708-019B960494DF}">
-                  <a14:hiddenLine xmlns:a14="http://schemas.microsoft.com/office/drawing/2010/main" xmlns="" w="9525">
+                  <a14:hiddenLine xmlns="" xmlns:a14="http://schemas.microsoft.com/office/drawing/2010/main" w="9525">
                     <a:solidFill>
                       <a:srgbClr val="000000"/>
                     </a:solidFill>
@@ -11819,7 +11828,7 @@
               </a:ln>
               <a:extLst>
                 <a:ext uri="{91240B29-F687-4f45-9708-019B960494DF}">
-                  <a14:hiddenLine xmlns:a14="http://schemas.microsoft.com/office/drawing/2010/main" xmlns="" w="9525">
+                  <a14:hiddenLine xmlns="" xmlns:a14="http://schemas.microsoft.com/office/drawing/2010/main" w="9525">
                     <a:solidFill>
                       <a:srgbClr val="000000"/>
                     </a:solidFill>
@@ -11960,7 +11969,7 @@
             <a:fld id="{48A87A34-81AB-432B-8DAE-1953F412C126}" type="datetimeFigureOut">
               <a:rPr lang="en-US" dirty="0"/>
               <a:pPr/>
-              <a:t>3/28/18</a:t>
+              <a:t>4/7/18</a:t>
             </a:fld>
             <a:endParaRPr lang="en-US" dirty="0"/>
           </a:p>
@@ -12559,7 +12568,7 @@
           <p:cNvPr id="2" name="제목 1">
             <a:extLst>
               <a:ext uri="{FF2B5EF4-FFF2-40B4-BE49-F238E27FC236}">
-                <a16:creationId xmlns:a16="http://schemas.microsoft.com/office/drawing/2014/main" id="{E70F4F96-788F-DA47-BA01-3FE7006F84A3}"/>
+                <a16:creationId xmlns:a16="http://schemas.microsoft.com/office/drawing/2014/main" id="{887EDC9A-EF8B-FF4B-B492-89F1BB9DAFCB}"/>
               </a:ext>
             </a:extLst>
           </p:cNvPr>
@@ -12575,53 +12584,43 @@
           <a:bodyPr/>
           <a:lstStyle/>
           <a:p>
-            <a:r>
-              <a:rPr kumimoji="1" lang="en-US" altLang="ko-KR" dirty="0"/>
-              <a:t>Various office 365 service - yammer </a:t>
-            </a:r>
-            <a:endParaRPr kumimoji="1" lang="ko-KR" altLang="en-US" dirty="0"/>
+            <a:endParaRPr kumimoji="1" lang="ko-KR" altLang="en-US"/>
           </a:p>
         </p:txBody>
       </p:sp>
-      <p:sp>
-        <p:nvSpPr>
-          <p:cNvPr id="4" name="내용 개체 틀 3">
+      <p:pic>
+        <p:nvPicPr>
+          <p:cNvPr id="9" name="내용 개체 틀 8">
             <a:extLst>
               <a:ext uri="{FF2B5EF4-FFF2-40B4-BE49-F238E27FC236}">
-                <a16:creationId xmlns:a16="http://schemas.microsoft.com/office/drawing/2014/main" id="{233E9378-9DC7-804B-B344-716A9CF09A75}"/>
+                <a16:creationId xmlns:a16="http://schemas.microsoft.com/office/drawing/2014/main" id="{87465855-50B7-B748-8A9E-F3C8E96EB50F}"/>
               </a:ext>
             </a:extLst>
           </p:cNvPr>
-          <p:cNvSpPr>
-            <a:spLocks noGrp="1"/>
-          </p:cNvSpPr>
+          <p:cNvPicPr>
+            <a:picLocks noGrp="1" noChangeAspect="1"/>
+          </p:cNvPicPr>
           <p:nvPr>
             <p:ph idx="1"/>
           </p:nvPr>
-        </p:nvSpPr>
-        <p:spPr/>
-        <p:txBody>
-          <a:bodyPr/>
-          <a:lstStyle/>
-          <a:p>
-            <a:r>
-              <a:rPr kumimoji="1" lang="en-US" altLang="ko-KR" dirty="0"/>
-              <a:t>Yammer is an communication app that can be used to contact anyone in the school with the school account. </a:t>
-            </a:r>
-          </a:p>
-          <a:p>
-            <a:r>
-              <a:rPr kumimoji="1" lang="en-US" altLang="ko-KR" dirty="0"/>
-              <a:t>Just like any SNS, you can do various things that you want to do.</a:t>
-            </a:r>
-            <a:endParaRPr kumimoji="1" lang="ko-KR" altLang="en-US" dirty="0"/>
-          </a:p>
-        </p:txBody>
-      </p:sp>
+        </p:nvPicPr>
+        <p:blipFill>
+          <a:blip r:embed="rId2"/>
+          <a:stretch>
+            <a:fillRect/>
+          </a:stretch>
+        </p:blipFill>
+        <p:spPr>
+          <a:xfrm>
+            <a:off x="1030014" y="166638"/>
+            <a:ext cx="9385738" cy="6555429"/>
+          </a:xfrm>
+        </p:spPr>
+      </p:pic>
     </p:spTree>
     <p:extLst>
       <p:ext uri="{BB962C8B-B14F-4D97-AF65-F5344CB8AC3E}">
-        <p14:creationId xmlns:p14="http://schemas.microsoft.com/office/powerpoint/2010/main" val="2242017102"/>
+        <p14:creationId xmlns:p14="http://schemas.microsoft.com/office/powerpoint/2010/main" val="3462560780"/>
       </p:ext>
     </p:extLst>
   </p:cSld>
@@ -12653,7 +12652,7 @@
           <p:cNvPr id="2" name="제목 1">
             <a:extLst>
               <a:ext uri="{FF2B5EF4-FFF2-40B4-BE49-F238E27FC236}">
-                <a16:creationId xmlns:a16="http://schemas.microsoft.com/office/drawing/2014/main" id="{D3FC1CA4-3F74-7140-8044-C94B51B1B733}"/>
+                <a16:creationId xmlns:a16="http://schemas.microsoft.com/office/drawing/2014/main" id="{B73F2523-8242-244C-B4C1-A3903B52C410}"/>
               </a:ext>
             </a:extLst>
           </p:cNvPr>
@@ -12669,11 +12668,7 @@
           <a:bodyPr/>
           <a:lstStyle/>
           <a:p>
-            <a:r>
-              <a:rPr kumimoji="1" lang="en-US" altLang="ko-KR" dirty="0"/>
-              <a:t>Various office 365 service – Microsoft teams [Currently not accessible]</a:t>
-            </a:r>
-            <a:endParaRPr kumimoji="1" lang="ko-KR" altLang="en-US" dirty="0"/>
+            <a:endParaRPr kumimoji="1" lang="ko-KR" altLang="en-US"/>
           </a:p>
         </p:txBody>
       </p:sp>
@@ -12682,7 +12677,7 @@
           <p:cNvPr id="5" name="내용 개체 틀 4">
             <a:extLst>
               <a:ext uri="{FF2B5EF4-FFF2-40B4-BE49-F238E27FC236}">
-                <a16:creationId xmlns:a16="http://schemas.microsoft.com/office/drawing/2014/main" id="{91328295-2F25-7E4C-A8FD-9C271F8D2AD3}"/>
+                <a16:creationId xmlns:a16="http://schemas.microsoft.com/office/drawing/2014/main" id="{192F7E9D-E980-0F48-8272-A4CC5FF78049}"/>
               </a:ext>
             </a:extLst>
           </p:cNvPr>
@@ -12701,15 +12696,15 @@
         </p:blipFill>
         <p:spPr>
           <a:xfrm>
-            <a:off x="1288559" y="1791099"/>
-            <a:ext cx="8801372" cy="5066901"/>
+            <a:off x="209604" y="84082"/>
+            <a:ext cx="11769616" cy="6443701"/>
           </a:xfrm>
         </p:spPr>
       </p:pic>
     </p:spTree>
     <p:extLst>
       <p:ext uri="{BB962C8B-B14F-4D97-AF65-F5344CB8AC3E}">
-        <p14:creationId xmlns:p14="http://schemas.microsoft.com/office/powerpoint/2010/main" val="1244804893"/>
+        <p14:creationId xmlns:p14="http://schemas.microsoft.com/office/powerpoint/2010/main" val="1395022429"/>
       </p:ext>
     </p:extLst>
   </p:cSld>
@@ -12741,7 +12736,7 @@
           <p:cNvPr id="2" name="제목 1">
             <a:extLst>
               <a:ext uri="{FF2B5EF4-FFF2-40B4-BE49-F238E27FC236}">
-                <a16:creationId xmlns:a16="http://schemas.microsoft.com/office/drawing/2014/main" id="{31044B32-9A49-1A41-8513-3CC0F5F53EA3}"/>
+                <a16:creationId xmlns:a16="http://schemas.microsoft.com/office/drawing/2014/main" id="{E3D44A73-0DDA-1842-BF67-905E39721C16}"/>
               </a:ext>
             </a:extLst>
           </p:cNvPr>
@@ -12757,11 +12752,7 @@
           <a:bodyPr/>
           <a:lstStyle/>
           <a:p>
-            <a:r>
-              <a:rPr kumimoji="1" lang="en-US" altLang="ko-KR" dirty="0"/>
-              <a:t>Various office 365 service - flow</a:t>
-            </a:r>
-            <a:endParaRPr kumimoji="1" lang="ko-KR" altLang="en-US" dirty="0"/>
+            <a:endParaRPr kumimoji="1" lang="ko-KR" altLang="en-US"/>
           </a:p>
         </p:txBody>
       </p:sp>
@@ -12770,7 +12761,7 @@
           <p:cNvPr id="5" name="내용 개체 틀 4">
             <a:extLst>
               <a:ext uri="{FF2B5EF4-FFF2-40B4-BE49-F238E27FC236}">
-                <a16:creationId xmlns:a16="http://schemas.microsoft.com/office/drawing/2014/main" id="{E67EF34C-6818-5D41-A62C-7044C6C0FF50}"/>
+                <a16:creationId xmlns:a16="http://schemas.microsoft.com/office/drawing/2014/main" id="{75976BF3-1F6E-8F4B-9758-CEFB854422C1}"/>
               </a:ext>
             </a:extLst>
           </p:cNvPr>
@@ -12789,15 +12780,15 @@
         </p:blipFill>
         <p:spPr>
           <a:xfrm>
-            <a:off x="882869" y="1513490"/>
-            <a:ext cx="9827745" cy="5337012"/>
+            <a:off x="220716" y="420412"/>
+            <a:ext cx="11520853" cy="5517931"/>
           </a:xfrm>
         </p:spPr>
       </p:pic>
     </p:spTree>
     <p:extLst>
       <p:ext uri="{BB962C8B-B14F-4D97-AF65-F5344CB8AC3E}">
-        <p14:creationId xmlns:p14="http://schemas.microsoft.com/office/powerpoint/2010/main" val="3282916644"/>
+        <p14:creationId xmlns:p14="http://schemas.microsoft.com/office/powerpoint/2010/main" val="1369179033"/>
       </p:ext>
     </p:extLst>
   </p:cSld>
@@ -12829,7 +12820,7 @@
           <p:cNvPr id="2" name="제목 1">
             <a:extLst>
               <a:ext uri="{FF2B5EF4-FFF2-40B4-BE49-F238E27FC236}">
-                <a16:creationId xmlns:a16="http://schemas.microsoft.com/office/drawing/2014/main" id="{ED24486C-16AF-9148-BD36-774B8B1C0AC8}"/>
+                <a16:creationId xmlns:a16="http://schemas.microsoft.com/office/drawing/2014/main" id="{E70F4F96-788F-DA47-BA01-3FE7006F84A3}"/>
               </a:ext>
             </a:extLst>
           </p:cNvPr>
@@ -12847,7 +12838,7 @@
           <a:p>
             <a:r>
               <a:rPr kumimoji="1" lang="en-US" altLang="ko-KR" dirty="0"/>
-              <a:t>Various office 365 service - flow</a:t>
+              <a:t>Various office 365 service - yammer </a:t>
             </a:r>
             <a:endParaRPr kumimoji="1" lang="ko-KR" altLang="en-US" dirty="0"/>
           </a:p>
@@ -12855,10 +12846,10 @@
       </p:sp>
       <p:sp>
         <p:nvSpPr>
-          <p:cNvPr id="3" name="내용 개체 틀 2">
+          <p:cNvPr id="4" name="내용 개체 틀 3">
             <a:extLst>
               <a:ext uri="{FF2B5EF4-FFF2-40B4-BE49-F238E27FC236}">
-                <a16:creationId xmlns:a16="http://schemas.microsoft.com/office/drawing/2014/main" id="{16C82864-FF24-9A4F-A6E5-68F975E28BB6}"/>
+                <a16:creationId xmlns:a16="http://schemas.microsoft.com/office/drawing/2014/main" id="{233E9378-9DC7-804B-B344-716A9CF09A75}"/>
               </a:ext>
             </a:extLst>
           </p:cNvPr>
@@ -12876,7 +12867,13 @@
           <a:p>
             <a:r>
               <a:rPr kumimoji="1" lang="en-US" altLang="ko-KR" dirty="0"/>
-              <a:t>A simple program builder that is based on same system as Scratch. You can build your code and algorithms in this application to apply to any of your program that is related to Microsoft account.</a:t>
+              <a:t>Yammer is an communication app that can be used to contact anyone in the school with the school account. </a:t>
+            </a:r>
+          </a:p>
+          <a:p>
+            <a:r>
+              <a:rPr kumimoji="1" lang="en-US" altLang="ko-KR" dirty="0"/>
+              <a:t>Just like any SNS, you can do various things that you want to do.</a:t>
             </a:r>
             <a:endParaRPr kumimoji="1" lang="ko-KR" altLang="en-US" dirty="0"/>
           </a:p>
@@ -12885,7 +12882,7 @@
     </p:spTree>
     <p:extLst>
       <p:ext uri="{BB962C8B-B14F-4D97-AF65-F5344CB8AC3E}">
-        <p14:creationId xmlns:p14="http://schemas.microsoft.com/office/powerpoint/2010/main" val="216198352"/>
+        <p14:creationId xmlns:p14="http://schemas.microsoft.com/office/powerpoint/2010/main" val="2242017102"/>
       </p:ext>
     </p:extLst>
   </p:cSld>
@@ -12917,7 +12914,7 @@
           <p:cNvPr id="2" name="제목 1">
             <a:extLst>
               <a:ext uri="{FF2B5EF4-FFF2-40B4-BE49-F238E27FC236}">
-                <a16:creationId xmlns:a16="http://schemas.microsoft.com/office/drawing/2014/main" id="{E7E18ADD-8671-BD4A-886B-D4E2F57A52DC}"/>
+                <a16:creationId xmlns:a16="http://schemas.microsoft.com/office/drawing/2014/main" id="{D3FC1CA4-3F74-7140-8044-C94B51B1B733}"/>
               </a:ext>
             </a:extLst>
           </p:cNvPr>
@@ -12935,11 +12932,7 @@
           <a:p>
             <a:r>
               <a:rPr kumimoji="1" lang="en-US" altLang="ko-KR" dirty="0"/>
-              <a:t>Various office 365 service - </a:t>
-            </a:r>
-            <a:r>
-              <a:rPr kumimoji="1" lang="en-US" altLang="ko-KR" dirty="0" err="1"/>
-              <a:t>sharepoint</a:t>
+              <a:t>Various office 365 service – Microsoft teams [Currently not accessible]</a:t>
             </a:r>
             <a:endParaRPr kumimoji="1" lang="ko-KR" altLang="en-US" dirty="0"/>
           </a:p>
@@ -12950,7 +12943,7 @@
           <p:cNvPr id="5" name="내용 개체 틀 4">
             <a:extLst>
               <a:ext uri="{FF2B5EF4-FFF2-40B4-BE49-F238E27FC236}">
-                <a16:creationId xmlns:a16="http://schemas.microsoft.com/office/drawing/2014/main" id="{35C75878-5A5A-2E49-A33F-8025614AD819}"/>
+                <a16:creationId xmlns:a16="http://schemas.microsoft.com/office/drawing/2014/main" id="{91328295-2F25-7E4C-A8FD-9C271F8D2AD3}"/>
               </a:ext>
             </a:extLst>
           </p:cNvPr>
@@ -12969,15 +12962,15 @@
         </p:blipFill>
         <p:spPr>
           <a:xfrm>
-            <a:off x="1063571" y="1642633"/>
-            <a:ext cx="9678001" cy="5215367"/>
+            <a:off x="1288559" y="1791099"/>
+            <a:ext cx="8801372" cy="5066901"/>
           </a:xfrm>
         </p:spPr>
       </p:pic>
     </p:spTree>
     <p:extLst>
       <p:ext uri="{BB962C8B-B14F-4D97-AF65-F5344CB8AC3E}">
-        <p14:creationId xmlns:p14="http://schemas.microsoft.com/office/powerpoint/2010/main" val="3323645695"/>
+        <p14:creationId xmlns:p14="http://schemas.microsoft.com/office/powerpoint/2010/main" val="1244804893"/>
       </p:ext>
     </p:extLst>
   </p:cSld>
@@ -13009,7 +13002,7 @@
           <p:cNvPr id="2" name="제목 1">
             <a:extLst>
               <a:ext uri="{FF2B5EF4-FFF2-40B4-BE49-F238E27FC236}">
-                <a16:creationId xmlns:a16="http://schemas.microsoft.com/office/drawing/2014/main" id="{96DF7BC4-0661-3E4D-AEBE-119A0BAF05D6}"/>
+                <a16:creationId xmlns:a16="http://schemas.microsoft.com/office/drawing/2014/main" id="{31044B32-9A49-1A41-8513-3CC0F5F53EA3}"/>
               </a:ext>
             </a:extLst>
           </p:cNvPr>
@@ -13027,11 +13020,7 @@
           <a:p>
             <a:r>
               <a:rPr kumimoji="1" lang="en-US" altLang="ko-KR" dirty="0"/>
-              <a:t>Various office 365 service - </a:t>
-            </a:r>
-            <a:r>
-              <a:rPr kumimoji="1" lang="en-US" altLang="ko-KR" dirty="0" err="1"/>
-              <a:t>sharepoint</a:t>
+              <a:t>Various office 365 service - flow</a:t>
             </a:r>
             <a:endParaRPr kumimoji="1" lang="ko-KR" altLang="en-US" dirty="0"/>
           </a:p>
@@ -13042,7 +13031,7 @@
           <p:cNvPr id="5" name="내용 개체 틀 4">
             <a:extLst>
               <a:ext uri="{FF2B5EF4-FFF2-40B4-BE49-F238E27FC236}">
-                <a16:creationId xmlns:a16="http://schemas.microsoft.com/office/drawing/2014/main" id="{0CCC5A7D-C529-3049-8DAD-61CAE4FDCAA0}"/>
+                <a16:creationId xmlns:a16="http://schemas.microsoft.com/office/drawing/2014/main" id="{E67EF34C-6818-5D41-A62C-7044C6C0FF50}"/>
               </a:ext>
             </a:extLst>
           </p:cNvPr>
@@ -13061,15 +13050,15 @@
         </p:blipFill>
         <p:spPr>
           <a:xfrm>
-            <a:off x="1141413" y="1587062"/>
-            <a:ext cx="9755977" cy="5270938"/>
+            <a:off x="882869" y="1513490"/>
+            <a:ext cx="9827745" cy="5337012"/>
           </a:xfrm>
         </p:spPr>
       </p:pic>
     </p:spTree>
     <p:extLst>
       <p:ext uri="{BB962C8B-B14F-4D97-AF65-F5344CB8AC3E}">
-        <p14:creationId xmlns:p14="http://schemas.microsoft.com/office/powerpoint/2010/main" val="2865203230"/>
+        <p14:creationId xmlns:p14="http://schemas.microsoft.com/office/powerpoint/2010/main" val="3282916644"/>
       </p:ext>
     </p:extLst>
   </p:cSld>
@@ -13101,7 +13090,7 @@
           <p:cNvPr id="2" name="제목 1">
             <a:extLst>
               <a:ext uri="{FF2B5EF4-FFF2-40B4-BE49-F238E27FC236}">
-                <a16:creationId xmlns:a16="http://schemas.microsoft.com/office/drawing/2014/main" id="{948D0501-1245-7042-A8F6-989DD6242718}"/>
+                <a16:creationId xmlns:a16="http://schemas.microsoft.com/office/drawing/2014/main" id="{ED24486C-16AF-9148-BD36-774B8B1C0AC8}"/>
               </a:ext>
             </a:extLst>
           </p:cNvPr>
@@ -13119,49 +13108,45 @@
           <a:p>
             <a:r>
               <a:rPr kumimoji="1" lang="en-US" altLang="ko-KR" dirty="0"/>
-              <a:t>Various office 365 service - </a:t>
-            </a:r>
-            <a:r>
-              <a:rPr kumimoji="1" lang="en-US" altLang="ko-KR" dirty="0" err="1"/>
-              <a:t>sharepoint</a:t>
+              <a:t>Various office 365 service - flow</a:t>
             </a:r>
             <a:endParaRPr kumimoji="1" lang="ko-KR" altLang="en-US" dirty="0"/>
           </a:p>
         </p:txBody>
       </p:sp>
-      <p:pic>
-        <p:nvPicPr>
-          <p:cNvPr id="5" name="내용 개체 틀 4">
+      <p:sp>
+        <p:nvSpPr>
+          <p:cNvPr id="3" name="내용 개체 틀 2">
             <a:extLst>
               <a:ext uri="{FF2B5EF4-FFF2-40B4-BE49-F238E27FC236}">
-                <a16:creationId xmlns:a16="http://schemas.microsoft.com/office/drawing/2014/main" id="{AF696DEB-2595-FA46-833B-516980B6A014}"/>
+                <a16:creationId xmlns:a16="http://schemas.microsoft.com/office/drawing/2014/main" id="{16C82864-FF24-9A4F-A6E5-68F975E28BB6}"/>
               </a:ext>
             </a:extLst>
           </p:cNvPr>
-          <p:cNvPicPr>
-            <a:picLocks noGrp="1" noChangeAspect="1"/>
-          </p:cNvPicPr>
+          <p:cNvSpPr>
+            <a:spLocks noGrp="1"/>
+          </p:cNvSpPr>
           <p:nvPr>
             <p:ph idx="1"/>
           </p:nvPr>
-        </p:nvPicPr>
-        <p:blipFill>
-          <a:blip r:embed="rId2"/>
-          <a:stretch>
-            <a:fillRect/>
-          </a:stretch>
-        </p:blipFill>
-        <p:spPr>
-          <a:xfrm>
-            <a:off x="1151923" y="1553125"/>
-            <a:ext cx="9831427" cy="5304875"/>
-          </a:xfrm>
-        </p:spPr>
-      </p:pic>
+        </p:nvSpPr>
+        <p:spPr/>
+        <p:txBody>
+          <a:bodyPr/>
+          <a:lstStyle/>
+          <a:p>
+            <a:r>
+              <a:rPr kumimoji="1" lang="en-US" altLang="ko-KR" dirty="0"/>
+              <a:t>A simple program builder that is based on same system as Scratch. You can build your code and algorithms in this application to apply to any of your program that is related to Microsoft account.</a:t>
+            </a:r>
+            <a:endParaRPr kumimoji="1" lang="ko-KR" altLang="en-US" dirty="0"/>
+          </a:p>
+        </p:txBody>
+      </p:sp>
     </p:spTree>
     <p:extLst>
       <p:ext uri="{BB962C8B-B14F-4D97-AF65-F5344CB8AC3E}">
-        <p14:creationId xmlns:p14="http://schemas.microsoft.com/office/powerpoint/2010/main" val="1294291134"/>
+        <p14:creationId xmlns:p14="http://schemas.microsoft.com/office/powerpoint/2010/main" val="216198352"/>
       </p:ext>
     </p:extLst>
   </p:cSld>
@@ -13193,7 +13178,7 @@
           <p:cNvPr id="2" name="제목 1">
             <a:extLst>
               <a:ext uri="{FF2B5EF4-FFF2-40B4-BE49-F238E27FC236}">
-                <a16:creationId xmlns:a16="http://schemas.microsoft.com/office/drawing/2014/main" id="{38EE8B5A-2B92-E548-AE7C-CB448840105C}"/>
+                <a16:creationId xmlns:a16="http://schemas.microsoft.com/office/drawing/2014/main" id="{E7E18ADD-8671-BD4A-886B-D4E2F57A52DC}"/>
               </a:ext>
             </a:extLst>
           </p:cNvPr>
@@ -13211,7 +13196,11 @@
           <a:p>
             <a:r>
               <a:rPr kumimoji="1" lang="en-US" altLang="ko-KR" dirty="0"/>
-              <a:t>Various office 365 service – skype for business</a:t>
+              <a:t>Various office 365 service - </a:t>
+            </a:r>
+            <a:r>
+              <a:rPr kumimoji="1" lang="en-US" altLang="ko-KR" dirty="0" err="1"/>
+              <a:t>sharepoint</a:t>
             </a:r>
             <a:endParaRPr kumimoji="1" lang="ko-KR" altLang="en-US" dirty="0"/>
           </a:p>
@@ -13222,7 +13211,7 @@
           <p:cNvPr id="5" name="내용 개체 틀 4">
             <a:extLst>
               <a:ext uri="{FF2B5EF4-FFF2-40B4-BE49-F238E27FC236}">
-                <a16:creationId xmlns:a16="http://schemas.microsoft.com/office/drawing/2014/main" id="{39FA6669-1806-2B4C-9470-95BA89E9FBAA}"/>
+                <a16:creationId xmlns:a16="http://schemas.microsoft.com/office/drawing/2014/main" id="{35C75878-5A5A-2E49-A33F-8025614AD819}"/>
               </a:ext>
             </a:extLst>
           </p:cNvPr>
@@ -13241,15 +13230,107 @@
         </p:blipFill>
         <p:spPr>
           <a:xfrm>
-            <a:off x="1141413" y="1786287"/>
-            <a:ext cx="9001070" cy="4919313"/>
+            <a:off x="1063571" y="1642633"/>
+            <a:ext cx="9678001" cy="5215367"/>
           </a:xfrm>
         </p:spPr>
       </p:pic>
     </p:spTree>
     <p:extLst>
       <p:ext uri="{BB962C8B-B14F-4D97-AF65-F5344CB8AC3E}">
-        <p14:creationId xmlns:p14="http://schemas.microsoft.com/office/powerpoint/2010/main" val="2693434169"/>
+        <p14:creationId xmlns:p14="http://schemas.microsoft.com/office/powerpoint/2010/main" val="3323645695"/>
+      </p:ext>
+    </p:extLst>
+  </p:cSld>
+  <p:clrMapOvr>
+    <a:masterClrMapping/>
+  </p:clrMapOvr>
+</p:sld>
+</file>
+
+<file path=ppt/slides/slide19.xml><?xml version="1.0" encoding="utf-8"?>
+<p:sld xmlns:a="http://schemas.openxmlformats.org/drawingml/2006/main" xmlns:r="http://schemas.openxmlformats.org/officeDocument/2006/relationships" xmlns:p="http://schemas.openxmlformats.org/presentationml/2006/main">
+  <p:cSld>
+    <p:spTree>
+      <p:nvGrpSpPr>
+        <p:cNvPr id="1" name=""/>
+        <p:cNvGrpSpPr/>
+        <p:nvPr/>
+      </p:nvGrpSpPr>
+      <p:grpSpPr>
+        <a:xfrm>
+          <a:off x="0" y="0"/>
+          <a:ext cx="0" cy="0"/>
+          <a:chOff x="0" y="0"/>
+          <a:chExt cx="0" cy="0"/>
+        </a:xfrm>
+      </p:grpSpPr>
+      <p:sp>
+        <p:nvSpPr>
+          <p:cNvPr id="2" name="제목 1">
+            <a:extLst>
+              <a:ext uri="{FF2B5EF4-FFF2-40B4-BE49-F238E27FC236}">
+                <a16:creationId xmlns:a16="http://schemas.microsoft.com/office/drawing/2014/main" id="{96DF7BC4-0661-3E4D-AEBE-119A0BAF05D6}"/>
+              </a:ext>
+            </a:extLst>
+          </p:cNvPr>
+          <p:cNvSpPr>
+            <a:spLocks noGrp="1"/>
+          </p:cNvSpPr>
+          <p:nvPr>
+            <p:ph type="title"/>
+          </p:nvPr>
+        </p:nvSpPr>
+        <p:spPr/>
+        <p:txBody>
+          <a:bodyPr/>
+          <a:lstStyle/>
+          <a:p>
+            <a:r>
+              <a:rPr kumimoji="1" lang="en-US" altLang="ko-KR" dirty="0"/>
+              <a:t>Various office 365 service - </a:t>
+            </a:r>
+            <a:r>
+              <a:rPr kumimoji="1" lang="en-US" altLang="ko-KR" dirty="0" err="1"/>
+              <a:t>sharepoint</a:t>
+            </a:r>
+            <a:endParaRPr kumimoji="1" lang="ko-KR" altLang="en-US" dirty="0"/>
+          </a:p>
+        </p:txBody>
+      </p:sp>
+      <p:pic>
+        <p:nvPicPr>
+          <p:cNvPr id="5" name="내용 개체 틀 4">
+            <a:extLst>
+              <a:ext uri="{FF2B5EF4-FFF2-40B4-BE49-F238E27FC236}">
+                <a16:creationId xmlns:a16="http://schemas.microsoft.com/office/drawing/2014/main" id="{0CCC5A7D-C529-3049-8DAD-61CAE4FDCAA0}"/>
+              </a:ext>
+            </a:extLst>
+          </p:cNvPr>
+          <p:cNvPicPr>
+            <a:picLocks noGrp="1" noChangeAspect="1"/>
+          </p:cNvPicPr>
+          <p:nvPr>
+            <p:ph idx="1"/>
+          </p:nvPr>
+        </p:nvPicPr>
+        <p:blipFill>
+          <a:blip r:embed="rId2"/>
+          <a:stretch>
+            <a:fillRect/>
+          </a:stretch>
+        </p:blipFill>
+        <p:spPr>
+          <a:xfrm>
+            <a:off x="1141413" y="1587062"/>
+            <a:ext cx="9755977" cy="5270938"/>
+          </a:xfrm>
+        </p:spPr>
+      </p:pic>
+    </p:spTree>
+    <p:extLst>
+      <p:ext uri="{BB962C8B-B14F-4D97-AF65-F5344CB8AC3E}">
+        <p14:creationId xmlns:p14="http://schemas.microsoft.com/office/powerpoint/2010/main" val="2865203230"/>
       </p:ext>
     </p:extLst>
   </p:cSld>
@@ -13386,6 +13467,715 @@
 </p:sld>
 </file>
 
+<file path=ppt/slides/slide20.xml><?xml version="1.0" encoding="utf-8"?>
+<p:sld xmlns:a="http://schemas.openxmlformats.org/drawingml/2006/main" xmlns:r="http://schemas.openxmlformats.org/officeDocument/2006/relationships" xmlns:p="http://schemas.openxmlformats.org/presentationml/2006/main">
+  <p:cSld>
+    <p:spTree>
+      <p:nvGrpSpPr>
+        <p:cNvPr id="1" name=""/>
+        <p:cNvGrpSpPr/>
+        <p:nvPr/>
+      </p:nvGrpSpPr>
+      <p:grpSpPr>
+        <a:xfrm>
+          <a:off x="0" y="0"/>
+          <a:ext cx="0" cy="0"/>
+          <a:chOff x="0" y="0"/>
+          <a:chExt cx="0" cy="0"/>
+        </a:xfrm>
+      </p:grpSpPr>
+      <p:sp>
+        <p:nvSpPr>
+          <p:cNvPr id="2" name="제목 1">
+            <a:extLst>
+              <a:ext uri="{FF2B5EF4-FFF2-40B4-BE49-F238E27FC236}">
+                <a16:creationId xmlns:a16="http://schemas.microsoft.com/office/drawing/2014/main" id="{948D0501-1245-7042-A8F6-989DD6242718}"/>
+              </a:ext>
+            </a:extLst>
+          </p:cNvPr>
+          <p:cNvSpPr>
+            <a:spLocks noGrp="1"/>
+          </p:cNvSpPr>
+          <p:nvPr>
+            <p:ph type="title"/>
+          </p:nvPr>
+        </p:nvSpPr>
+        <p:spPr/>
+        <p:txBody>
+          <a:bodyPr/>
+          <a:lstStyle/>
+          <a:p>
+            <a:r>
+              <a:rPr kumimoji="1" lang="en-US" altLang="ko-KR" dirty="0"/>
+              <a:t>Various office 365 service - </a:t>
+            </a:r>
+            <a:r>
+              <a:rPr kumimoji="1" lang="en-US" altLang="ko-KR" dirty="0" err="1"/>
+              <a:t>sharepoint</a:t>
+            </a:r>
+            <a:endParaRPr kumimoji="1" lang="ko-KR" altLang="en-US" dirty="0"/>
+          </a:p>
+        </p:txBody>
+      </p:sp>
+      <p:pic>
+        <p:nvPicPr>
+          <p:cNvPr id="5" name="내용 개체 틀 4">
+            <a:extLst>
+              <a:ext uri="{FF2B5EF4-FFF2-40B4-BE49-F238E27FC236}">
+                <a16:creationId xmlns:a16="http://schemas.microsoft.com/office/drawing/2014/main" id="{AF696DEB-2595-FA46-833B-516980B6A014}"/>
+              </a:ext>
+            </a:extLst>
+          </p:cNvPr>
+          <p:cNvPicPr>
+            <a:picLocks noGrp="1" noChangeAspect="1"/>
+          </p:cNvPicPr>
+          <p:nvPr>
+            <p:ph idx="1"/>
+          </p:nvPr>
+        </p:nvPicPr>
+        <p:blipFill>
+          <a:blip r:embed="rId2"/>
+          <a:stretch>
+            <a:fillRect/>
+          </a:stretch>
+        </p:blipFill>
+        <p:spPr>
+          <a:xfrm>
+            <a:off x="1151923" y="1553125"/>
+            <a:ext cx="9831427" cy="5304875"/>
+          </a:xfrm>
+        </p:spPr>
+      </p:pic>
+    </p:spTree>
+    <p:extLst>
+      <p:ext uri="{BB962C8B-B14F-4D97-AF65-F5344CB8AC3E}">
+        <p14:creationId xmlns:p14="http://schemas.microsoft.com/office/powerpoint/2010/main" val="1294291134"/>
+      </p:ext>
+    </p:extLst>
+  </p:cSld>
+  <p:clrMapOvr>
+    <a:masterClrMapping/>
+  </p:clrMapOvr>
+</p:sld>
+</file>
+
+<file path=ppt/slides/slide21.xml><?xml version="1.0" encoding="utf-8"?>
+<p:sld xmlns:a="http://schemas.openxmlformats.org/drawingml/2006/main" xmlns:r="http://schemas.openxmlformats.org/officeDocument/2006/relationships" xmlns:p="http://schemas.openxmlformats.org/presentationml/2006/main">
+  <p:cSld>
+    <p:spTree>
+      <p:nvGrpSpPr>
+        <p:cNvPr id="1" name=""/>
+        <p:cNvGrpSpPr/>
+        <p:nvPr/>
+      </p:nvGrpSpPr>
+      <p:grpSpPr>
+        <a:xfrm>
+          <a:off x="0" y="0"/>
+          <a:ext cx="0" cy="0"/>
+          <a:chOff x="0" y="0"/>
+          <a:chExt cx="0" cy="0"/>
+        </a:xfrm>
+      </p:grpSpPr>
+      <p:sp>
+        <p:nvSpPr>
+          <p:cNvPr id="2" name="제목 1">
+            <a:extLst>
+              <a:ext uri="{FF2B5EF4-FFF2-40B4-BE49-F238E27FC236}">
+                <a16:creationId xmlns:a16="http://schemas.microsoft.com/office/drawing/2014/main" id="{38EE8B5A-2B92-E548-AE7C-CB448840105C}"/>
+              </a:ext>
+            </a:extLst>
+          </p:cNvPr>
+          <p:cNvSpPr>
+            <a:spLocks noGrp="1"/>
+          </p:cNvSpPr>
+          <p:nvPr>
+            <p:ph type="title"/>
+          </p:nvPr>
+        </p:nvSpPr>
+        <p:spPr/>
+        <p:txBody>
+          <a:bodyPr/>
+          <a:lstStyle/>
+          <a:p>
+            <a:r>
+              <a:rPr kumimoji="1" lang="en-US" altLang="ko-KR" dirty="0"/>
+              <a:t>Various office 365 service – skype for business</a:t>
+            </a:r>
+            <a:endParaRPr kumimoji="1" lang="ko-KR" altLang="en-US" dirty="0"/>
+          </a:p>
+        </p:txBody>
+      </p:sp>
+      <p:pic>
+        <p:nvPicPr>
+          <p:cNvPr id="5" name="내용 개체 틀 4">
+            <a:extLst>
+              <a:ext uri="{FF2B5EF4-FFF2-40B4-BE49-F238E27FC236}">
+                <a16:creationId xmlns:a16="http://schemas.microsoft.com/office/drawing/2014/main" id="{39FA6669-1806-2B4C-9470-95BA89E9FBAA}"/>
+              </a:ext>
+            </a:extLst>
+          </p:cNvPr>
+          <p:cNvPicPr>
+            <a:picLocks noGrp="1" noChangeAspect="1"/>
+          </p:cNvPicPr>
+          <p:nvPr>
+            <p:ph idx="1"/>
+          </p:nvPr>
+        </p:nvPicPr>
+        <p:blipFill>
+          <a:blip r:embed="rId2"/>
+          <a:stretch>
+            <a:fillRect/>
+          </a:stretch>
+        </p:blipFill>
+        <p:spPr>
+          <a:xfrm>
+            <a:off x="1141413" y="1786287"/>
+            <a:ext cx="9001070" cy="4919313"/>
+          </a:xfrm>
+        </p:spPr>
+      </p:pic>
+    </p:spTree>
+    <p:extLst>
+      <p:ext uri="{BB962C8B-B14F-4D97-AF65-F5344CB8AC3E}">
+        <p14:creationId xmlns:p14="http://schemas.microsoft.com/office/powerpoint/2010/main" val="2693434169"/>
+      </p:ext>
+    </p:extLst>
+  </p:cSld>
+  <p:clrMapOvr>
+    <a:masterClrMapping/>
+  </p:clrMapOvr>
+</p:sld>
+</file>
+
+<file path=ppt/slides/slide22.xml><?xml version="1.0" encoding="utf-8"?>
+<p:sld xmlns:a="http://schemas.openxmlformats.org/drawingml/2006/main" xmlns:r="http://schemas.openxmlformats.org/officeDocument/2006/relationships" xmlns:p="http://schemas.openxmlformats.org/presentationml/2006/main">
+  <p:cSld>
+    <p:spTree>
+      <p:nvGrpSpPr>
+        <p:cNvPr id="1" name=""/>
+        <p:cNvGrpSpPr/>
+        <p:nvPr/>
+      </p:nvGrpSpPr>
+      <p:grpSpPr>
+        <a:xfrm>
+          <a:off x="0" y="0"/>
+          <a:ext cx="0" cy="0"/>
+          <a:chOff x="0" y="0"/>
+          <a:chExt cx="0" cy="0"/>
+        </a:xfrm>
+      </p:grpSpPr>
+      <p:sp>
+        <p:nvSpPr>
+          <p:cNvPr id="2" name="제목 1">
+            <a:extLst>
+              <a:ext uri="{FF2B5EF4-FFF2-40B4-BE49-F238E27FC236}">
+                <a16:creationId xmlns:a16="http://schemas.microsoft.com/office/drawing/2014/main" id="{87752135-4ECE-1C4E-8D89-F245DC4F7C9D}"/>
+              </a:ext>
+            </a:extLst>
+          </p:cNvPr>
+          <p:cNvSpPr>
+            <a:spLocks noGrp="1"/>
+          </p:cNvSpPr>
+          <p:nvPr>
+            <p:ph type="title"/>
+          </p:nvPr>
+        </p:nvSpPr>
+        <p:spPr>
+          <a:xfrm>
+            <a:off x="998483" y="124532"/>
+            <a:ext cx="9905998" cy="1478570"/>
+          </a:xfrm>
+        </p:spPr>
+        <p:txBody>
+          <a:bodyPr/>
+          <a:lstStyle/>
+          <a:p>
+            <a:r>
+              <a:rPr kumimoji="1" lang="en-US" altLang="ko-KR" dirty="0"/>
+              <a:t>Various office 365 service – </a:t>
+            </a:r>
+            <a:r>
+              <a:rPr kumimoji="1" lang="en-US" altLang="ko-KR" dirty="0" err="1"/>
+              <a:t>Powerapp</a:t>
+            </a:r>
+            <a:r>
+              <a:rPr kumimoji="1" lang="en-US" altLang="ko-KR" dirty="0"/>
+              <a:t> and dynamics 365</a:t>
+            </a:r>
+            <a:endParaRPr kumimoji="1" lang="ko-KR" altLang="en-US" dirty="0"/>
+          </a:p>
+        </p:txBody>
+      </p:sp>
+      <p:pic>
+        <p:nvPicPr>
+          <p:cNvPr id="5" name="내용 개체 틀 4">
+            <a:extLst>
+              <a:ext uri="{FF2B5EF4-FFF2-40B4-BE49-F238E27FC236}">
+                <a16:creationId xmlns:a16="http://schemas.microsoft.com/office/drawing/2014/main" id="{2800ED8A-476A-3F42-8361-A258486F09A4}"/>
+              </a:ext>
+            </a:extLst>
+          </p:cNvPr>
+          <p:cNvPicPr>
+            <a:picLocks noGrp="1" noChangeAspect="1"/>
+          </p:cNvPicPr>
+          <p:nvPr>
+            <p:ph idx="1"/>
+          </p:nvPr>
+        </p:nvPicPr>
+        <p:blipFill>
+          <a:blip r:embed="rId2"/>
+          <a:stretch>
+            <a:fillRect/>
+          </a:stretch>
+        </p:blipFill>
+        <p:spPr>
+          <a:xfrm>
+            <a:off x="998483" y="1460400"/>
+            <a:ext cx="9764109" cy="5397600"/>
+          </a:xfrm>
+        </p:spPr>
+      </p:pic>
+    </p:spTree>
+    <p:extLst>
+      <p:ext uri="{BB962C8B-B14F-4D97-AF65-F5344CB8AC3E}">
+        <p14:creationId xmlns:p14="http://schemas.microsoft.com/office/powerpoint/2010/main" val="450262492"/>
+      </p:ext>
+    </p:extLst>
+  </p:cSld>
+  <p:clrMapOvr>
+    <a:masterClrMapping/>
+  </p:clrMapOvr>
+</p:sld>
+</file>
+
+<file path=ppt/slides/slide23.xml><?xml version="1.0" encoding="utf-8"?>
+<p:sld xmlns:a="http://schemas.openxmlformats.org/drawingml/2006/main" xmlns:r="http://schemas.openxmlformats.org/officeDocument/2006/relationships" xmlns:p="http://schemas.openxmlformats.org/presentationml/2006/main">
+  <p:cSld>
+    <p:spTree>
+      <p:nvGrpSpPr>
+        <p:cNvPr id="1" name=""/>
+        <p:cNvGrpSpPr/>
+        <p:nvPr/>
+      </p:nvGrpSpPr>
+      <p:grpSpPr>
+        <a:xfrm>
+          <a:off x="0" y="0"/>
+          <a:ext cx="0" cy="0"/>
+          <a:chOff x="0" y="0"/>
+          <a:chExt cx="0" cy="0"/>
+        </a:xfrm>
+      </p:grpSpPr>
+      <p:sp>
+        <p:nvSpPr>
+          <p:cNvPr id="2" name="제목 1">
+            <a:extLst>
+              <a:ext uri="{FF2B5EF4-FFF2-40B4-BE49-F238E27FC236}">
+                <a16:creationId xmlns:a16="http://schemas.microsoft.com/office/drawing/2014/main" id="{D6EC6892-6102-6840-9156-100DC4C773BD}"/>
+              </a:ext>
+            </a:extLst>
+          </p:cNvPr>
+          <p:cNvSpPr>
+            <a:spLocks noGrp="1"/>
+          </p:cNvSpPr>
+          <p:nvPr>
+            <p:ph type="title"/>
+          </p:nvPr>
+        </p:nvSpPr>
+        <p:spPr/>
+        <p:txBody>
+          <a:bodyPr/>
+          <a:lstStyle/>
+          <a:p>
+            <a:endParaRPr kumimoji="1" lang="ko-KR" altLang="en-US"/>
+          </a:p>
+        </p:txBody>
+      </p:sp>
+      <p:pic>
+        <p:nvPicPr>
+          <p:cNvPr id="5" name="내용 개체 틀 4">
+            <a:extLst>
+              <a:ext uri="{FF2B5EF4-FFF2-40B4-BE49-F238E27FC236}">
+                <a16:creationId xmlns:a16="http://schemas.microsoft.com/office/drawing/2014/main" id="{D86D99A0-017D-804B-ACB0-EEF8F14BE015}"/>
+              </a:ext>
+            </a:extLst>
+          </p:cNvPr>
+          <p:cNvPicPr>
+            <a:picLocks noGrp="1" noChangeAspect="1"/>
+          </p:cNvPicPr>
+          <p:nvPr>
+            <p:ph idx="1"/>
+          </p:nvPr>
+        </p:nvPicPr>
+        <p:blipFill>
+          <a:blip r:embed="rId2"/>
+          <a:stretch>
+            <a:fillRect/>
+          </a:stretch>
+        </p:blipFill>
+        <p:spPr>
+          <a:xfrm>
+            <a:off x="673702" y="0"/>
+            <a:ext cx="10373709" cy="6739676"/>
+          </a:xfrm>
+        </p:spPr>
+      </p:pic>
+    </p:spTree>
+    <p:extLst>
+      <p:ext uri="{BB962C8B-B14F-4D97-AF65-F5344CB8AC3E}">
+        <p14:creationId xmlns:p14="http://schemas.microsoft.com/office/powerpoint/2010/main" val="2932136876"/>
+      </p:ext>
+    </p:extLst>
+  </p:cSld>
+  <p:clrMapOvr>
+    <a:masterClrMapping/>
+  </p:clrMapOvr>
+</p:sld>
+</file>
+
+<file path=ppt/slides/slide24.xml><?xml version="1.0" encoding="utf-8"?>
+<p:sld xmlns:a="http://schemas.openxmlformats.org/drawingml/2006/main" xmlns:r="http://schemas.openxmlformats.org/officeDocument/2006/relationships" xmlns:p="http://schemas.openxmlformats.org/presentationml/2006/main">
+  <p:cSld>
+    <p:spTree>
+      <p:nvGrpSpPr>
+        <p:cNvPr id="1" name=""/>
+        <p:cNvGrpSpPr/>
+        <p:nvPr/>
+      </p:nvGrpSpPr>
+      <p:grpSpPr>
+        <a:xfrm>
+          <a:off x="0" y="0"/>
+          <a:ext cx="0" cy="0"/>
+          <a:chOff x="0" y="0"/>
+          <a:chExt cx="0" cy="0"/>
+        </a:xfrm>
+      </p:grpSpPr>
+      <p:sp>
+        <p:nvSpPr>
+          <p:cNvPr id="2" name="제목 1">
+            <a:extLst>
+              <a:ext uri="{FF2B5EF4-FFF2-40B4-BE49-F238E27FC236}">
+                <a16:creationId xmlns:a16="http://schemas.microsoft.com/office/drawing/2014/main" id="{20AC3D9F-E3D6-9943-BE2A-D0987F148D82}"/>
+              </a:ext>
+            </a:extLst>
+          </p:cNvPr>
+          <p:cNvSpPr>
+            <a:spLocks noGrp="1"/>
+          </p:cNvSpPr>
+          <p:nvPr>
+            <p:ph type="title"/>
+          </p:nvPr>
+        </p:nvSpPr>
+        <p:spPr/>
+        <p:txBody>
+          <a:bodyPr/>
+          <a:lstStyle/>
+          <a:p>
+            <a:endParaRPr kumimoji="1" lang="ko-KR" altLang="en-US"/>
+          </a:p>
+        </p:txBody>
+      </p:sp>
+      <p:pic>
+        <p:nvPicPr>
+          <p:cNvPr id="5" name="내용 개체 틀 4">
+            <a:extLst>
+              <a:ext uri="{FF2B5EF4-FFF2-40B4-BE49-F238E27FC236}">
+                <a16:creationId xmlns:a16="http://schemas.microsoft.com/office/drawing/2014/main" id="{DCFE442C-3E84-314B-8883-CAB7326890E2}"/>
+              </a:ext>
+            </a:extLst>
+          </p:cNvPr>
+          <p:cNvPicPr>
+            <a:picLocks noGrp="1" noChangeAspect="1"/>
+          </p:cNvPicPr>
+          <p:nvPr>
+            <p:ph idx="1"/>
+          </p:nvPr>
+        </p:nvPicPr>
+        <p:blipFill>
+          <a:blip r:embed="rId2"/>
+          <a:stretch>
+            <a:fillRect/>
+          </a:stretch>
+        </p:blipFill>
+        <p:spPr>
+          <a:xfrm>
+            <a:off x="149441" y="819807"/>
+            <a:ext cx="11889942" cy="5076497"/>
+          </a:xfrm>
+        </p:spPr>
+      </p:pic>
+    </p:spTree>
+    <p:extLst>
+      <p:ext uri="{BB962C8B-B14F-4D97-AF65-F5344CB8AC3E}">
+        <p14:creationId xmlns:p14="http://schemas.microsoft.com/office/powerpoint/2010/main" val="4185272122"/>
+      </p:ext>
+    </p:extLst>
+  </p:cSld>
+  <p:clrMapOvr>
+    <a:masterClrMapping/>
+  </p:clrMapOvr>
+</p:sld>
+</file>
+
+<file path=ppt/slides/slide25.xml><?xml version="1.0" encoding="utf-8"?>
+<p:sld xmlns:a="http://schemas.openxmlformats.org/drawingml/2006/main" xmlns:r="http://schemas.openxmlformats.org/officeDocument/2006/relationships" xmlns:p="http://schemas.openxmlformats.org/presentationml/2006/main">
+  <p:cSld>
+    <p:spTree>
+      <p:nvGrpSpPr>
+        <p:cNvPr id="1" name=""/>
+        <p:cNvGrpSpPr/>
+        <p:nvPr/>
+      </p:nvGrpSpPr>
+      <p:grpSpPr>
+        <a:xfrm>
+          <a:off x="0" y="0"/>
+          <a:ext cx="0" cy="0"/>
+          <a:chOff x="0" y="0"/>
+          <a:chExt cx="0" cy="0"/>
+        </a:xfrm>
+      </p:grpSpPr>
+      <p:sp>
+        <p:nvSpPr>
+          <p:cNvPr id="2" name="제목 1">
+            <a:extLst>
+              <a:ext uri="{FF2B5EF4-FFF2-40B4-BE49-F238E27FC236}">
+                <a16:creationId xmlns:a16="http://schemas.microsoft.com/office/drawing/2014/main" id="{85FB1D1E-178E-3849-8FF2-9F209E0F5164}"/>
+              </a:ext>
+            </a:extLst>
+          </p:cNvPr>
+          <p:cNvSpPr>
+            <a:spLocks noGrp="1"/>
+          </p:cNvSpPr>
+          <p:nvPr>
+            <p:ph type="title"/>
+          </p:nvPr>
+        </p:nvSpPr>
+        <p:spPr/>
+        <p:txBody>
+          <a:bodyPr/>
+          <a:lstStyle/>
+          <a:p>
+            <a:endParaRPr kumimoji="1" lang="ko-KR" altLang="en-US"/>
+          </a:p>
+        </p:txBody>
+      </p:sp>
+      <p:pic>
+        <p:nvPicPr>
+          <p:cNvPr id="5" name="내용 개체 틀 4">
+            <a:extLst>
+              <a:ext uri="{FF2B5EF4-FFF2-40B4-BE49-F238E27FC236}">
+                <a16:creationId xmlns:a16="http://schemas.microsoft.com/office/drawing/2014/main" id="{A6B383C2-A41D-BC44-8493-C5AE915F864E}"/>
+              </a:ext>
+            </a:extLst>
+          </p:cNvPr>
+          <p:cNvPicPr>
+            <a:picLocks noGrp="1" noChangeAspect="1"/>
+          </p:cNvPicPr>
+          <p:nvPr>
+            <p:ph idx="1"/>
+          </p:nvPr>
+        </p:nvPicPr>
+        <p:blipFill>
+          <a:blip r:embed="rId2"/>
+          <a:stretch>
+            <a:fillRect/>
+          </a:stretch>
+        </p:blipFill>
+        <p:spPr>
+          <a:xfrm>
+            <a:off x="76464" y="73573"/>
+            <a:ext cx="11957881" cy="6610078"/>
+          </a:xfrm>
+        </p:spPr>
+      </p:pic>
+    </p:spTree>
+    <p:extLst>
+      <p:ext uri="{BB962C8B-B14F-4D97-AF65-F5344CB8AC3E}">
+        <p14:creationId xmlns:p14="http://schemas.microsoft.com/office/powerpoint/2010/main" val="859600410"/>
+      </p:ext>
+    </p:extLst>
+  </p:cSld>
+  <p:clrMapOvr>
+    <a:masterClrMapping/>
+  </p:clrMapOvr>
+</p:sld>
+</file>
+
+<file path=ppt/slides/slide26.xml><?xml version="1.0" encoding="utf-8"?>
+<p:sld xmlns:a="http://schemas.openxmlformats.org/drawingml/2006/main" xmlns:r="http://schemas.openxmlformats.org/officeDocument/2006/relationships" xmlns:p="http://schemas.openxmlformats.org/presentationml/2006/main">
+  <p:cSld>
+    <p:spTree>
+      <p:nvGrpSpPr>
+        <p:cNvPr id="1" name=""/>
+        <p:cNvGrpSpPr/>
+        <p:nvPr/>
+      </p:nvGrpSpPr>
+      <p:grpSpPr>
+        <a:xfrm>
+          <a:off x="0" y="0"/>
+          <a:ext cx="0" cy="0"/>
+          <a:chOff x="0" y="0"/>
+          <a:chExt cx="0" cy="0"/>
+        </a:xfrm>
+      </p:grpSpPr>
+      <p:sp>
+        <p:nvSpPr>
+          <p:cNvPr id="2" name="제목 1">
+            <a:extLst>
+              <a:ext uri="{FF2B5EF4-FFF2-40B4-BE49-F238E27FC236}">
+                <a16:creationId xmlns:a16="http://schemas.microsoft.com/office/drawing/2014/main" id="{A896220B-A2E5-144C-BAAC-75335EB75370}"/>
+              </a:ext>
+            </a:extLst>
+          </p:cNvPr>
+          <p:cNvSpPr>
+            <a:spLocks noGrp="1"/>
+          </p:cNvSpPr>
+          <p:nvPr>
+            <p:ph type="title"/>
+          </p:nvPr>
+        </p:nvSpPr>
+        <p:spPr/>
+        <p:txBody>
+          <a:bodyPr/>
+          <a:lstStyle/>
+          <a:p>
+            <a:endParaRPr kumimoji="1" lang="ko-KR" altLang="en-US"/>
+          </a:p>
+        </p:txBody>
+      </p:sp>
+      <p:pic>
+        <p:nvPicPr>
+          <p:cNvPr id="5" name="내용 개체 틀 4">
+            <a:extLst>
+              <a:ext uri="{FF2B5EF4-FFF2-40B4-BE49-F238E27FC236}">
+                <a16:creationId xmlns:a16="http://schemas.microsoft.com/office/drawing/2014/main" id="{666E42C9-64EC-DD47-B1D5-41DB5689A54A}"/>
+              </a:ext>
+            </a:extLst>
+          </p:cNvPr>
+          <p:cNvPicPr>
+            <a:picLocks noGrp="1" noChangeAspect="1"/>
+          </p:cNvPicPr>
+          <p:nvPr>
+            <p:ph idx="1"/>
+          </p:nvPr>
+        </p:nvPicPr>
+        <p:blipFill>
+          <a:blip r:embed="rId2"/>
+          <a:stretch>
+            <a:fillRect/>
+          </a:stretch>
+        </p:blipFill>
+        <p:spPr>
+          <a:xfrm>
+            <a:off x="216853" y="676599"/>
+            <a:ext cx="11755118" cy="5680841"/>
+          </a:xfrm>
+        </p:spPr>
+      </p:pic>
+    </p:spTree>
+    <p:extLst>
+      <p:ext uri="{BB962C8B-B14F-4D97-AF65-F5344CB8AC3E}">
+        <p14:creationId xmlns:p14="http://schemas.microsoft.com/office/powerpoint/2010/main" val="3256660935"/>
+      </p:ext>
+    </p:extLst>
+  </p:cSld>
+  <p:clrMapOvr>
+    <a:masterClrMapping/>
+  </p:clrMapOvr>
+</p:sld>
+</file>
+
+<file path=ppt/slides/slide27.xml><?xml version="1.0" encoding="utf-8"?>
+<p:sld xmlns:a="http://schemas.openxmlformats.org/drawingml/2006/main" xmlns:r="http://schemas.openxmlformats.org/officeDocument/2006/relationships" xmlns:p="http://schemas.openxmlformats.org/presentationml/2006/main">
+  <p:cSld>
+    <p:spTree>
+      <p:nvGrpSpPr>
+        <p:cNvPr id="1" name=""/>
+        <p:cNvGrpSpPr/>
+        <p:nvPr/>
+      </p:nvGrpSpPr>
+      <p:grpSpPr>
+        <a:xfrm>
+          <a:off x="0" y="0"/>
+          <a:ext cx="0" cy="0"/>
+          <a:chOff x="0" y="0"/>
+          <a:chExt cx="0" cy="0"/>
+        </a:xfrm>
+      </p:grpSpPr>
+      <p:sp>
+        <p:nvSpPr>
+          <p:cNvPr id="2" name="제목 1">
+            <a:extLst>
+              <a:ext uri="{FF2B5EF4-FFF2-40B4-BE49-F238E27FC236}">
+                <a16:creationId xmlns:a16="http://schemas.microsoft.com/office/drawing/2014/main" id="{0E87FEE0-543F-9246-B7A9-5B67A89C906C}"/>
+              </a:ext>
+            </a:extLst>
+          </p:cNvPr>
+          <p:cNvSpPr>
+            <a:spLocks noGrp="1"/>
+          </p:cNvSpPr>
+          <p:nvPr>
+            <p:ph type="title"/>
+          </p:nvPr>
+        </p:nvSpPr>
+        <p:spPr/>
+        <p:txBody>
+          <a:bodyPr/>
+          <a:lstStyle/>
+          <a:p>
+            <a:r>
+              <a:rPr kumimoji="1" lang="en-US" altLang="ko-KR" dirty="0"/>
+              <a:t>Various office 365 service </a:t>
+            </a:r>
+            <a:r>
+              <a:rPr kumimoji="1" lang="en-US" altLang="ko-KR"/>
+              <a:t>- Planner</a:t>
+            </a:r>
+            <a:endParaRPr kumimoji="1" lang="ko-KR" altLang="en-US" dirty="0"/>
+          </a:p>
+        </p:txBody>
+      </p:sp>
+      <p:pic>
+        <p:nvPicPr>
+          <p:cNvPr id="5" name="내용 개체 틀 4">
+            <a:extLst>
+              <a:ext uri="{FF2B5EF4-FFF2-40B4-BE49-F238E27FC236}">
+                <a16:creationId xmlns:a16="http://schemas.microsoft.com/office/drawing/2014/main" id="{4843B090-78A9-5241-A11B-B559A8277F9A}"/>
+              </a:ext>
+            </a:extLst>
+          </p:cNvPr>
+          <p:cNvPicPr>
+            <a:picLocks noGrp="1" noChangeAspect="1"/>
+          </p:cNvPicPr>
+          <p:nvPr>
+            <p:ph idx="1"/>
+          </p:nvPr>
+        </p:nvPicPr>
+        <p:blipFill>
+          <a:blip r:embed="rId2"/>
+          <a:stretch>
+            <a:fillRect/>
+          </a:stretch>
+        </p:blipFill>
+        <p:spPr>
+          <a:xfrm>
+            <a:off x="1141413" y="1533218"/>
+            <a:ext cx="9172084" cy="5324782"/>
+          </a:xfrm>
+        </p:spPr>
+      </p:pic>
+    </p:spTree>
+    <p:extLst>
+      <p:ext uri="{BB962C8B-B14F-4D97-AF65-F5344CB8AC3E}">
+        <p14:creationId xmlns:p14="http://schemas.microsoft.com/office/powerpoint/2010/main" val="1250405675"/>
+      </p:ext>
+    </p:extLst>
+  </p:cSld>
+  <p:clrMapOvr>
+    <a:masterClrMapping/>
+  </p:clrMapOvr>
+</p:sld>
+</file>
+
 <file path=ppt/slides/slide3.xml><?xml version="1.0" encoding="utf-8"?>
 <p:sld xmlns:a="http://schemas.openxmlformats.org/drawingml/2006/main" xmlns:r="http://schemas.openxmlformats.org/officeDocument/2006/relationships" xmlns:p="http://schemas.openxmlformats.org/presentationml/2006/main">
   <p:cSld>
@@ -13462,51 +14252,8 @@
             </a:pPr>
             <a:r>
               <a:rPr kumimoji="1" lang="en-US" altLang="ko-KR" dirty="0"/>
-              <a:t>Self-Service?</a:t>
+              <a:t>Self-Service</a:t>
             </a:r>
-          </a:p>
-          <a:p>
-            <a:pPr marL="457200" indent="-457200">
-              <a:buAutoNum type="arabicPeriod"/>
-            </a:pPr>
-            <a:r>
-              <a:rPr kumimoji="1" lang="en-US" altLang="ko-KR" dirty="0"/>
-              <a:t>Idk</a:t>
-            </a:r>
-          </a:p>
-          <a:p>
-            <a:pPr marL="457200" indent="-457200">
-              <a:buAutoNum type="arabicPeriod"/>
-            </a:pPr>
-            <a:r>
-              <a:rPr kumimoji="1" lang="en-US" altLang="ko-KR" dirty="0"/>
-              <a:t>App Store</a:t>
-            </a:r>
-          </a:p>
-          <a:p>
-            <a:pPr marL="457200" indent="-457200">
-              <a:buAutoNum type="arabicPeriod"/>
-            </a:pPr>
-            <a:r>
-              <a:rPr kumimoji="1" lang="en-US" altLang="ko-KR" dirty="0"/>
-              <a:t>Torrent?</a:t>
-            </a:r>
-          </a:p>
-          <a:p>
-            <a:pPr marL="457200" indent="-457200">
-              <a:buAutoNum type="arabicPeriod"/>
-            </a:pPr>
-            <a:r>
-              <a:rPr kumimoji="1" lang="en-US" altLang="ko-KR"/>
-              <a:t>Microsoft Office 365..?</a:t>
-            </a:r>
-            <a:endParaRPr kumimoji="1" lang="en-US" altLang="ko-KR" dirty="0"/>
-          </a:p>
-          <a:p>
-            <a:pPr marL="457200" indent="-457200">
-              <a:buAutoNum type="arabicPeriod"/>
-            </a:pPr>
-            <a:endParaRPr kumimoji="1" lang="ko-KR" altLang="en-US" dirty="0"/>
           </a:p>
         </p:txBody>
       </p:sp>

</xml_diff>